<commit_message>
Version 20241108 Fixed Classification Entity issue Added Extract functionality Added bulk Delete functionality
</commit_message>
<xml_diff>
--- a/Simple Classification Creator.pptx
+++ b/Simple Classification Creator.pptx
@@ -7,10 +7,10 @@
     <p:sldMasterId id="2147483794" r:id="rId5"/>
   </p:sldMasterIdLst>
   <p:notesMasterIdLst>
-    <p:notesMasterId r:id="rId18"/>
+    <p:notesMasterId r:id="rId19"/>
   </p:notesMasterIdLst>
   <p:handoutMasterIdLst>
-    <p:handoutMasterId r:id="rId19"/>
+    <p:handoutMasterId r:id="rId20"/>
   </p:handoutMasterIdLst>
   <p:sldIdLst>
     <p:sldId id="288" r:id="rId6"/>
@@ -22,9 +22,10 @@
     <p:sldId id="2134807794" r:id="rId12"/>
     <p:sldId id="2134807795" r:id="rId13"/>
     <p:sldId id="2134807797" r:id="rId14"/>
-    <p:sldId id="2134807798" r:id="rId15"/>
-    <p:sldId id="2134807799" r:id="rId16"/>
-    <p:sldId id="267" r:id="rId17"/>
+    <p:sldId id="2134807800" r:id="rId15"/>
+    <p:sldId id="2134807798" r:id="rId16"/>
+    <p:sldId id="2134807799" r:id="rId17"/>
+    <p:sldId id="267" r:id="rId18"/>
   </p:sldIdLst>
   <p:sldSz cx="12188825" cy="6858000"/>
   <p:notesSz cx="7104063" cy="10234613"/>
@@ -137,6 +138,7 @@
             <p14:sldId id="2134807794"/>
             <p14:sldId id="2134807795"/>
             <p14:sldId id="2134807797"/>
+            <p14:sldId id="2134807800"/>
             <p14:sldId id="2134807798"/>
             <p14:sldId id="2134807799"/>
           </p14:sldIdLst>
@@ -333,7 +335,7 @@
           <a:p>
             <a:fld id="{A8AF0ABA-1503-4581-BC5A-AF3D56D7DD45}" type="datetimeFigureOut">
               <a:rPr lang="en-US" smtClean="0"/>
-              <a:t>11/7/2024</a:t>
+              <a:t>11/8/2024</a:t>
             </a:fld>
             <a:endParaRPr lang="en-US"/>
           </a:p>
@@ -498,7 +500,7 @@
           <a:p>
             <a:fld id="{78186FDC-CD1E-4E7E-B1CD-1CBCCD519E8C}" type="datetimeFigureOut">
               <a:rPr lang="en-US" smtClean="0"/>
-              <a:t>11/7/2024</a:t>
+              <a:t>11/8/2024</a:t>
             </a:fld>
             <a:endParaRPr lang="en-US"/>
           </a:p>
@@ -934,7 +936,7 @@
           <a:p>
             <a:fld id="{4B9A8B04-59C6-4476-9B83-8806D24CC38B}" type="slidenum">
               <a:rPr lang="en-US" smtClean="0"/>
-              <a:t>12</a:t>
+              <a:t>13</a:t>
             </a:fld>
             <a:endParaRPr lang="en-US"/>
           </a:p>
@@ -22332,7 +22334,7 @@
           <a:p>
             <a:r>
               <a:rPr lang="en-US" dirty="0"/>
-              <a:t>Additional Information</a:t>
+              <a:t>Other Options</a:t>
             </a:r>
             <a:endParaRPr lang="en-IN" dirty="0"/>
           </a:p>
@@ -22635,164 +22637,11 @@
                 <a:ea typeface="Roboto" charset="0"/>
                 <a:cs typeface="Roboto" charset="0"/>
               </a:rPr>
-              <a:t>Template files are stored in the “./templates” folder</a:t>
-            </a:r>
-          </a:p>
-          <a:p>
-            <a:pPr marL="342900" indent="-342900">
-              <a:lnSpc>
-                <a:spcPct val="90000"/>
-              </a:lnSpc>
-              <a:spcAft>
-                <a:spcPts val="1000"/>
-              </a:spcAft>
-              <a:buFont typeface="Arial" panose="020B0604020202020204" pitchFamily="34" charset="0"/>
-              <a:buChar char="•"/>
-            </a:pPr>
-            <a:r>
-              <a:rPr lang="en-US" sz="1600" dirty="0" err="1">
-                <a:latin typeface="Roboto" charset="0"/>
-                <a:ea typeface="Roboto" charset="0"/>
-                <a:cs typeface="Roboto" charset="0"/>
-              </a:rPr>
-              <a:t>json</a:t>
-            </a:r>
-            <a:r>
-              <a:rPr lang="en-US" sz="1600" dirty="0">
-                <a:latin typeface="Roboto" charset="0"/>
-                <a:ea typeface="Roboto" charset="0"/>
-                <a:cs typeface="Roboto" charset="0"/>
-              </a:rPr>
-              <a:t> files of what will be loaded will be stored in ./payloads/payload_&lt;timestamp&gt; folder</a:t>
-            </a:r>
-          </a:p>
-          <a:p>
-            <a:pPr marL="342900" indent="-342900">
-              <a:lnSpc>
-                <a:spcPct val="90000"/>
-              </a:lnSpc>
-              <a:spcAft>
-                <a:spcPts val="1000"/>
-              </a:spcAft>
-              <a:buFont typeface="Arial" panose="020B0604020202020204" pitchFamily="34" charset="0"/>
-              <a:buChar char="•"/>
-            </a:pPr>
-            <a:r>
-              <a:rPr lang="en-US" sz="1600" dirty="0">
-                <a:latin typeface="Roboto" charset="0"/>
-                <a:ea typeface="Roboto" charset="0"/>
-                <a:cs typeface="Roboto" charset="0"/>
-              </a:rPr>
-              <a:t>Additional flags can be set on the script:</a:t>
-            </a:r>
-          </a:p>
-          <a:p>
-            <a:pPr marL="742950" lvl="1" indent="-285750">
-              <a:lnSpc>
-                <a:spcPct val="90000"/>
-              </a:lnSpc>
-              <a:spcAft>
-                <a:spcPts val="1000"/>
-              </a:spcAft>
-              <a:buFont typeface="Arial" panose="020B0604020202020204" pitchFamily="34" charset="0"/>
-              <a:buChar char="•"/>
-            </a:pPr>
-            <a:r>
-              <a:rPr lang="en-US" sz="1600" i="1" dirty="0" err="1">
-                <a:latin typeface="Roboto" charset="0"/>
-                <a:ea typeface="Roboto" charset="0"/>
-                <a:cs typeface="Roboto" charset="0"/>
-              </a:rPr>
-              <a:t>default_pod</a:t>
-            </a:r>
-            <a:r>
-              <a:rPr lang="en-US" sz="1600" dirty="0">
-                <a:latin typeface="Roboto" charset="0"/>
-                <a:ea typeface="Roboto" charset="0"/>
-                <a:cs typeface="Roboto" charset="0"/>
-              </a:rPr>
-              <a:t>. Set this to the default Informatica POD to use. Example: dm-us</a:t>
-            </a:r>
-          </a:p>
-          <a:p>
-            <a:pPr marL="742950" lvl="1" indent="-285750">
-              <a:lnSpc>
-                <a:spcPct val="90000"/>
-              </a:lnSpc>
-              <a:spcAft>
-                <a:spcPts val="1000"/>
-              </a:spcAft>
-              <a:buFont typeface="Arial" panose="020B0604020202020204" pitchFamily="34" charset="0"/>
-              <a:buChar char="•"/>
-            </a:pPr>
-            <a:r>
-              <a:rPr lang="en-US" sz="1600" i="1" dirty="0" err="1">
-                <a:latin typeface="Roboto" charset="0"/>
-                <a:ea typeface="Roboto" charset="0"/>
-                <a:cs typeface="Roboto" charset="0"/>
-              </a:rPr>
-              <a:t>default_user</a:t>
-            </a:r>
-            <a:r>
-              <a:rPr lang="en-US" sz="1600" dirty="0">
-                <a:latin typeface="Roboto" charset="0"/>
-                <a:ea typeface="Roboto" charset="0"/>
-                <a:cs typeface="Roboto" charset="0"/>
-              </a:rPr>
-              <a:t>. Set this to the default user to use. Example: </a:t>
-            </a:r>
-            <a:r>
-              <a:rPr lang="en-US" sz="1600" dirty="0" err="1">
-                <a:latin typeface="Roboto" charset="0"/>
-                <a:ea typeface="Roboto" charset="0"/>
-                <a:cs typeface="Roboto" charset="0"/>
-              </a:rPr>
-              <a:t>shayes_compass</a:t>
-            </a:r>
-            <a:endParaRPr lang="en-US" sz="1600" dirty="0">
-              <a:latin typeface="Roboto" charset="0"/>
-              <a:ea typeface="Roboto" charset="0"/>
-              <a:cs typeface="Roboto" charset="0"/>
-            </a:endParaRPr>
-          </a:p>
-          <a:p>
-            <a:pPr marL="742950" lvl="1" indent="-285750">
-              <a:lnSpc>
-                <a:spcPct val="90000"/>
-              </a:lnSpc>
-              <a:spcAft>
-                <a:spcPts val="1000"/>
-              </a:spcAft>
-              <a:buFont typeface="Arial" panose="020B0604020202020204" pitchFamily="34" charset="0"/>
-              <a:buChar char="•"/>
-            </a:pPr>
-            <a:r>
-              <a:rPr lang="en-US" sz="1600" i="1" dirty="0" err="1">
-                <a:latin typeface="Roboto" charset="0"/>
-                <a:ea typeface="Roboto" charset="0"/>
-                <a:cs typeface="Roboto" charset="0"/>
-              </a:rPr>
-              <a:t>default_pwd</a:t>
-            </a:r>
-            <a:r>
-              <a:rPr lang="en-US" sz="1600" i="1" dirty="0">
-                <a:latin typeface="Roboto" charset="0"/>
-                <a:ea typeface="Roboto" charset="0"/>
-                <a:cs typeface="Roboto" charset="0"/>
-              </a:rPr>
-              <a:t>. </a:t>
-            </a:r>
-            <a:r>
-              <a:rPr lang="en-US" sz="1600" dirty="0">
-                <a:latin typeface="Roboto" charset="0"/>
-                <a:ea typeface="Roboto" charset="0"/>
-                <a:cs typeface="Roboto" charset="0"/>
-              </a:rPr>
-              <a:t>Set this to the default password to use. Example: 1234</a:t>
-            </a:r>
-          </a:p>
-          <a:p>
-            <a:pPr marL="742950" lvl="1" indent="-285750">
+              <a:t>Script can also be made to extract existing Classifications. By default, it’ll only do this when it’s needed (setting up Entity Classifications, for example). You can force the extract with a command line parameter</a:t>
+            </a:r>
+          </a:p>
+          <a:p>
+            <a:pPr marL="800100" lvl="1" indent="-342900">
               <a:lnSpc>
                 <a:spcPct val="90000"/>
               </a:lnSpc>
@@ -22809,7 +22658,7 @@
             </a:endParaRPr>
           </a:p>
           <a:p>
-            <a:pPr marL="742950" lvl="1" indent="-285750">
+            <a:pPr marL="800100" lvl="1" indent="-342900">
               <a:lnSpc>
                 <a:spcPct val="90000"/>
               </a:lnSpc>
@@ -22819,25 +22668,14 @@
               <a:buFont typeface="Arial" panose="020B0604020202020204" pitchFamily="34" charset="0"/>
               <a:buChar char="•"/>
             </a:pPr>
-            <a:r>
-              <a:rPr lang="en-US" sz="1600" i="1" dirty="0" err="1">
-                <a:latin typeface="Roboto" charset="0"/>
-                <a:ea typeface="Roboto" charset="0"/>
-                <a:cs typeface="Roboto" charset="0"/>
-              </a:rPr>
-              <a:t>prompt_for_login_info</a:t>
-            </a:r>
-            <a:r>
-              <a:rPr lang="en-US" sz="1600" dirty="0">
-                <a:latin typeface="Roboto" charset="0"/>
-                <a:ea typeface="Roboto" charset="0"/>
-                <a:cs typeface="Roboto" charset="0"/>
-              </a:rPr>
-              <a:t>. True/False. Whether or not to prompt. If False, will not prompt, unless default is not set</a:t>
-            </a:r>
-          </a:p>
-          <a:p>
-            <a:pPr marL="742950" lvl="1" indent="-285750">
+            <a:endParaRPr lang="en-US" sz="1600" dirty="0">
+              <a:latin typeface="Roboto" charset="0"/>
+              <a:ea typeface="Roboto" charset="0"/>
+              <a:cs typeface="Roboto" charset="0"/>
+            </a:endParaRPr>
+          </a:p>
+          <a:p>
+            <a:pPr marL="800100" lvl="1" indent="-342900">
               <a:lnSpc>
                 <a:spcPct val="90000"/>
               </a:lnSpc>
@@ -22847,33 +22685,14 @@
               <a:buFont typeface="Arial" panose="020B0604020202020204" pitchFamily="34" charset="0"/>
               <a:buChar char="•"/>
             </a:pPr>
-            <a:r>
-              <a:rPr lang="en-US" sz="1600" i="1" dirty="0" err="1">
-                <a:latin typeface="Roboto" charset="0"/>
-                <a:ea typeface="Roboto" charset="0"/>
-                <a:cs typeface="Roboto" charset="0"/>
-              </a:rPr>
-              <a:t>pause_before_loading</a:t>
-            </a:r>
-            <a:r>
-              <a:rPr lang="en-US" sz="1600" i="1" dirty="0">
-                <a:latin typeface="Roboto" charset="0"/>
-                <a:ea typeface="Roboto" charset="0"/>
-                <a:cs typeface="Roboto" charset="0"/>
-              </a:rPr>
-              <a:t>. </a:t>
-            </a:r>
-            <a:r>
-              <a:rPr lang="en-US" sz="1600" dirty="0">
-                <a:latin typeface="Roboto" charset="0"/>
-                <a:ea typeface="Roboto" charset="0"/>
-                <a:cs typeface="Roboto" charset="0"/>
-              </a:rPr>
-              <a:t>True/False. Whether or not to pause after payload files are created, before loading the  classifications.</a:t>
-            </a:r>
-          </a:p>
-          <a:p>
-            <a:pPr marL="742950" lvl="1" indent="-285750">
+            <a:endParaRPr lang="en-US" sz="1600" dirty="0">
+              <a:latin typeface="Roboto" charset="0"/>
+              <a:ea typeface="Roboto" charset="0"/>
+              <a:cs typeface="Roboto" charset="0"/>
+            </a:endParaRPr>
+          </a:p>
+          <a:p>
+            <a:pPr marL="342900" indent="-342900">
               <a:lnSpc>
                 <a:spcPct val="90000"/>
               </a:lnSpc>
@@ -22884,30 +22703,94 @@
               <a:buChar char="•"/>
             </a:pPr>
             <a:r>
-              <a:rPr lang="en-US" sz="1600" i="1" dirty="0" err="1">
-                <a:latin typeface="Roboto" charset="0"/>
-                <a:ea typeface="Roboto" charset="0"/>
-                <a:cs typeface="Roboto" charset="0"/>
-              </a:rPr>
-              <a:t>create_payloads_only</a:t>
-            </a:r>
-            <a:r>
-              <a:rPr lang="en-US" sz="1600" i="1" dirty="0">
-                <a:latin typeface="Roboto" charset="0"/>
-                <a:ea typeface="Roboto" charset="0"/>
-                <a:cs typeface="Roboto" charset="0"/>
-              </a:rPr>
-              <a:t>. </a:t>
-            </a:r>
-            <a:r>
               <a:rPr lang="en-US" sz="1600" dirty="0">
                 <a:latin typeface="Roboto" charset="0"/>
                 <a:ea typeface="Roboto" charset="0"/>
                 <a:cs typeface="Roboto" charset="0"/>
               </a:rPr>
-              <a:t>True/False. Is set to True, will only create the payload files, without loading anything. Good for testing</a:t>
-            </a:r>
-            <a:endParaRPr lang="en-US" sz="1600" i="1" dirty="0">
+              <a:t>Deleting Classifications are done by executing a job. You can execute them in bulk by formatting a simple csv file (classifications_delete.csv by default) with the Classification Name, and Action (set to DELETE). You can run the script with a delete command line parameter, and optionally the csv file that contain the classifications to be deleted.</a:t>
+            </a:r>
+          </a:p>
+          <a:p>
+            <a:pPr marL="342900" indent="-342900">
+              <a:lnSpc>
+                <a:spcPct val="90000"/>
+              </a:lnSpc>
+              <a:spcAft>
+                <a:spcPts val="1000"/>
+              </a:spcAft>
+              <a:buFont typeface="Arial" panose="020B0604020202020204" pitchFamily="34" charset="0"/>
+              <a:buChar char="•"/>
+            </a:pPr>
+            <a:endParaRPr lang="en-US" sz="1600" dirty="0">
+              <a:latin typeface="Roboto" charset="0"/>
+              <a:ea typeface="Roboto" charset="0"/>
+              <a:cs typeface="Roboto" charset="0"/>
+            </a:endParaRPr>
+          </a:p>
+          <a:p>
+            <a:pPr marL="342900" indent="-342900">
+              <a:lnSpc>
+                <a:spcPct val="90000"/>
+              </a:lnSpc>
+              <a:spcAft>
+                <a:spcPts val="1000"/>
+              </a:spcAft>
+              <a:buFont typeface="Arial" panose="020B0604020202020204" pitchFamily="34" charset="0"/>
+              <a:buChar char="•"/>
+            </a:pPr>
+            <a:endParaRPr lang="en-US" sz="1600" dirty="0">
+              <a:latin typeface="Roboto" charset="0"/>
+              <a:ea typeface="Roboto" charset="0"/>
+              <a:cs typeface="Roboto" charset="0"/>
+            </a:endParaRPr>
+          </a:p>
+          <a:p>
+            <a:pPr marL="342900" indent="-342900">
+              <a:lnSpc>
+                <a:spcPct val="90000"/>
+              </a:lnSpc>
+              <a:spcAft>
+                <a:spcPts val="1000"/>
+              </a:spcAft>
+              <a:buFont typeface="Arial" panose="020B0604020202020204" pitchFamily="34" charset="0"/>
+              <a:buChar char="•"/>
+            </a:pPr>
+            <a:endParaRPr lang="en-US" sz="1600" dirty="0">
+              <a:latin typeface="Roboto" charset="0"/>
+              <a:ea typeface="Roboto" charset="0"/>
+              <a:cs typeface="Roboto" charset="0"/>
+            </a:endParaRPr>
+          </a:p>
+          <a:p>
+            <a:pPr marL="342900" indent="-342900">
+              <a:lnSpc>
+                <a:spcPct val="90000"/>
+              </a:lnSpc>
+              <a:spcAft>
+                <a:spcPts val="1000"/>
+              </a:spcAft>
+              <a:buFont typeface="Arial" panose="020B0604020202020204" pitchFamily="34" charset="0"/>
+              <a:buChar char="•"/>
+            </a:pPr>
+            <a:endParaRPr lang="en-US" sz="1600" dirty="0">
+              <a:latin typeface="Roboto" charset="0"/>
+              <a:ea typeface="Roboto" charset="0"/>
+              <a:cs typeface="Roboto" charset="0"/>
+            </a:endParaRPr>
+          </a:p>
+          <a:p>
+            <a:pPr marL="342900" indent="-342900">
+              <a:lnSpc>
+                <a:spcPct val="90000"/>
+              </a:lnSpc>
+              <a:spcAft>
+                <a:spcPts val="1000"/>
+              </a:spcAft>
+              <a:buFont typeface="Arial" panose="020B0604020202020204" pitchFamily="34" charset="0"/>
+              <a:buChar char="•"/>
+            </a:pPr>
+            <a:endParaRPr lang="en-US" sz="1600" dirty="0">
               <a:latin typeface="Roboto" charset="0"/>
               <a:ea typeface="Roboto" charset="0"/>
               <a:cs typeface="Roboto" charset="0"/>
@@ -22930,10 +22813,212 @@
           </a:p>
         </p:txBody>
       </p:sp>
+      <p:graphicFrame>
+        <p:nvGraphicFramePr>
+          <p:cNvPr id="2" name="Table 1">
+            <a:extLst>
+              <a:ext uri="{FF2B5EF4-FFF2-40B4-BE49-F238E27FC236}">
+                <a16:creationId xmlns:a16="http://schemas.microsoft.com/office/drawing/2014/main" id="{F4EB0FB1-37E1-B368-E480-B21F948E2AD9}"/>
+              </a:ext>
+            </a:extLst>
+          </p:cNvPr>
+          <p:cNvGraphicFramePr>
+            <a:graphicFrameLocks noGrp="1"/>
+          </p:cNvGraphicFramePr>
+          <p:nvPr>
+            <p:extLst>
+              <p:ext uri="{D42A27DB-BD31-4B8C-83A1-F6EECF244321}">
+                <p14:modId xmlns:p14="http://schemas.microsoft.com/office/powerpoint/2010/main" val="527928439"/>
+              </p:ext>
+            </p:extLst>
+          </p:nvPr>
+        </p:nvGraphicFramePr>
+        <p:xfrm>
+          <a:off x="1546049" y="1742092"/>
+          <a:ext cx="5633684" cy="301197"/>
+        </p:xfrm>
+        <a:graphic>
+          <a:graphicData uri="http://schemas.openxmlformats.org/drawingml/2006/table">
+            <a:tbl>
+              <a:tblPr firstRow="1" bandRow="1">
+                <a:tableStyleId>{5C22544A-7EE6-4342-B048-85BDC9FD1C3A}</a:tableStyleId>
+              </a:tblPr>
+              <a:tblGrid>
+                <a:gridCol w="5633684">
+                  <a:extLst>
+                    <a:ext uri="{9D8B030D-6E8A-4147-A177-3AD203B41FA5}">
+                      <a16:colId xmlns:a16="http://schemas.microsoft.com/office/drawing/2014/main" val="3006732689"/>
+                    </a:ext>
+                  </a:extLst>
+                </a:gridCol>
+              </a:tblGrid>
+              <a:tr h="301197">
+                <a:tc>
+                  <a:txBody>
+                    <a:bodyPr/>
+                    <a:lstStyle/>
+                    <a:p>
+                      <a:r>
+                        <a:rPr lang="en-US" sz="1200" dirty="0">
+                          <a:latin typeface="Courier New" panose="02070309020205020404" pitchFamily="49" charset="0"/>
+                          <a:cs typeface="Courier New" panose="02070309020205020404" pitchFamily="49" charset="0"/>
+                        </a:rPr>
+                        <a:t>python simple_classification_creator.py extract</a:t>
+                      </a:r>
+                    </a:p>
+                  </a:txBody>
+                  <a:tcPr>
+                    <a:solidFill>
+                      <a:schemeClr val="tx1"/>
+                    </a:solidFill>
+                  </a:tcPr>
+                </a:tc>
+                <a:extLst>
+                  <a:ext uri="{0D108BD9-81ED-4DB2-BD59-A6C34878D82A}">
+                    <a16:rowId xmlns:a16="http://schemas.microsoft.com/office/drawing/2014/main" val="2155989993"/>
+                  </a:ext>
+                </a:extLst>
+              </a:tr>
+            </a:tbl>
+          </a:graphicData>
+        </a:graphic>
+      </p:graphicFrame>
+      <p:pic>
+        <p:nvPicPr>
+          <p:cNvPr id="4" name="Picture 3">
+            <a:extLst>
+              <a:ext uri="{FF2B5EF4-FFF2-40B4-BE49-F238E27FC236}">
+                <a16:creationId xmlns:a16="http://schemas.microsoft.com/office/drawing/2014/main" id="{6F07247B-728C-392F-C430-EED18C2D468B}"/>
+              </a:ext>
+            </a:extLst>
+          </p:cNvPr>
+          <p:cNvPicPr>
+            <a:picLocks noChangeAspect="1"/>
+          </p:cNvPicPr>
+          <p:nvPr/>
+        </p:nvPicPr>
+        <p:blipFill>
+          <a:blip r:embed="rId2"/>
+          <a:stretch>
+            <a:fillRect/>
+          </a:stretch>
+        </p:blipFill>
+        <p:spPr>
+          <a:xfrm>
+            <a:off x="8133568" y="3738014"/>
+            <a:ext cx="3324225" cy="1247775"/>
+          </a:xfrm>
+          <a:prstGeom prst="rect">
+            <a:avLst/>
+          </a:prstGeom>
+        </p:spPr>
+      </p:pic>
+      <p:graphicFrame>
+        <p:nvGraphicFramePr>
+          <p:cNvPr id="7" name="Table 6">
+            <a:extLst>
+              <a:ext uri="{FF2B5EF4-FFF2-40B4-BE49-F238E27FC236}">
+                <a16:creationId xmlns:a16="http://schemas.microsoft.com/office/drawing/2014/main" id="{8BD00691-CC8B-F23F-0A76-A5FCECB5FC8D}"/>
+              </a:ext>
+            </a:extLst>
+          </p:cNvPr>
+          <p:cNvGraphicFramePr>
+            <a:graphicFrameLocks noGrp="1"/>
+          </p:cNvGraphicFramePr>
+          <p:nvPr>
+            <p:extLst>
+              <p:ext uri="{D42A27DB-BD31-4B8C-83A1-F6EECF244321}">
+                <p14:modId xmlns:p14="http://schemas.microsoft.com/office/powerpoint/2010/main" val="1641305193"/>
+              </p:ext>
+            </p:extLst>
+          </p:nvPr>
+        </p:nvGraphicFramePr>
+        <p:xfrm>
+          <a:off x="1546049" y="3728998"/>
+          <a:ext cx="6445588" cy="640080"/>
+        </p:xfrm>
+        <a:graphic>
+          <a:graphicData uri="http://schemas.openxmlformats.org/drawingml/2006/table">
+            <a:tbl>
+              <a:tblPr firstRow="1" bandRow="1">
+                <a:tableStyleId>{5C22544A-7EE6-4342-B048-85BDC9FD1C3A}</a:tableStyleId>
+              </a:tblPr>
+              <a:tblGrid>
+                <a:gridCol w="6445588">
+                  <a:extLst>
+                    <a:ext uri="{9D8B030D-6E8A-4147-A177-3AD203B41FA5}">
+                      <a16:colId xmlns:a16="http://schemas.microsoft.com/office/drawing/2014/main" val="3006732689"/>
+                    </a:ext>
+                  </a:extLst>
+                </a:gridCol>
+              </a:tblGrid>
+              <a:tr h="593902">
+                <a:tc>
+                  <a:txBody>
+                    <a:bodyPr/>
+                    <a:lstStyle/>
+                    <a:p>
+                      <a:r>
+                        <a:rPr lang="en-US" sz="1200" dirty="0">
+                          <a:latin typeface="Courier New" panose="02070309020205020404" pitchFamily="49" charset="0"/>
+                          <a:cs typeface="Courier New" panose="02070309020205020404" pitchFamily="49" charset="0"/>
+                        </a:rPr>
+                        <a:t>python simple_classification_creator.py delete</a:t>
+                      </a:r>
+                    </a:p>
+                    <a:p>
+                      <a:pPr marL="0" marR="0" lvl="0" indent="0" algn="l" defTabSz="914217" rtl="0" eaLnBrk="1" fontAlgn="auto" latinLnBrk="0" hangingPunct="1">
+                        <a:lnSpc>
+                          <a:spcPct val="100000"/>
+                        </a:lnSpc>
+                        <a:spcBef>
+                          <a:spcPts val="0"/>
+                        </a:spcBef>
+                        <a:spcAft>
+                          <a:spcPts val="0"/>
+                        </a:spcAft>
+                        <a:buClrTx/>
+                        <a:buSzTx/>
+                        <a:buFontTx/>
+                        <a:buNone/>
+                        <a:tabLst/>
+                        <a:defRPr/>
+                      </a:pPr>
+                      <a:r>
+                        <a:rPr lang="en-US" sz="1200" dirty="0">
+                          <a:latin typeface="Courier New" panose="02070309020205020404" pitchFamily="49" charset="0"/>
+                          <a:cs typeface="Courier New" panose="02070309020205020404" pitchFamily="49" charset="0"/>
+                        </a:rPr>
+                        <a:t>python simple_classification_creator.py delete my_delete_file.csv</a:t>
+                      </a:r>
+                    </a:p>
+                    <a:p>
+                      <a:endParaRPr lang="en-US" sz="1200" dirty="0">
+                        <a:latin typeface="Courier New" panose="02070309020205020404" pitchFamily="49" charset="0"/>
+                        <a:cs typeface="Courier New" panose="02070309020205020404" pitchFamily="49" charset="0"/>
+                      </a:endParaRPr>
+                    </a:p>
+                  </a:txBody>
+                  <a:tcPr>
+                    <a:solidFill>
+                      <a:schemeClr val="tx1"/>
+                    </a:solidFill>
+                  </a:tcPr>
+                </a:tc>
+                <a:extLst>
+                  <a:ext uri="{0D108BD9-81ED-4DB2-BD59-A6C34878D82A}">
+                    <a16:rowId xmlns:a16="http://schemas.microsoft.com/office/drawing/2014/main" val="2155989993"/>
+                  </a:ext>
+                </a:extLst>
+              </a:tr>
+            </a:tbl>
+          </a:graphicData>
+        </a:graphic>
+      </p:graphicFrame>
     </p:spTree>
     <p:extLst>
       <p:ext uri="{BB962C8B-B14F-4D97-AF65-F5344CB8AC3E}">
-        <p14:creationId xmlns:p14="http://schemas.microsoft.com/office/powerpoint/2010/main" val="1185346069"/>
+        <p14:creationId xmlns:p14="http://schemas.microsoft.com/office/powerpoint/2010/main" val="2126644930"/>
       </p:ext>
     </p:extLst>
   </p:cSld>
@@ -22995,7 +23080,7 @@
           <a:p>
             <a:r>
               <a:rPr lang="en-US" dirty="0"/>
-              <a:t>Output</a:t>
+              <a:t>Additional Information</a:t>
             </a:r>
             <a:endParaRPr lang="en-IN" dirty="0"/>
           </a:p>
@@ -23268,6 +23353,748 @@
         </p:nvSpPr>
         <p:spPr>
           <a:xfrm>
+            <a:off x="708454" y="1051480"/>
+            <a:ext cx="11195177" cy="5412215"/>
+          </a:xfrm>
+          <a:prstGeom prst="rect">
+            <a:avLst/>
+          </a:prstGeom>
+          <a:noFill/>
+        </p:spPr>
+        <p:txBody>
+          <a:bodyPr wrap="square" lIns="0" tIns="0" rIns="0" bIns="0" rtlCol="0">
+            <a:noAutofit/>
+          </a:bodyPr>
+          <a:lstStyle/>
+          <a:p>
+            <a:pPr marL="342900" indent="-342900">
+              <a:lnSpc>
+                <a:spcPct val="90000"/>
+              </a:lnSpc>
+              <a:spcAft>
+                <a:spcPts val="1000"/>
+              </a:spcAft>
+              <a:buFont typeface="Arial" panose="020B0604020202020204" pitchFamily="34" charset="0"/>
+              <a:buChar char="•"/>
+            </a:pPr>
+            <a:r>
+              <a:rPr lang="en-US" sz="1500" dirty="0">
+                <a:latin typeface="Roboto" charset="0"/>
+                <a:ea typeface="Roboto" charset="0"/>
+                <a:cs typeface="Roboto" charset="0"/>
+              </a:rPr>
+              <a:t>Template files are stored in the “./templates” folder</a:t>
+            </a:r>
+          </a:p>
+          <a:p>
+            <a:pPr marL="342900" indent="-342900">
+              <a:lnSpc>
+                <a:spcPct val="90000"/>
+              </a:lnSpc>
+              <a:spcAft>
+                <a:spcPts val="1000"/>
+              </a:spcAft>
+              <a:buFont typeface="Arial" panose="020B0604020202020204" pitchFamily="34" charset="0"/>
+              <a:buChar char="•"/>
+            </a:pPr>
+            <a:r>
+              <a:rPr lang="en-US" sz="1500" dirty="0" err="1">
+                <a:latin typeface="Roboto" charset="0"/>
+                <a:ea typeface="Roboto" charset="0"/>
+                <a:cs typeface="Roboto" charset="0"/>
+              </a:rPr>
+              <a:t>json</a:t>
+            </a:r>
+            <a:r>
+              <a:rPr lang="en-US" sz="1500" dirty="0">
+                <a:latin typeface="Roboto" charset="0"/>
+                <a:ea typeface="Roboto" charset="0"/>
+                <a:cs typeface="Roboto" charset="0"/>
+              </a:rPr>
+              <a:t> files of what will be loaded will be stored in ./payloads/payload_&lt;timestamp&gt; folder</a:t>
+            </a:r>
+          </a:p>
+          <a:p>
+            <a:pPr marL="342900" indent="-342900">
+              <a:lnSpc>
+                <a:spcPct val="90000"/>
+              </a:lnSpc>
+              <a:spcAft>
+                <a:spcPts val="1000"/>
+              </a:spcAft>
+              <a:buFont typeface="Arial" panose="020B0604020202020204" pitchFamily="34" charset="0"/>
+              <a:buChar char="•"/>
+            </a:pPr>
+            <a:r>
+              <a:rPr lang="en-US" sz="1500" dirty="0">
+                <a:latin typeface="Roboto" charset="0"/>
+                <a:ea typeface="Roboto" charset="0"/>
+                <a:cs typeface="Roboto" charset="0"/>
+              </a:rPr>
+              <a:t>extracts are stored in the “./extracts” folder</a:t>
+            </a:r>
+          </a:p>
+          <a:p>
+            <a:pPr marL="342900" indent="-342900">
+              <a:lnSpc>
+                <a:spcPct val="90000"/>
+              </a:lnSpc>
+              <a:spcAft>
+                <a:spcPts val="1000"/>
+              </a:spcAft>
+              <a:buFont typeface="Arial" panose="020B0604020202020204" pitchFamily="34" charset="0"/>
+              <a:buChar char="•"/>
+            </a:pPr>
+            <a:r>
+              <a:rPr lang="en-US" sz="1500" dirty="0">
+                <a:latin typeface="Roboto" charset="0"/>
+                <a:ea typeface="Roboto" charset="0"/>
+                <a:cs typeface="Roboto" charset="0"/>
+              </a:rPr>
+              <a:t>Additional flags can be set on the script:</a:t>
+            </a:r>
+          </a:p>
+          <a:p>
+            <a:pPr marL="742950" lvl="1" indent="-285750">
+              <a:lnSpc>
+                <a:spcPct val="90000"/>
+              </a:lnSpc>
+              <a:spcAft>
+                <a:spcPts val="1000"/>
+              </a:spcAft>
+              <a:buFont typeface="Arial" panose="020B0604020202020204" pitchFamily="34" charset="0"/>
+              <a:buChar char="•"/>
+            </a:pPr>
+            <a:r>
+              <a:rPr lang="en-US" sz="1500" i="1" dirty="0" err="1">
+                <a:latin typeface="Roboto" charset="0"/>
+                <a:ea typeface="Roboto" charset="0"/>
+                <a:cs typeface="Roboto" charset="0"/>
+              </a:rPr>
+              <a:t>default_pod</a:t>
+            </a:r>
+            <a:r>
+              <a:rPr lang="en-US" sz="1500" dirty="0">
+                <a:latin typeface="Roboto" charset="0"/>
+                <a:ea typeface="Roboto" charset="0"/>
+                <a:cs typeface="Roboto" charset="0"/>
+              </a:rPr>
+              <a:t>. Set this to the default Informatica POD to use. Example: dm-us</a:t>
+            </a:r>
+          </a:p>
+          <a:p>
+            <a:pPr marL="742950" lvl="1" indent="-285750">
+              <a:lnSpc>
+                <a:spcPct val="90000"/>
+              </a:lnSpc>
+              <a:spcAft>
+                <a:spcPts val="1000"/>
+              </a:spcAft>
+              <a:buFont typeface="Arial" panose="020B0604020202020204" pitchFamily="34" charset="0"/>
+              <a:buChar char="•"/>
+            </a:pPr>
+            <a:r>
+              <a:rPr lang="en-US" sz="1500" i="1" dirty="0" err="1">
+                <a:latin typeface="Roboto" charset="0"/>
+                <a:ea typeface="Roboto" charset="0"/>
+                <a:cs typeface="Roboto" charset="0"/>
+              </a:rPr>
+              <a:t>default_user</a:t>
+            </a:r>
+            <a:r>
+              <a:rPr lang="en-US" sz="1500" dirty="0">
+                <a:latin typeface="Roboto" charset="0"/>
+                <a:ea typeface="Roboto" charset="0"/>
+                <a:cs typeface="Roboto" charset="0"/>
+              </a:rPr>
+              <a:t>. Set this to the default user to use. Example: </a:t>
+            </a:r>
+            <a:r>
+              <a:rPr lang="en-US" sz="1500" dirty="0" err="1">
+                <a:latin typeface="Roboto" charset="0"/>
+                <a:ea typeface="Roboto" charset="0"/>
+                <a:cs typeface="Roboto" charset="0"/>
+              </a:rPr>
+              <a:t>shayes_compass</a:t>
+            </a:r>
+            <a:endParaRPr lang="en-US" sz="1500" dirty="0">
+              <a:latin typeface="Roboto" charset="0"/>
+              <a:ea typeface="Roboto" charset="0"/>
+              <a:cs typeface="Roboto" charset="0"/>
+            </a:endParaRPr>
+          </a:p>
+          <a:p>
+            <a:pPr marL="742950" lvl="1" indent="-285750">
+              <a:lnSpc>
+                <a:spcPct val="90000"/>
+              </a:lnSpc>
+              <a:spcAft>
+                <a:spcPts val="1000"/>
+              </a:spcAft>
+              <a:buFont typeface="Arial" panose="020B0604020202020204" pitchFamily="34" charset="0"/>
+              <a:buChar char="•"/>
+            </a:pPr>
+            <a:r>
+              <a:rPr lang="en-US" sz="1500" i="1" dirty="0" err="1">
+                <a:latin typeface="Roboto" charset="0"/>
+                <a:ea typeface="Roboto" charset="0"/>
+                <a:cs typeface="Roboto" charset="0"/>
+              </a:rPr>
+              <a:t>default_pwd</a:t>
+            </a:r>
+            <a:r>
+              <a:rPr lang="en-US" sz="1500" i="1" dirty="0">
+                <a:latin typeface="Roboto" charset="0"/>
+                <a:ea typeface="Roboto" charset="0"/>
+                <a:cs typeface="Roboto" charset="0"/>
+              </a:rPr>
+              <a:t>. </a:t>
+            </a:r>
+            <a:r>
+              <a:rPr lang="en-US" sz="1500" dirty="0">
+                <a:latin typeface="Roboto" charset="0"/>
+                <a:ea typeface="Roboto" charset="0"/>
+                <a:cs typeface="Roboto" charset="0"/>
+              </a:rPr>
+              <a:t>Set this to the default password to use. Example: 1234</a:t>
+            </a:r>
+          </a:p>
+          <a:p>
+            <a:pPr marL="742950" lvl="1" indent="-285750">
+              <a:lnSpc>
+                <a:spcPct val="90000"/>
+              </a:lnSpc>
+              <a:spcAft>
+                <a:spcPts val="1000"/>
+              </a:spcAft>
+              <a:buFont typeface="Arial" panose="020B0604020202020204" pitchFamily="34" charset="0"/>
+              <a:buChar char="•"/>
+            </a:pPr>
+            <a:endParaRPr lang="en-US" sz="1500" dirty="0">
+              <a:latin typeface="Roboto" charset="0"/>
+              <a:ea typeface="Roboto" charset="0"/>
+              <a:cs typeface="Roboto" charset="0"/>
+            </a:endParaRPr>
+          </a:p>
+          <a:p>
+            <a:pPr marL="742950" lvl="1" indent="-285750">
+              <a:lnSpc>
+                <a:spcPct val="90000"/>
+              </a:lnSpc>
+              <a:spcAft>
+                <a:spcPts val="1000"/>
+              </a:spcAft>
+              <a:buFont typeface="Arial" panose="020B0604020202020204" pitchFamily="34" charset="0"/>
+              <a:buChar char="•"/>
+            </a:pPr>
+            <a:r>
+              <a:rPr lang="en-US" sz="1500" i="1" dirty="0" err="1">
+                <a:latin typeface="Roboto" charset="0"/>
+                <a:ea typeface="Roboto" charset="0"/>
+                <a:cs typeface="Roboto" charset="0"/>
+              </a:rPr>
+              <a:t>prompt_for_login_info</a:t>
+            </a:r>
+            <a:r>
+              <a:rPr lang="en-US" sz="1500" dirty="0">
+                <a:latin typeface="Roboto" charset="0"/>
+                <a:ea typeface="Roboto" charset="0"/>
+                <a:cs typeface="Roboto" charset="0"/>
+              </a:rPr>
+              <a:t>. True/False. Whether or not to prompt. If False, will not prompt, unless default is not set</a:t>
+            </a:r>
+          </a:p>
+          <a:p>
+            <a:pPr marL="742950" lvl="1" indent="-285750">
+              <a:lnSpc>
+                <a:spcPct val="90000"/>
+              </a:lnSpc>
+              <a:spcAft>
+                <a:spcPts val="1000"/>
+              </a:spcAft>
+              <a:buFont typeface="Arial" panose="020B0604020202020204" pitchFamily="34" charset="0"/>
+              <a:buChar char="•"/>
+            </a:pPr>
+            <a:r>
+              <a:rPr lang="en-US" sz="1500" i="1" dirty="0" err="1">
+                <a:latin typeface="Roboto" charset="0"/>
+                <a:ea typeface="Roboto" charset="0"/>
+                <a:cs typeface="Roboto" charset="0"/>
+              </a:rPr>
+              <a:t>pause_before_loading</a:t>
+            </a:r>
+            <a:r>
+              <a:rPr lang="en-US" sz="1500" i="1" dirty="0">
+                <a:latin typeface="Roboto" charset="0"/>
+                <a:ea typeface="Roboto" charset="0"/>
+                <a:cs typeface="Roboto" charset="0"/>
+              </a:rPr>
+              <a:t>. </a:t>
+            </a:r>
+            <a:r>
+              <a:rPr lang="en-US" sz="1500" dirty="0">
+                <a:latin typeface="Roboto" charset="0"/>
+                <a:ea typeface="Roboto" charset="0"/>
+                <a:cs typeface="Roboto" charset="0"/>
+              </a:rPr>
+              <a:t>True/False. Whether or not to pause after payload files are created, before loading the  classifications.</a:t>
+            </a:r>
+          </a:p>
+          <a:p>
+            <a:pPr marL="742950" lvl="1" indent="-285750">
+              <a:lnSpc>
+                <a:spcPct val="90000"/>
+              </a:lnSpc>
+              <a:spcAft>
+                <a:spcPts val="1000"/>
+              </a:spcAft>
+              <a:buFont typeface="Arial" panose="020B0604020202020204" pitchFamily="34" charset="0"/>
+              <a:buChar char="•"/>
+            </a:pPr>
+            <a:r>
+              <a:rPr lang="en-US" sz="1500" i="1" dirty="0" err="1">
+                <a:latin typeface="Roboto" charset="0"/>
+                <a:ea typeface="Roboto" charset="0"/>
+                <a:cs typeface="Roboto" charset="0"/>
+              </a:rPr>
+              <a:t>create_payloads_only</a:t>
+            </a:r>
+            <a:r>
+              <a:rPr lang="en-US" sz="1500" i="1" dirty="0">
+                <a:latin typeface="Roboto" charset="0"/>
+                <a:ea typeface="Roboto" charset="0"/>
+                <a:cs typeface="Roboto" charset="0"/>
+              </a:rPr>
+              <a:t>. </a:t>
+            </a:r>
+            <a:r>
+              <a:rPr lang="en-US" sz="1500" dirty="0">
+                <a:latin typeface="Roboto" charset="0"/>
+                <a:ea typeface="Roboto" charset="0"/>
+                <a:cs typeface="Roboto" charset="0"/>
+              </a:rPr>
+              <a:t>True/False. If set to True, will only create the payload files, without loading anything. Good for testing</a:t>
+            </a:r>
+          </a:p>
+          <a:p>
+            <a:pPr marL="742950" lvl="1" indent="-285750">
+              <a:lnSpc>
+                <a:spcPct val="90000"/>
+              </a:lnSpc>
+              <a:spcAft>
+                <a:spcPts val="1000"/>
+              </a:spcAft>
+              <a:buFont typeface="Arial" panose="020B0604020202020204" pitchFamily="34" charset="0"/>
+              <a:buChar char="•"/>
+            </a:pPr>
+            <a:r>
+              <a:rPr lang="en-US" sz="1500" i="1" dirty="0" err="1">
+                <a:latin typeface="Roboto" charset="0"/>
+                <a:ea typeface="Roboto" charset="0"/>
+                <a:cs typeface="Roboto" charset="0"/>
+              </a:rPr>
+              <a:t>when_extracting_fetch_details</a:t>
+            </a:r>
+            <a:r>
+              <a:rPr lang="en-US" sz="1500" i="1" dirty="0">
+                <a:latin typeface="Roboto" charset="0"/>
+                <a:ea typeface="Roboto" charset="0"/>
+                <a:cs typeface="Roboto" charset="0"/>
+              </a:rPr>
+              <a:t>. </a:t>
+            </a:r>
+            <a:r>
+              <a:rPr lang="en-US" sz="1500" dirty="0">
+                <a:latin typeface="Roboto" charset="0"/>
+                <a:ea typeface="Roboto" charset="0"/>
+                <a:cs typeface="Roboto" charset="0"/>
+              </a:rPr>
+              <a:t>True/False. If set to True, when extracting classifications, it will also fetch the details for any user created classifications</a:t>
+            </a:r>
+          </a:p>
+          <a:p>
+            <a:pPr marL="742950" lvl="1" indent="-285750">
+              <a:lnSpc>
+                <a:spcPct val="90000"/>
+              </a:lnSpc>
+              <a:spcAft>
+                <a:spcPts val="1000"/>
+              </a:spcAft>
+              <a:buFont typeface="Arial" panose="020B0604020202020204" pitchFamily="34" charset="0"/>
+              <a:buChar char="•"/>
+            </a:pPr>
+            <a:r>
+              <a:rPr lang="en-US" sz="1500" i="1" dirty="0" err="1">
+                <a:latin typeface="Roboto" charset="0"/>
+                <a:ea typeface="Roboto" charset="0"/>
+                <a:cs typeface="Roboto" charset="0"/>
+              </a:rPr>
+              <a:t>show_raw_errors</a:t>
+            </a:r>
+            <a:r>
+              <a:rPr lang="en-US" sz="1500" dirty="0">
+                <a:latin typeface="Roboto" charset="0"/>
+                <a:ea typeface="Roboto" charset="0"/>
+                <a:cs typeface="Roboto" charset="0"/>
+              </a:rPr>
+              <a:t>. True/False. If set to True, it will always show raw errors if they occur. Otherwise, it will attempt to find the message from the error, and display that.</a:t>
+            </a:r>
+          </a:p>
+          <a:p>
+            <a:pPr>
+              <a:lnSpc>
+                <a:spcPct val="90000"/>
+              </a:lnSpc>
+              <a:spcAft>
+                <a:spcPts val="1000"/>
+              </a:spcAft>
+            </a:pPr>
+            <a:endParaRPr lang="en-US" sz="1500" dirty="0">
+              <a:latin typeface="Roboto" charset="0"/>
+              <a:ea typeface="Roboto" charset="0"/>
+              <a:cs typeface="Roboto" charset="0"/>
+            </a:endParaRPr>
+          </a:p>
+        </p:txBody>
+      </p:sp>
+    </p:spTree>
+    <p:extLst>
+      <p:ext uri="{BB962C8B-B14F-4D97-AF65-F5344CB8AC3E}">
+        <p14:creationId xmlns:p14="http://schemas.microsoft.com/office/powerpoint/2010/main" val="1185346069"/>
+      </p:ext>
+    </p:extLst>
+  </p:cSld>
+  <p:clrMapOvr>
+    <a:masterClrMapping/>
+  </p:clrMapOvr>
+  <mc:AlternateContent xmlns:mc="http://schemas.openxmlformats.org/markup-compatibility/2006" xmlns:p14="http://schemas.microsoft.com/office/powerpoint/2010/main">
+    <mc:Choice Requires="p14">
+      <p:transition spd="med" p14:dur="700" advClick="0">
+        <p:fade/>
+      </p:transition>
+    </mc:Choice>
+    <mc:Fallback xmlns="">
+      <p:transition spd="med" advClick="0">
+        <p:fade/>
+      </p:transition>
+    </mc:Fallback>
+  </mc:AlternateContent>
+</p:sld>
+</file>
+
+<file path=ppt/slides/slide12.xml><?xml version="1.0" encoding="utf-8"?>
+<p:sld xmlns:a="http://schemas.openxmlformats.org/drawingml/2006/main" xmlns:r="http://schemas.openxmlformats.org/officeDocument/2006/relationships" xmlns:p="http://schemas.openxmlformats.org/presentationml/2006/main">
+  <p:cSld>
+    <p:spTree>
+      <p:nvGrpSpPr>
+        <p:cNvPr id="1" name=""/>
+        <p:cNvGrpSpPr/>
+        <p:nvPr/>
+      </p:nvGrpSpPr>
+      <p:grpSpPr>
+        <a:xfrm>
+          <a:off x="0" y="0"/>
+          <a:ext cx="0" cy="0"/>
+          <a:chOff x="0" y="0"/>
+          <a:chExt cx="0" cy="0"/>
+        </a:xfrm>
+      </p:grpSpPr>
+      <p:sp>
+        <p:nvSpPr>
+          <p:cNvPr id="5" name="Title 4">
+            <a:extLst>
+              <a:ext uri="{FF2B5EF4-FFF2-40B4-BE49-F238E27FC236}">
+                <a16:creationId xmlns:a16="http://schemas.microsoft.com/office/drawing/2014/main" id="{C2B479B7-4E1E-475F-B459-5CE8B05302D3}"/>
+              </a:ext>
+            </a:extLst>
+          </p:cNvPr>
+          <p:cNvSpPr>
+            <a:spLocks noGrp="1"/>
+          </p:cNvSpPr>
+          <p:nvPr>
+            <p:ph type="title"/>
+          </p:nvPr>
+        </p:nvSpPr>
+        <p:spPr/>
+        <p:txBody>
+          <a:bodyPr/>
+          <a:lstStyle/>
+          <a:p>
+            <a:r>
+              <a:rPr lang="en-US" dirty="0"/>
+              <a:t>Output</a:t>
+            </a:r>
+            <a:endParaRPr lang="en-IN" dirty="0"/>
+          </a:p>
+        </p:txBody>
+      </p:sp>
+      <p:sp>
+        <p:nvSpPr>
+          <p:cNvPr id="16" name="Content Placeholder 13">
+            <a:extLst>
+              <a:ext uri="{FF2B5EF4-FFF2-40B4-BE49-F238E27FC236}">
+                <a16:creationId xmlns:a16="http://schemas.microsoft.com/office/drawing/2014/main" id="{807EB0DB-72EF-4CAE-8A2F-F7E55C093081}"/>
+              </a:ext>
+            </a:extLst>
+          </p:cNvPr>
+          <p:cNvSpPr txBox="1">
+            <a:spLocks/>
+          </p:cNvSpPr>
+          <p:nvPr/>
+        </p:nvSpPr>
+        <p:spPr>
+          <a:xfrm>
+            <a:off x="1180247" y="1610532"/>
+            <a:ext cx="3180631" cy="2562457"/>
+          </a:xfrm>
+          <a:prstGeom prst="rect">
+            <a:avLst/>
+          </a:prstGeom>
+        </p:spPr>
+        <p:txBody>
+          <a:bodyPr vert="horz" lIns="0" tIns="0" rIns="0" bIns="0" rtlCol="0">
+            <a:noAutofit/>
+          </a:bodyPr>
+          <a:lstStyle>
+            <a:lvl1pPr marL="173038" indent="-173038" algn="l" defTabSz="914217" rtl="0" eaLnBrk="1" latinLnBrk="0" hangingPunct="1">
+              <a:lnSpc>
+                <a:spcPct val="90000"/>
+              </a:lnSpc>
+              <a:spcBef>
+                <a:spcPts val="400"/>
+              </a:spcBef>
+              <a:spcAft>
+                <a:spcPts val="1200"/>
+              </a:spcAft>
+              <a:buClr>
+                <a:schemeClr val="accent2"/>
+              </a:buClr>
+              <a:buFont typeface="Arial" panose="020B0604020202020204" pitchFamily="34" charset="0"/>
+              <a:buChar char="•"/>
+              <a:defRPr sz="2100" b="0" i="0" kern="1200" baseline="0">
+                <a:solidFill>
+                  <a:schemeClr val="tx1"/>
+                </a:solidFill>
+                <a:latin typeface="Roboto" charset="0"/>
+                <a:ea typeface="Roboto" charset="0"/>
+                <a:cs typeface="Roboto" charset="0"/>
+              </a:defRPr>
+            </a:lvl1pPr>
+            <a:lvl2pPr marL="344488" indent="-174625" algn="l" defTabSz="914217" rtl="0" eaLnBrk="1" latinLnBrk="0" hangingPunct="1">
+              <a:lnSpc>
+                <a:spcPct val="90000"/>
+              </a:lnSpc>
+              <a:spcBef>
+                <a:spcPts val="0"/>
+              </a:spcBef>
+              <a:spcAft>
+                <a:spcPts val="1200"/>
+              </a:spcAft>
+              <a:buClr>
+                <a:schemeClr val="accent2"/>
+              </a:buClr>
+              <a:buFont typeface="Arial" panose="020B0604020202020204" pitchFamily="34" charset="0"/>
+              <a:buChar char="•"/>
+              <a:defRPr sz="1800" b="0" i="0" kern="1200" baseline="0">
+                <a:solidFill>
+                  <a:schemeClr val="tx1"/>
+                </a:solidFill>
+                <a:latin typeface="Roboto" charset="0"/>
+                <a:ea typeface="Roboto" charset="0"/>
+                <a:cs typeface="Roboto" charset="0"/>
+              </a:defRPr>
+            </a:lvl2pPr>
+            <a:lvl3pPr marL="514350" indent="-169863" algn="l" defTabSz="914217" rtl="0" eaLnBrk="1" latinLnBrk="0" hangingPunct="1">
+              <a:lnSpc>
+                <a:spcPct val="90000"/>
+              </a:lnSpc>
+              <a:spcBef>
+                <a:spcPts val="0"/>
+              </a:spcBef>
+              <a:spcAft>
+                <a:spcPts val="1200"/>
+              </a:spcAft>
+              <a:buClr>
+                <a:schemeClr val="accent2"/>
+              </a:buClr>
+              <a:buFont typeface="Arial" panose="020B0604020202020204" pitchFamily="34" charset="0"/>
+              <a:buChar char="•"/>
+              <a:defRPr sz="1600" b="0" i="0" kern="1200">
+                <a:solidFill>
+                  <a:schemeClr val="tx1"/>
+                </a:solidFill>
+                <a:latin typeface="Roboto" charset="0"/>
+                <a:ea typeface="Roboto" charset="0"/>
+                <a:cs typeface="Roboto" charset="0"/>
+              </a:defRPr>
+            </a:lvl3pPr>
+            <a:lvl4pPr marL="630238" indent="-171450" algn="l" defTabSz="914217" rtl="0" eaLnBrk="1" latinLnBrk="0" hangingPunct="1">
+              <a:lnSpc>
+                <a:spcPct val="90000"/>
+              </a:lnSpc>
+              <a:spcBef>
+                <a:spcPts val="0"/>
+              </a:spcBef>
+              <a:spcAft>
+                <a:spcPts val="1200"/>
+              </a:spcAft>
+              <a:buClr>
+                <a:schemeClr val="accent2"/>
+              </a:buClr>
+              <a:buFont typeface="Arial" panose="020B0604020202020204" pitchFamily="34" charset="0"/>
+              <a:buChar char="•"/>
+              <a:defRPr sz="1400" b="0" i="0" kern="1200">
+                <a:solidFill>
+                  <a:schemeClr val="tx1"/>
+                </a:solidFill>
+                <a:latin typeface="Roboto" charset="0"/>
+                <a:ea typeface="Roboto" charset="0"/>
+                <a:cs typeface="Roboto" charset="0"/>
+              </a:defRPr>
+            </a:lvl4pPr>
+            <a:lvl5pPr marL="800100" indent="-169863" algn="l" defTabSz="914217" rtl="0" eaLnBrk="1" latinLnBrk="0" hangingPunct="1">
+              <a:lnSpc>
+                <a:spcPct val="90000"/>
+              </a:lnSpc>
+              <a:spcBef>
+                <a:spcPts val="0"/>
+              </a:spcBef>
+              <a:spcAft>
+                <a:spcPts val="1200"/>
+              </a:spcAft>
+              <a:buClr>
+                <a:schemeClr val="accent2"/>
+              </a:buClr>
+              <a:buFont typeface="Arial" panose="020B0604020202020204" pitchFamily="34" charset="0"/>
+              <a:buChar char="•"/>
+              <a:defRPr sz="1400" b="0" i="0" kern="1200">
+                <a:solidFill>
+                  <a:schemeClr val="tx1"/>
+                </a:solidFill>
+                <a:latin typeface="Roboto" charset="0"/>
+                <a:ea typeface="Roboto" charset="0"/>
+                <a:cs typeface="Roboto" charset="0"/>
+              </a:defRPr>
+            </a:lvl5pPr>
+            <a:lvl6pPr marL="914400" indent="-169863" algn="l" defTabSz="914217" rtl="0" eaLnBrk="1" latinLnBrk="0" hangingPunct="1">
+              <a:lnSpc>
+                <a:spcPct val="90000"/>
+              </a:lnSpc>
+              <a:spcBef>
+                <a:spcPts val="500"/>
+              </a:spcBef>
+              <a:spcAft>
+                <a:spcPts val="1200"/>
+              </a:spcAft>
+              <a:buClr>
+                <a:schemeClr val="accent2"/>
+              </a:buClr>
+              <a:buFont typeface="Arial" panose="020B0604020202020204" pitchFamily="34" charset="0"/>
+              <a:buChar char="•"/>
+              <a:defRPr sz="1200" b="0" i="0" kern="1200">
+                <a:solidFill>
+                  <a:schemeClr val="tx1"/>
+                </a:solidFill>
+                <a:latin typeface="Roboto" charset="0"/>
+                <a:ea typeface="Roboto" charset="0"/>
+                <a:cs typeface="Roboto" charset="0"/>
+              </a:defRPr>
+            </a:lvl6pPr>
+            <a:lvl7pPr marL="1084263" indent="-169863" algn="l" defTabSz="914217" rtl="0" eaLnBrk="1" latinLnBrk="0" hangingPunct="1">
+              <a:lnSpc>
+                <a:spcPct val="90000"/>
+              </a:lnSpc>
+              <a:spcBef>
+                <a:spcPts val="500"/>
+              </a:spcBef>
+              <a:spcAft>
+                <a:spcPts val="1200"/>
+              </a:spcAft>
+              <a:buClr>
+                <a:schemeClr val="accent2"/>
+              </a:buClr>
+              <a:buFont typeface="Arial" panose="020B0604020202020204" pitchFamily="34" charset="0"/>
+              <a:buChar char="•"/>
+              <a:defRPr sz="1200" b="0" i="0" kern="1200">
+                <a:solidFill>
+                  <a:schemeClr val="tx1"/>
+                </a:solidFill>
+                <a:latin typeface="Roboto" charset="0"/>
+                <a:ea typeface="Roboto" charset="0"/>
+                <a:cs typeface="Roboto" charset="0"/>
+              </a:defRPr>
+            </a:lvl7pPr>
+            <a:lvl8pPr marL="1258888" indent="-174625" algn="l" defTabSz="914217" rtl="0" eaLnBrk="1" latinLnBrk="0" hangingPunct="1">
+              <a:lnSpc>
+                <a:spcPct val="90000"/>
+              </a:lnSpc>
+              <a:spcBef>
+                <a:spcPts val="500"/>
+              </a:spcBef>
+              <a:spcAft>
+                <a:spcPts val="1200"/>
+              </a:spcAft>
+              <a:buClr>
+                <a:schemeClr val="accent2"/>
+              </a:buClr>
+              <a:buFont typeface="Arial" panose="020B0604020202020204" pitchFamily="34" charset="0"/>
+              <a:buChar char="•"/>
+              <a:defRPr sz="1200" b="0" i="0" kern="1200">
+                <a:solidFill>
+                  <a:schemeClr val="tx1"/>
+                </a:solidFill>
+                <a:latin typeface="Roboto" charset="0"/>
+                <a:ea typeface="Roboto" charset="0"/>
+                <a:cs typeface="Roboto" charset="0"/>
+              </a:defRPr>
+            </a:lvl8pPr>
+            <a:lvl9pPr marL="1428750" indent="-169863" algn="l" defTabSz="914217" rtl="0" eaLnBrk="1" latinLnBrk="0" hangingPunct="1">
+              <a:lnSpc>
+                <a:spcPct val="90000"/>
+              </a:lnSpc>
+              <a:spcBef>
+                <a:spcPts val="500"/>
+              </a:spcBef>
+              <a:spcAft>
+                <a:spcPts val="1200"/>
+              </a:spcAft>
+              <a:buClr>
+                <a:schemeClr val="accent2"/>
+              </a:buClr>
+              <a:buFont typeface="Arial" panose="020B0604020202020204" pitchFamily="34" charset="0"/>
+              <a:buChar char="•"/>
+              <a:defRPr sz="1200" b="0" i="0" kern="1200">
+                <a:solidFill>
+                  <a:schemeClr val="tx1"/>
+                </a:solidFill>
+                <a:latin typeface="Roboto" charset="0"/>
+                <a:ea typeface="Roboto" charset="0"/>
+                <a:cs typeface="Roboto" charset="0"/>
+              </a:defRPr>
+            </a:lvl9pPr>
+          </a:lstStyle>
+          <a:p>
+            <a:pPr marL="0" indent="0">
+              <a:buNone/>
+            </a:pPr>
+            <a:endParaRPr lang="en-IN" sz="1600" dirty="0"/>
+          </a:p>
+        </p:txBody>
+      </p:sp>
+      <p:sp>
+        <p:nvSpPr>
+          <p:cNvPr id="6" name="TextBox 5">
+            <a:extLst>
+              <a:ext uri="{FF2B5EF4-FFF2-40B4-BE49-F238E27FC236}">
+                <a16:creationId xmlns:a16="http://schemas.microsoft.com/office/drawing/2014/main" id="{9F8FFC18-4FD7-5E97-CCB3-5E13CE612AEB}"/>
+              </a:ext>
+            </a:extLst>
+          </p:cNvPr>
+          <p:cNvSpPr txBox="1"/>
+          <p:nvPr/>
+        </p:nvSpPr>
+        <p:spPr>
+          <a:xfrm>
             <a:off x="848968" y="1157381"/>
             <a:ext cx="10490887" cy="1084519"/>
           </a:xfrm>
@@ -23323,10 +24150,10 @@
       </p:sp>
       <p:pic>
         <p:nvPicPr>
-          <p:cNvPr id="3" name="Picture 2">
+          <p:cNvPr id="4" name="Picture 3">
             <a:extLst>
               <a:ext uri="{FF2B5EF4-FFF2-40B4-BE49-F238E27FC236}">
-                <a16:creationId xmlns:a16="http://schemas.microsoft.com/office/drawing/2014/main" id="{47E2D01D-2582-0BE2-12F0-54EF8F7882EE}"/>
+                <a16:creationId xmlns:a16="http://schemas.microsoft.com/office/drawing/2014/main" id="{11174BFF-3698-BD9E-5E19-7E87FBA82035}"/>
               </a:ext>
             </a:extLst>
           </p:cNvPr>
@@ -23343,12 +24170,93 @@
         </p:blipFill>
         <p:spPr>
           <a:xfrm>
-            <a:off x="1579562" y="2807403"/>
-            <a:ext cx="9029700" cy="3019425"/>
+            <a:off x="349196" y="1997771"/>
+            <a:ext cx="5730866" cy="1981040"/>
           </a:xfrm>
           <a:prstGeom prst="rect">
             <a:avLst/>
           </a:prstGeom>
+          <a:effectLst>
+            <a:outerShdw blurRad="50800" dist="38100" dir="2700000" algn="tl" rotWithShape="0">
+              <a:prstClr val="black">
+                <a:alpha val="40000"/>
+              </a:prstClr>
+            </a:outerShdw>
+          </a:effectLst>
+        </p:spPr>
+      </p:pic>
+      <p:pic>
+        <p:nvPicPr>
+          <p:cNvPr id="8" name="Picture 7">
+            <a:extLst>
+              <a:ext uri="{FF2B5EF4-FFF2-40B4-BE49-F238E27FC236}">
+                <a16:creationId xmlns:a16="http://schemas.microsoft.com/office/drawing/2014/main" id="{A682AC08-AC93-4AC8-0F7D-2CB5B7115056}"/>
+              </a:ext>
+            </a:extLst>
+          </p:cNvPr>
+          <p:cNvPicPr>
+            <a:picLocks noChangeAspect="1"/>
+          </p:cNvPicPr>
+          <p:nvPr/>
+        </p:nvPicPr>
+        <p:blipFill>
+          <a:blip r:embed="rId3"/>
+          <a:stretch>
+            <a:fillRect/>
+          </a:stretch>
+        </p:blipFill>
+        <p:spPr>
+          <a:xfrm>
+            <a:off x="5696357" y="2343074"/>
+            <a:ext cx="6143272" cy="2156351"/>
+          </a:xfrm>
+          <a:prstGeom prst="rect">
+            <a:avLst/>
+          </a:prstGeom>
+          <a:effectLst>
+            <a:outerShdw blurRad="50800" dist="38100" dir="2700000" algn="tl" rotWithShape="0">
+              <a:prstClr val="black">
+                <a:alpha val="40000"/>
+              </a:prstClr>
+            </a:outerShdw>
+          </a:effectLst>
+        </p:spPr>
+      </p:pic>
+      <p:pic>
+        <p:nvPicPr>
+          <p:cNvPr id="10" name="Picture 9">
+            <a:extLst>
+              <a:ext uri="{FF2B5EF4-FFF2-40B4-BE49-F238E27FC236}">
+                <a16:creationId xmlns:a16="http://schemas.microsoft.com/office/drawing/2014/main" id="{B520F4C6-83EA-CC97-13EE-C6565125EFAF}"/>
+              </a:ext>
+            </a:extLst>
+          </p:cNvPr>
+          <p:cNvPicPr>
+            <a:picLocks noChangeAspect="1"/>
+          </p:cNvPicPr>
+          <p:nvPr/>
+        </p:nvPicPr>
+        <p:blipFill>
+          <a:blip r:embed="rId4"/>
+          <a:stretch>
+            <a:fillRect/>
+          </a:stretch>
+        </p:blipFill>
+        <p:spPr>
+          <a:xfrm>
+            <a:off x="1805394" y="4533736"/>
+            <a:ext cx="6962599" cy="1631098"/>
+          </a:xfrm>
+          <a:prstGeom prst="rect">
+            <a:avLst/>
+          </a:prstGeom>
+          <a:effectLst>
+            <a:outerShdw blurRad="50800" dist="38100" dir="2700000" algn="tl" rotWithShape="0">
+              <a:prstClr val="black">
+                <a:alpha val="40000"/>
+              </a:prstClr>
+            </a:outerShdw>
+          </a:effectLst>
         </p:spPr>
       </p:pic>
     </p:spTree>
@@ -23376,7 +24284,7 @@
 </p:sld>
 </file>
 
-<file path=ppt/slides/slide12.xml><?xml version="1.0" encoding="utf-8"?>
+<file path=ppt/slides/slide13.xml><?xml version="1.0" encoding="utf-8"?>
 <p:sld xmlns:a="http://schemas.openxmlformats.org/drawingml/2006/main" xmlns:r="http://schemas.openxmlformats.org/officeDocument/2006/relationships" xmlns:p="http://schemas.openxmlformats.org/presentationml/2006/main">
   <p:cSld>
     <p:spTree>
@@ -32456,6 +33364,53 @@
               <a:ea typeface="Roboto" charset="0"/>
               <a:cs typeface="Courier New" panose="02070309020205020404" pitchFamily="49" charset="0"/>
             </a:endParaRPr>
+          </a:p>
+        </p:txBody>
+      </p:sp>
+      <p:sp>
+        <p:nvSpPr>
+          <p:cNvPr id="7" name="TextBox 6">
+            <a:extLst>
+              <a:ext uri="{FF2B5EF4-FFF2-40B4-BE49-F238E27FC236}">
+                <a16:creationId xmlns:a16="http://schemas.microsoft.com/office/drawing/2014/main" id="{12192CAA-708E-BE2B-81F3-DFE79E0F5C9A}"/>
+              </a:ext>
+            </a:extLst>
+          </p:cNvPr>
+          <p:cNvSpPr txBox="1"/>
+          <p:nvPr/>
+        </p:nvSpPr>
+        <p:spPr>
+          <a:xfrm>
+            <a:off x="1392236" y="3918654"/>
+            <a:ext cx="4744132" cy="927438"/>
+          </a:xfrm>
+          <a:prstGeom prst="rect">
+            <a:avLst/>
+          </a:prstGeom>
+          <a:noFill/>
+        </p:spPr>
+        <p:txBody>
+          <a:bodyPr wrap="square" lIns="0" tIns="0" rIns="0" bIns="0" rtlCol="0">
+            <a:noAutofit/>
+          </a:bodyPr>
+          <a:lstStyle/>
+          <a:p>
+            <a:pPr>
+              <a:lnSpc>
+                <a:spcPct val="90000"/>
+              </a:lnSpc>
+              <a:spcAft>
+                <a:spcPts val="1000"/>
+              </a:spcAft>
+            </a:pPr>
+            <a:r>
+              <a:rPr lang="en-US" sz="1200" i="1" dirty="0">
+                <a:latin typeface="Roboto" charset="0"/>
+                <a:ea typeface="Roboto" charset="0"/>
+                <a:cs typeface="Roboto" charset="0"/>
+              </a:rPr>
+              <a:t>* Note that “Classification Members” is a special token. When the script finds this, it will trigger the extraction, and then use the extraction files to replace the Classification Names with the ids, making it convenient for Entity Classifications</a:t>
+            </a:r>
           </a:p>
         </p:txBody>
       </p:sp>
@@ -33914,6 +34869,15 @@
 </file>
 
 <file path=customXml/item1.xml><?xml version="1.0" encoding="utf-8"?>
+<?mso-contentType ?>
+<FormTemplates xmlns="http://schemas.microsoft.com/sharepoint/v3/contenttype/forms">
+  <Display>DocumentLibraryForm</Display>
+  <Edit>DocumentLibraryForm</Edit>
+  <New>DocumentLibraryForm</New>
+</FormTemplates>
+</file>
+
+<file path=customXml/item2.xml><?xml version="1.0" encoding="utf-8"?>
 <ct:contentTypeSchema xmlns:ct="http://schemas.microsoft.com/office/2006/metadata/contentType" xmlns:ma="http://schemas.microsoft.com/office/2006/metadata/properties/metaAttributes" ct:_="" ma:_="" ma:contentTypeName="Document" ma:contentTypeID="0x0101008F469B9DDCB7884E95DD88D1FAB455BB" ma:contentTypeVersion="4" ma:contentTypeDescription="Create a new document." ma:contentTypeScope="" ma:versionID="2af74787b6fa7b67583c56dc5776735d">
   <xsd:schema xmlns:xsd="http://www.w3.org/2001/XMLSchema" xmlns:xs="http://www.w3.org/2001/XMLSchema" xmlns:p="http://schemas.microsoft.com/office/2006/metadata/properties" xmlns:ns2="d7abb67f-8ba3-4629-af4a-9ad47f056db5" targetNamespace="http://schemas.microsoft.com/office/2006/metadata/properties" ma:root="true" ma:fieldsID="03e5ccd49f08cdc976c4df5b8baab980" ns2:_="">
     <xsd:import namespace="d7abb67f-8ba3-4629-af4a-9ad47f056db5"/>
@@ -34059,16 +35023,15 @@
 </ct:contentTypeSchema>
 </file>
 
-<file path=customXml/item2.xml><?xml version="1.0" encoding="utf-8"?>
-<?mso-contentType ?>
-<FormTemplates xmlns="http://schemas.microsoft.com/sharepoint/v3/contenttype/forms">
-  <Display>DocumentLibraryForm</Display>
-  <Edit>DocumentLibraryForm</Edit>
-  <New>DocumentLibraryForm</New>
-</FormTemplates>
+<file path=customXml/itemProps1.xml><?xml version="1.0" encoding="utf-8"?>
+<ds:datastoreItem xmlns:ds="http://schemas.openxmlformats.org/officeDocument/2006/customXml" ds:itemID="{0FFC13DC-9E91-480E-AA50-E69DFCF153D3}">
+  <ds:schemaRefs>
+    <ds:schemaRef ds:uri="http://schemas.microsoft.com/sharepoint/v3/contenttype/forms"/>
+  </ds:schemaRefs>
+</ds:datastoreItem>
 </file>
 
-<file path=customXml/itemProps1.xml><?xml version="1.0" encoding="utf-8"?>
+<file path=customXml/itemProps2.xml><?xml version="1.0" encoding="utf-8"?>
 <ds:datastoreItem xmlns:ds="http://schemas.openxmlformats.org/officeDocument/2006/customXml" ds:itemID="{5CA5433E-CDB9-440C-BB77-1799205ED86D}">
   <ds:schemaRefs>
     <ds:schemaRef ds:uri="d7abb67f-8ba3-4629-af4a-9ad47f056db5"/>
@@ -34084,12 +35047,4 @@
     <ds:schemaRef ds:uri="http://www.w3.org/2001/XMLSchema"/>
   </ds:schemaRefs>
 </ds:datastoreItem>
-</file>
-
-<file path=customXml/itemProps2.xml><?xml version="1.0" encoding="utf-8"?>
-<ds:datastoreItem xmlns:ds="http://schemas.openxmlformats.org/officeDocument/2006/customXml" ds:itemID="{0FFC13DC-9E91-480E-AA50-E69DFCF153D3}">
-  <ds:schemaRefs>
-    <ds:schemaRef ds:uri="http://schemas.microsoft.com/sharepoint/v3/contenttype/forms"/>
-  </ds:schemaRefs>
-</ds:datastoreItem>
 </file>
</xml_diff>

<commit_message>
Version 20241119 Fixed issue with payload filenames. Not script will name files replacing special characters Also added option to use ~/informatica_cdgc/credentials.json file.
</commit_message>
<xml_diff>
--- a/Simple Classification Creator.pptx
+++ b/Simple Classification Creator.pptx
@@ -335,7 +335,7 @@
           <a:p>
             <a:fld id="{A8AF0ABA-1503-4581-BC5A-AF3D56D7DD45}" type="datetimeFigureOut">
               <a:rPr lang="en-US" smtClean="0"/>
-              <a:t>11/8/2024</a:t>
+              <a:t>11/19/2024</a:t>
             </a:fld>
             <a:endParaRPr lang="en-US"/>
           </a:p>
@@ -500,7 +500,7 @@
           <a:p>
             <a:fld id="{78186FDC-CD1E-4E7E-B1CD-1CBCCD519E8C}" type="datetimeFigureOut">
               <a:rPr lang="en-US" smtClean="0"/>
-              <a:t>11/8/2024</a:t>
+              <a:t>11/19/2024</a:t>
             </a:fld>
             <a:endParaRPr lang="en-US"/>
           </a:p>
@@ -23378,7 +23378,7 @@
               <a:buChar char="•"/>
             </a:pPr>
             <a:r>
-              <a:rPr lang="en-US" sz="1500" dirty="0">
+              <a:rPr lang="en-US" sz="1100" dirty="0">
                 <a:latin typeface="Roboto" charset="0"/>
                 <a:ea typeface="Roboto" charset="0"/>
                 <a:cs typeface="Roboto" charset="0"/>
@@ -23398,7 +23398,7 @@
               <a:buChar char="•"/>
             </a:pPr>
             <a:r>
-              <a:rPr lang="en-US" sz="1500" dirty="0" err="1">
+              <a:rPr lang="en-US" sz="1100" dirty="0" err="1">
                 <a:latin typeface="Roboto" charset="0"/>
                 <a:ea typeface="Roboto" charset="0"/>
                 <a:cs typeface="Roboto" charset="0"/>
@@ -23406,7 +23406,7 @@
               <a:t>json</a:t>
             </a:r>
             <a:r>
-              <a:rPr lang="en-US" sz="1500" dirty="0">
+              <a:rPr lang="en-US" sz="1100" dirty="0">
                 <a:latin typeface="Roboto" charset="0"/>
                 <a:ea typeface="Roboto" charset="0"/>
                 <a:cs typeface="Roboto" charset="0"/>
@@ -23426,7 +23426,7 @@
               <a:buChar char="•"/>
             </a:pPr>
             <a:r>
-              <a:rPr lang="en-US" sz="1500" dirty="0">
+              <a:rPr lang="en-US" sz="1100" dirty="0">
                 <a:latin typeface="Roboto" charset="0"/>
                 <a:ea typeface="Roboto" charset="0"/>
                 <a:cs typeface="Roboto" charset="0"/>
@@ -23446,7 +23446,7 @@
               <a:buChar char="•"/>
             </a:pPr>
             <a:r>
-              <a:rPr lang="en-US" sz="1500" dirty="0">
+              <a:rPr lang="en-US" sz="1100" dirty="0">
                 <a:latin typeface="Roboto" charset="0"/>
                 <a:ea typeface="Roboto" charset="0"/>
                 <a:cs typeface="Roboto" charset="0"/>
@@ -23466,7 +23466,7 @@
               <a:buChar char="•"/>
             </a:pPr>
             <a:r>
-              <a:rPr lang="en-US" sz="1500" i="1" dirty="0" err="1">
+              <a:rPr lang="en-US" sz="1100" i="1" dirty="0" err="1">
                 <a:latin typeface="Roboto" charset="0"/>
                 <a:ea typeface="Roboto" charset="0"/>
                 <a:cs typeface="Roboto" charset="0"/>
@@ -23474,7 +23474,7 @@
               <a:t>default_pod</a:t>
             </a:r>
             <a:r>
-              <a:rPr lang="en-US" sz="1500" dirty="0">
+              <a:rPr lang="en-US" sz="1100" dirty="0">
                 <a:latin typeface="Roboto" charset="0"/>
                 <a:ea typeface="Roboto" charset="0"/>
                 <a:cs typeface="Roboto" charset="0"/>
@@ -23494,7 +23494,7 @@
               <a:buChar char="•"/>
             </a:pPr>
             <a:r>
-              <a:rPr lang="en-US" sz="1500" i="1" dirty="0" err="1">
+              <a:rPr lang="en-US" sz="1100" i="1" dirty="0" err="1">
                 <a:latin typeface="Roboto" charset="0"/>
                 <a:ea typeface="Roboto" charset="0"/>
                 <a:cs typeface="Roboto" charset="0"/>
@@ -23502,7 +23502,7 @@
               <a:t>default_user</a:t>
             </a:r>
             <a:r>
-              <a:rPr lang="en-US" sz="1500" dirty="0">
+              <a:rPr lang="en-US" sz="1100" dirty="0">
                 <a:latin typeface="Roboto" charset="0"/>
                 <a:ea typeface="Roboto" charset="0"/>
                 <a:cs typeface="Roboto" charset="0"/>
@@ -23510,14 +23510,14 @@
               <a:t>. Set this to the default user to use. Example: </a:t>
             </a:r>
             <a:r>
-              <a:rPr lang="en-US" sz="1500" dirty="0" err="1">
+              <a:rPr lang="en-US" sz="1100" dirty="0" err="1">
                 <a:latin typeface="Roboto" charset="0"/>
                 <a:ea typeface="Roboto" charset="0"/>
                 <a:cs typeface="Roboto" charset="0"/>
               </a:rPr>
               <a:t>shayes_compass</a:t>
             </a:r>
-            <a:endParaRPr lang="en-US" sz="1500" dirty="0">
+            <a:endParaRPr lang="en-US" sz="1100" dirty="0">
               <a:latin typeface="Roboto" charset="0"/>
               <a:ea typeface="Roboto" charset="0"/>
               <a:cs typeface="Roboto" charset="0"/>
@@ -23535,7 +23535,7 @@
               <a:buChar char="•"/>
             </a:pPr>
             <a:r>
-              <a:rPr lang="en-US" sz="1500" i="1" dirty="0" err="1">
+              <a:rPr lang="en-US" sz="1100" i="1" dirty="0" err="1">
                 <a:latin typeface="Roboto" charset="0"/>
                 <a:ea typeface="Roboto" charset="0"/>
                 <a:cs typeface="Roboto" charset="0"/>
@@ -23543,7 +23543,7 @@
               <a:t>default_pwd</a:t>
             </a:r>
             <a:r>
-              <a:rPr lang="en-US" sz="1500" i="1" dirty="0">
+              <a:rPr lang="en-US" sz="1100" i="1" dirty="0">
                 <a:latin typeface="Roboto" charset="0"/>
                 <a:ea typeface="Roboto" charset="0"/>
                 <a:cs typeface="Roboto" charset="0"/>
@@ -23551,7 +23551,7 @@
               <a:t>. </a:t>
             </a:r>
             <a:r>
-              <a:rPr lang="en-US" sz="1500" dirty="0">
+              <a:rPr lang="en-US" sz="1100" dirty="0">
                 <a:latin typeface="Roboto" charset="0"/>
                 <a:ea typeface="Roboto" charset="0"/>
                 <a:cs typeface="Roboto" charset="0"/>
@@ -23570,7 +23570,7 @@
               <a:buFont typeface="Arial" panose="020B0604020202020204" pitchFamily="34" charset="0"/>
               <a:buChar char="•"/>
             </a:pPr>
-            <a:endParaRPr lang="en-US" sz="1500" dirty="0">
+            <a:endParaRPr lang="en-US" sz="1100" dirty="0">
               <a:latin typeface="Roboto" charset="0"/>
               <a:ea typeface="Roboto" charset="0"/>
               <a:cs typeface="Roboto" charset="0"/>
@@ -23588,7 +23588,7 @@
               <a:buChar char="•"/>
             </a:pPr>
             <a:r>
-              <a:rPr lang="en-US" sz="1500" i="1" dirty="0" err="1">
+              <a:rPr lang="en-US" sz="1100" i="1" dirty="0" err="1">
                 <a:latin typeface="Roboto" charset="0"/>
                 <a:ea typeface="Roboto" charset="0"/>
                 <a:cs typeface="Roboto" charset="0"/>
@@ -23596,7 +23596,7 @@
               <a:t>prompt_for_login_info</a:t>
             </a:r>
             <a:r>
-              <a:rPr lang="en-US" sz="1500" dirty="0">
+              <a:rPr lang="en-US" sz="1100" dirty="0">
                 <a:latin typeface="Roboto" charset="0"/>
                 <a:ea typeface="Roboto" charset="0"/>
                 <a:cs typeface="Roboto" charset="0"/>
@@ -23616,7 +23616,7 @@
               <a:buChar char="•"/>
             </a:pPr>
             <a:r>
-              <a:rPr lang="en-US" sz="1500" i="1" dirty="0" err="1">
+              <a:rPr lang="en-US" sz="1100" i="1" dirty="0" err="1">
                 <a:latin typeface="Roboto" charset="0"/>
                 <a:ea typeface="Roboto" charset="0"/>
                 <a:cs typeface="Roboto" charset="0"/>
@@ -23624,7 +23624,7 @@
               <a:t>pause_before_loading</a:t>
             </a:r>
             <a:r>
-              <a:rPr lang="en-US" sz="1500" i="1" dirty="0">
+              <a:rPr lang="en-US" sz="1100" i="1" dirty="0">
                 <a:latin typeface="Roboto" charset="0"/>
                 <a:ea typeface="Roboto" charset="0"/>
                 <a:cs typeface="Roboto" charset="0"/>
@@ -23632,7 +23632,7 @@
               <a:t>. </a:t>
             </a:r>
             <a:r>
-              <a:rPr lang="en-US" sz="1500" dirty="0">
+              <a:rPr lang="en-US" sz="1100" dirty="0">
                 <a:latin typeface="Roboto" charset="0"/>
                 <a:ea typeface="Roboto" charset="0"/>
                 <a:cs typeface="Roboto" charset="0"/>
@@ -23652,7 +23652,7 @@
               <a:buChar char="•"/>
             </a:pPr>
             <a:r>
-              <a:rPr lang="en-US" sz="1500" i="1" dirty="0" err="1">
+              <a:rPr lang="en-US" sz="1100" i="1" dirty="0" err="1">
                 <a:latin typeface="Roboto" charset="0"/>
                 <a:ea typeface="Roboto" charset="0"/>
                 <a:cs typeface="Roboto" charset="0"/>
@@ -23660,7 +23660,7 @@
               <a:t>create_payloads_only</a:t>
             </a:r>
             <a:r>
-              <a:rPr lang="en-US" sz="1500" i="1" dirty="0">
+              <a:rPr lang="en-US" sz="1100" i="1" dirty="0">
                 <a:latin typeface="Roboto" charset="0"/>
                 <a:ea typeface="Roboto" charset="0"/>
                 <a:cs typeface="Roboto" charset="0"/>
@@ -23668,7 +23668,7 @@
               <a:t>. </a:t>
             </a:r>
             <a:r>
-              <a:rPr lang="en-US" sz="1500" dirty="0">
+              <a:rPr lang="en-US" sz="1100" dirty="0">
                 <a:latin typeface="Roboto" charset="0"/>
                 <a:ea typeface="Roboto" charset="0"/>
                 <a:cs typeface="Roboto" charset="0"/>
@@ -23688,7 +23688,7 @@
               <a:buChar char="•"/>
             </a:pPr>
             <a:r>
-              <a:rPr lang="en-US" sz="1500" i="1" dirty="0" err="1">
+              <a:rPr lang="en-US" sz="1100" i="1" dirty="0" err="1">
                 <a:latin typeface="Roboto" charset="0"/>
                 <a:ea typeface="Roboto" charset="0"/>
                 <a:cs typeface="Roboto" charset="0"/>
@@ -23696,7 +23696,7 @@
               <a:t>when_extracting_fetch_details</a:t>
             </a:r>
             <a:r>
-              <a:rPr lang="en-US" sz="1500" i="1" dirty="0">
+              <a:rPr lang="en-US" sz="1100" i="1" dirty="0">
                 <a:latin typeface="Roboto" charset="0"/>
                 <a:ea typeface="Roboto" charset="0"/>
                 <a:cs typeface="Roboto" charset="0"/>
@@ -23704,7 +23704,7 @@
               <a:t>. </a:t>
             </a:r>
             <a:r>
-              <a:rPr lang="en-US" sz="1500" dirty="0">
+              <a:rPr lang="en-US" sz="1100" dirty="0">
                 <a:latin typeface="Roboto" charset="0"/>
                 <a:ea typeface="Roboto" charset="0"/>
                 <a:cs typeface="Roboto" charset="0"/>
@@ -23724,7 +23724,7 @@
               <a:buChar char="•"/>
             </a:pPr>
             <a:r>
-              <a:rPr lang="en-US" sz="1500" i="1" dirty="0" err="1">
+              <a:rPr lang="en-US" sz="1100" i="1" dirty="0" err="1">
                 <a:latin typeface="Roboto" charset="0"/>
                 <a:ea typeface="Roboto" charset="0"/>
                 <a:cs typeface="Roboto" charset="0"/>
@@ -23732,13 +23732,115 @@
               <a:t>show_raw_errors</a:t>
             </a:r>
             <a:r>
-              <a:rPr lang="en-US" sz="1500" dirty="0">
+              <a:rPr lang="en-US" sz="1100" dirty="0">
                 <a:latin typeface="Roboto" charset="0"/>
                 <a:ea typeface="Roboto" charset="0"/>
                 <a:cs typeface="Roboto" charset="0"/>
               </a:rPr>
               <a:t>. True/False. If set to True, it will always show raw errors if they occur. Otherwise, it will attempt to find the message from the error, and display that.</a:t>
             </a:r>
+          </a:p>
+          <a:p>
+            <a:pPr marL="742950" lvl="1" indent="-285750">
+              <a:lnSpc>
+                <a:spcPct val="90000"/>
+              </a:lnSpc>
+              <a:spcAft>
+                <a:spcPts val="1000"/>
+              </a:spcAft>
+              <a:buFont typeface="Arial" panose="020B0604020202020204" pitchFamily="34" charset="0"/>
+              <a:buChar char="•"/>
+            </a:pPr>
+            <a:r>
+              <a:rPr lang="en-US" sz="1100" dirty="0">
+                <a:latin typeface="Roboto" charset="0"/>
+                <a:ea typeface="Roboto" charset="0"/>
+                <a:cs typeface="Roboto" charset="0"/>
+              </a:rPr>
+              <a:t>If desired, you can create a </a:t>
+            </a:r>
+            <a:r>
+              <a:rPr lang="en-US" sz="1100" dirty="0" err="1">
+                <a:latin typeface="Roboto" charset="0"/>
+                <a:ea typeface="Roboto" charset="0"/>
+                <a:cs typeface="Roboto" charset="0"/>
+              </a:rPr>
+              <a:t>credentials.json</a:t>
+            </a:r>
+            <a:r>
+              <a:rPr lang="en-US" sz="1100" dirty="0">
+                <a:latin typeface="Roboto" charset="0"/>
+                <a:ea typeface="Roboto" charset="0"/>
+                <a:cs typeface="Roboto" charset="0"/>
+              </a:rPr>
+              <a:t> to save your defaults in ~/.</a:t>
+            </a:r>
+            <a:r>
+              <a:rPr lang="en-US" sz="1100" dirty="0" err="1">
+                <a:latin typeface="Roboto" charset="0"/>
+                <a:ea typeface="Roboto" charset="0"/>
+                <a:cs typeface="Roboto" charset="0"/>
+              </a:rPr>
+              <a:t>informatica_cdgc</a:t>
+            </a:r>
+            <a:r>
+              <a:rPr lang="en-US" sz="1100" dirty="0">
+                <a:latin typeface="Roboto" charset="0"/>
+                <a:ea typeface="Roboto" charset="0"/>
+                <a:cs typeface="Roboto" charset="0"/>
+              </a:rPr>
+              <a:t> path (c:\users\&lt;username&gt;\.</a:t>
+            </a:r>
+            <a:r>
+              <a:rPr lang="en-US" sz="1100" dirty="0" err="1">
+                <a:latin typeface="Roboto" charset="0"/>
+                <a:ea typeface="Roboto" charset="0"/>
+                <a:cs typeface="Roboto" charset="0"/>
+              </a:rPr>
+              <a:t>informatica_cdgc</a:t>
+            </a:r>
+            <a:r>
+              <a:rPr lang="en-US" sz="1100" dirty="0">
+                <a:latin typeface="Roboto" charset="0"/>
+                <a:ea typeface="Roboto" charset="0"/>
+                <a:cs typeface="Roboto" charset="0"/>
+              </a:rPr>
+              <a:t>). Example of that file is:</a:t>
+            </a:r>
+          </a:p>
+          <a:p>
+            <a:pPr marL="742950" lvl="1" indent="-285750">
+              <a:lnSpc>
+                <a:spcPct val="90000"/>
+              </a:lnSpc>
+              <a:spcAft>
+                <a:spcPts val="1000"/>
+              </a:spcAft>
+              <a:buFont typeface="Arial" panose="020B0604020202020204" pitchFamily="34" charset="0"/>
+              <a:buChar char="•"/>
+            </a:pPr>
+            <a:endParaRPr lang="en-US" sz="1100" dirty="0">
+              <a:latin typeface="Roboto" charset="0"/>
+              <a:ea typeface="Roboto" charset="0"/>
+              <a:cs typeface="Roboto" charset="0"/>
+            </a:endParaRPr>
+          </a:p>
+          <a:p>
+            <a:pPr marL="742950" lvl="1" indent="-285750">
+              <a:lnSpc>
+                <a:spcPct val="90000"/>
+              </a:lnSpc>
+              <a:spcAft>
+                <a:spcPts val="1000"/>
+              </a:spcAft>
+              <a:buFont typeface="Arial" panose="020B0604020202020204" pitchFamily="34" charset="0"/>
+              <a:buChar char="•"/>
+            </a:pPr>
+            <a:endParaRPr lang="en-US" sz="1100" dirty="0">
+              <a:latin typeface="Roboto" charset="0"/>
+              <a:ea typeface="Roboto" charset="0"/>
+              <a:cs typeface="Roboto" charset="0"/>
+            </a:endParaRPr>
           </a:p>
           <a:p>
             <a:pPr>
@@ -23749,7 +23851,7 @@
                 <a:spcPts val="1000"/>
               </a:spcAft>
             </a:pPr>
-            <a:endParaRPr lang="en-US" sz="1500" dirty="0">
+            <a:endParaRPr lang="en-US" sz="1100" dirty="0">
               <a:latin typeface="Roboto" charset="0"/>
               <a:ea typeface="Roboto" charset="0"/>
               <a:cs typeface="Roboto" charset="0"/>
@@ -23757,6 +23859,182 @@
           </a:p>
         </p:txBody>
       </p:sp>
+      <p:graphicFrame>
+        <p:nvGraphicFramePr>
+          <p:cNvPr id="2" name="Table 1">
+            <a:extLst>
+              <a:ext uri="{FF2B5EF4-FFF2-40B4-BE49-F238E27FC236}">
+                <a16:creationId xmlns:a16="http://schemas.microsoft.com/office/drawing/2014/main" id="{2C12D988-695F-F511-A501-77C760F566B9}"/>
+              </a:ext>
+            </a:extLst>
+          </p:cNvPr>
+          <p:cNvGraphicFramePr>
+            <a:graphicFrameLocks noGrp="1"/>
+          </p:cNvGraphicFramePr>
+          <p:nvPr>
+            <p:extLst>
+              <p:ext uri="{D42A27DB-BD31-4B8C-83A1-F6EECF244321}">
+                <p14:modId xmlns:p14="http://schemas.microsoft.com/office/powerpoint/2010/main" val="1348752398"/>
+              </p:ext>
+            </p:extLst>
+          </p:nvPr>
+        </p:nvGraphicFramePr>
+        <p:xfrm>
+          <a:off x="1525698" y="4891622"/>
+          <a:ext cx="4340020" cy="853440"/>
+        </p:xfrm>
+        <a:graphic>
+          <a:graphicData uri="http://schemas.openxmlformats.org/drawingml/2006/table">
+            <a:tbl>
+              <a:tblPr firstRow="1" bandRow="1">
+                <a:tableStyleId>{5C22544A-7EE6-4342-B048-85BDC9FD1C3A}</a:tableStyleId>
+              </a:tblPr>
+              <a:tblGrid>
+                <a:gridCol w="4340020">
+                  <a:extLst>
+                    <a:ext uri="{9D8B030D-6E8A-4147-A177-3AD203B41FA5}">
+                      <a16:colId xmlns:a16="http://schemas.microsoft.com/office/drawing/2014/main" val="2725794101"/>
+                    </a:ext>
+                  </a:extLst>
+                </a:gridCol>
+              </a:tblGrid>
+              <a:tr h="370840">
+                <a:tc>
+                  <a:txBody>
+                    <a:bodyPr/>
+                    <a:lstStyle/>
+                    <a:p>
+                      <a:r>
+                        <a:rPr lang="en-US" sz="1000" dirty="0">
+                          <a:latin typeface="Courier New" panose="02070309020205020404" pitchFamily="49" charset="0"/>
+                          <a:cs typeface="Courier New" panose="02070309020205020404" pitchFamily="49" charset="0"/>
+                        </a:rPr>
+                        <a:t>{</a:t>
+                      </a:r>
+                    </a:p>
+                    <a:p>
+                      <a:r>
+                        <a:rPr lang="en-US" sz="1000" dirty="0">
+                          <a:latin typeface="Courier New" panose="02070309020205020404" pitchFamily="49" charset="0"/>
+                          <a:cs typeface="Courier New" panose="02070309020205020404" pitchFamily="49" charset="0"/>
+                        </a:rPr>
+                        <a:t>    "</a:t>
+                      </a:r>
+                      <a:r>
+                        <a:rPr lang="en-US" sz="1000" dirty="0" err="1">
+                          <a:latin typeface="Courier New" panose="02070309020205020404" pitchFamily="49" charset="0"/>
+                          <a:cs typeface="Courier New" panose="02070309020205020404" pitchFamily="49" charset="0"/>
+                        </a:rPr>
+                        <a:t>default_pod</a:t>
+                      </a:r>
+                      <a:r>
+                        <a:rPr lang="en-US" sz="1000" dirty="0">
+                          <a:latin typeface="Courier New" panose="02070309020205020404" pitchFamily="49" charset="0"/>
+                          <a:cs typeface="Courier New" panose="02070309020205020404" pitchFamily="49" charset="0"/>
+                        </a:rPr>
+                        <a:t>": "</a:t>
+                      </a:r>
+                      <a:r>
+                        <a:rPr lang="en-US" sz="1000" dirty="0" err="1">
+                          <a:latin typeface="Courier New" panose="02070309020205020404" pitchFamily="49" charset="0"/>
+                          <a:cs typeface="Courier New" panose="02070309020205020404" pitchFamily="49" charset="0"/>
+                        </a:rPr>
+                        <a:t>dmp</a:t>
+                      </a:r>
+                      <a:r>
+                        <a:rPr lang="en-US" sz="1000" dirty="0">
+                          <a:latin typeface="Courier New" panose="02070309020205020404" pitchFamily="49" charset="0"/>
+                          <a:cs typeface="Courier New" panose="02070309020205020404" pitchFamily="49" charset="0"/>
+                        </a:rPr>
+                        <a:t>-us",</a:t>
+                      </a:r>
+                    </a:p>
+                    <a:p>
+                      <a:r>
+                        <a:rPr lang="en-US" sz="1000" dirty="0">
+                          <a:latin typeface="Courier New" panose="02070309020205020404" pitchFamily="49" charset="0"/>
+                          <a:cs typeface="Courier New" panose="02070309020205020404" pitchFamily="49" charset="0"/>
+                        </a:rPr>
+                        <a:t>    "</a:t>
+                      </a:r>
+                      <a:r>
+                        <a:rPr lang="en-US" sz="1000" dirty="0" err="1">
+                          <a:latin typeface="Courier New" panose="02070309020205020404" pitchFamily="49" charset="0"/>
+                          <a:cs typeface="Courier New" panose="02070309020205020404" pitchFamily="49" charset="0"/>
+                        </a:rPr>
+                        <a:t>default_user</a:t>
+                      </a:r>
+                      <a:r>
+                        <a:rPr lang="en-US" sz="1000" dirty="0">
+                          <a:latin typeface="Courier New" panose="02070309020205020404" pitchFamily="49" charset="0"/>
+                          <a:cs typeface="Courier New" panose="02070309020205020404" pitchFamily="49" charset="0"/>
+                        </a:rPr>
+                        <a:t>": "</a:t>
+                      </a:r>
+                      <a:r>
+                        <a:rPr lang="en-US" sz="1000" dirty="0" err="1">
+                          <a:latin typeface="Courier New" panose="02070309020205020404" pitchFamily="49" charset="0"/>
+                          <a:cs typeface="Courier New" panose="02070309020205020404" pitchFamily="49" charset="0"/>
+                        </a:rPr>
+                        <a:t>shayes_compass</a:t>
+                      </a:r>
+                      <a:r>
+                        <a:rPr lang="en-US" sz="1000" dirty="0">
+                          <a:latin typeface="Courier New" panose="02070309020205020404" pitchFamily="49" charset="0"/>
+                          <a:cs typeface="Courier New" panose="02070309020205020404" pitchFamily="49" charset="0"/>
+                        </a:rPr>
+                        <a:t>",</a:t>
+                      </a:r>
+                    </a:p>
+                    <a:p>
+                      <a:r>
+                        <a:rPr lang="en-US" sz="1000" dirty="0">
+                          <a:latin typeface="Courier New" panose="02070309020205020404" pitchFamily="49" charset="0"/>
+                          <a:cs typeface="Courier New" panose="02070309020205020404" pitchFamily="49" charset="0"/>
+                        </a:rPr>
+                        <a:t>    "</a:t>
+                      </a:r>
+                      <a:r>
+                        <a:rPr lang="en-US" sz="1000" dirty="0" err="1">
+                          <a:latin typeface="Courier New" panose="02070309020205020404" pitchFamily="49" charset="0"/>
+                          <a:cs typeface="Courier New" panose="02070309020205020404" pitchFamily="49" charset="0"/>
+                        </a:rPr>
+                        <a:t>default_pwd</a:t>
+                      </a:r>
+                      <a:r>
+                        <a:rPr lang="en-US" sz="1000" dirty="0">
+                          <a:latin typeface="Courier New" panose="02070309020205020404" pitchFamily="49" charset="0"/>
+                          <a:cs typeface="Courier New" panose="02070309020205020404" pitchFamily="49" charset="0"/>
+                        </a:rPr>
+                        <a:t>": “xxx"        </a:t>
+                      </a:r>
+                    </a:p>
+                    <a:p>
+                      <a:r>
+                        <a:rPr lang="en-US" sz="1000" dirty="0">
+                          <a:latin typeface="Courier New" panose="02070309020205020404" pitchFamily="49" charset="0"/>
+                          <a:cs typeface="Courier New" panose="02070309020205020404" pitchFamily="49" charset="0"/>
+                        </a:rPr>
+                        <a:t>}</a:t>
+                      </a:r>
+                    </a:p>
+                  </a:txBody>
+                  <a:tcPr>
+                    <a:solidFill>
+                      <a:schemeClr val="tx1"/>
+                    </a:solidFill>
+                  </a:tcPr>
+                </a:tc>
+                <a:extLst>
+                  <a:ext uri="{0D108BD9-81ED-4DB2-BD59-A6C34878D82A}">
+                    <a16:rowId xmlns:a16="http://schemas.microsoft.com/office/drawing/2014/main" val="3942343172"/>
+                  </a:ext>
+                </a:extLst>
+              </a:tr>
+            </a:tbl>
+          </a:graphicData>
+        </a:graphic>
+      </p:graphicFrame>
     </p:spTree>
     <p:extLst>
       <p:ext uri="{BB962C8B-B14F-4D97-AF65-F5344CB8AC3E}">
@@ -35047,4 +35325,10 @@
     <ds:schemaRef ds:uri="http://www.w3.org/2001/XMLSchema"/>
   </ds:schemaRefs>
 </ds:datastoreItem>
+</file>
+
+<file path=docMetadata/LabelInfo.xml><?xml version="1.0" encoding="utf-8"?>
+<clbl:labelList xmlns:clbl="http://schemas.microsoft.com/office/2020/mipLabelMetadata">
+  <clbl:label id="{14c8150c-bc7e-4d77-82d5-2d0905f0cd74}" enabled="1" method="Standard" siteId="{2638f43e-f77d-4fc7-ab92-7b753b7876fd}" contentBits="0" removed="0"/>
+</clbl:labelList>
 </file>
</xml_diff>

<commit_message>
Version 20241125 Included use of credentials file. Included prompt for config csv file
</commit_message>
<xml_diff>
--- a/Simple Classification Creator.pptx
+++ b/Simple Classification Creator.pptx
@@ -335,7 +335,7 @@
           <a:p>
             <a:fld id="{A8AF0ABA-1503-4581-BC5A-AF3D56D7DD45}" type="datetimeFigureOut">
               <a:rPr lang="en-US" smtClean="0"/>
-              <a:t>11/19/2024</a:t>
+              <a:t>11/26/2024</a:t>
             </a:fld>
             <a:endParaRPr lang="en-US"/>
           </a:p>
@@ -500,7 +500,7 @@
           <a:p>
             <a:fld id="{78186FDC-CD1E-4E7E-B1CD-1CBCCD519E8C}" type="datetimeFigureOut">
               <a:rPr lang="en-US" smtClean="0"/>
-              <a:t>11/19/2024</a:t>
+              <a:t>11/26/2024</a:t>
             </a:fld>
             <a:endParaRPr lang="en-US"/>
           </a:p>
@@ -22928,14 +22928,14 @@
           <p:nvPr>
             <p:extLst>
               <p:ext uri="{D42A27DB-BD31-4B8C-83A1-F6EECF244321}">
-                <p14:modId xmlns:p14="http://schemas.microsoft.com/office/powerpoint/2010/main" val="1641305193"/>
+                <p14:modId xmlns:p14="http://schemas.microsoft.com/office/powerpoint/2010/main" val="1913922885"/>
               </p:ext>
             </p:extLst>
           </p:nvPr>
         </p:nvGraphicFramePr>
         <p:xfrm>
           <a:off x="1546049" y="3728998"/>
-          <a:ext cx="6445588" cy="640080"/>
+          <a:ext cx="6445588" cy="822960"/>
         </p:xfrm>
         <a:graphic>
           <a:graphicData uri="http://schemas.openxmlformats.org/drawingml/2006/table">
@@ -22990,6 +22990,32 @@
                           <a:cs typeface="Courier New" panose="02070309020205020404" pitchFamily="49" charset="0"/>
                         </a:rPr>
                         <a:t>python simple_classification_creator.py delete my_delete_file.csv</a:t>
+                      </a:r>
+                    </a:p>
+                    <a:p>
+                      <a:pPr marL="0" marR="0" lvl="0" indent="0" algn="l" defTabSz="914217" rtl="0" eaLnBrk="1" fontAlgn="auto" latinLnBrk="0" hangingPunct="1">
+                        <a:lnSpc>
+                          <a:spcPct val="100000"/>
+                        </a:lnSpc>
+                        <a:spcBef>
+                          <a:spcPts val="0"/>
+                        </a:spcBef>
+                        <a:spcAft>
+                          <a:spcPts val="0"/>
+                        </a:spcAft>
+                        <a:buClrTx/>
+                        <a:buSzTx/>
+                        <a:buFontTx/>
+                        <a:buNone/>
+                        <a:tabLst/>
+                        <a:defRPr/>
+                      </a:pPr>
+                      <a:r>
+                        <a:rPr lang="en-US" sz="1200" dirty="0">
+                          <a:latin typeface="Courier New" panose="02070309020205020404" pitchFamily="49" charset="0"/>
+                          <a:cs typeface="Courier New" panose="02070309020205020404" pitchFamily="49" charset="0"/>
+                        </a:rPr>
+                        <a:t>simple_classification_creator.exe delete</a:t>
                       </a:r>
                     </a:p>
                     <a:p>
@@ -23353,8 +23379,8 @@
         </p:nvSpPr>
         <p:spPr>
           <a:xfrm>
-            <a:off x="708454" y="1051480"/>
-            <a:ext cx="11195177" cy="5412215"/>
+            <a:off x="708455" y="1051480"/>
+            <a:ext cx="8470270" cy="5412215"/>
           </a:xfrm>
           <a:prstGeom prst="rect">
             <a:avLst/>
@@ -23366,6 +23392,26 @@
             <a:noAutofit/>
           </a:bodyPr>
           <a:lstStyle/>
+          <a:p>
+            <a:pPr marL="342900" indent="-342900">
+              <a:lnSpc>
+                <a:spcPct val="90000"/>
+              </a:lnSpc>
+              <a:spcAft>
+                <a:spcPts val="1000"/>
+              </a:spcAft>
+              <a:buFont typeface="Arial" panose="020B0604020202020204" pitchFamily="34" charset="0"/>
+              <a:buChar char="•"/>
+            </a:pPr>
+            <a:r>
+              <a:rPr lang="en-US" sz="1100" dirty="0">
+                <a:latin typeface="Roboto" charset="0"/>
+                <a:ea typeface="Roboto" charset="0"/>
+                <a:cs typeface="Roboto" charset="0"/>
+              </a:rPr>
+              <a:t>You will be prompted to choose a csv file to use for configuration</a:t>
+            </a:r>
+          </a:p>
           <a:p>
             <a:pPr marL="342900" indent="-342900">
               <a:lnSpc>
@@ -23757,23 +23803,7 @@
                 <a:ea typeface="Roboto" charset="0"/>
                 <a:cs typeface="Roboto" charset="0"/>
               </a:rPr>
-              <a:t>If desired, you can create a </a:t>
-            </a:r>
-            <a:r>
-              <a:rPr lang="en-US" sz="1100" dirty="0" err="1">
-                <a:latin typeface="Roboto" charset="0"/>
-                <a:ea typeface="Roboto" charset="0"/>
-                <a:cs typeface="Roboto" charset="0"/>
-              </a:rPr>
-              <a:t>credentials.json</a:t>
-            </a:r>
-            <a:r>
-              <a:rPr lang="en-US" sz="1100" dirty="0">
-                <a:latin typeface="Roboto" charset="0"/>
-                <a:ea typeface="Roboto" charset="0"/>
-                <a:cs typeface="Roboto" charset="0"/>
-              </a:rPr>
-              <a:t> to save your defaults in ~/.</a:t>
+              <a:t>If desired, you can create a credentials to save your defaults in ~/.</a:t>
             </a:r>
             <a:r>
               <a:rPr lang="en-US" sz="1100" dirty="0" err="1">
@@ -23861,10 +23891,10 @@
       </p:sp>
       <p:graphicFrame>
         <p:nvGraphicFramePr>
-          <p:cNvPr id="2" name="Table 1">
+          <p:cNvPr id="3" name="Table 2">
             <a:extLst>
               <a:ext uri="{FF2B5EF4-FFF2-40B4-BE49-F238E27FC236}">
-                <a16:creationId xmlns:a16="http://schemas.microsoft.com/office/drawing/2014/main" id="{2C12D988-695F-F511-A501-77C760F566B9}"/>
+                <a16:creationId xmlns:a16="http://schemas.microsoft.com/office/drawing/2014/main" id="{2DB6FE30-190B-AB3A-DF02-6A0CF1FB3469}"/>
               </a:ext>
             </a:extLst>
           </p:cNvPr>
@@ -23874,14 +23904,14 @@
           <p:nvPr>
             <p:extLst>
               <p:ext uri="{D42A27DB-BD31-4B8C-83A1-F6EECF244321}">
-                <p14:modId xmlns:p14="http://schemas.microsoft.com/office/powerpoint/2010/main" val="1348752398"/>
+                <p14:modId xmlns:p14="http://schemas.microsoft.com/office/powerpoint/2010/main" val="1858541359"/>
               </p:ext>
             </p:extLst>
           </p:nvPr>
         </p:nvGraphicFramePr>
         <p:xfrm>
-          <a:off x="1525698" y="4891622"/>
-          <a:ext cx="4340020" cy="853440"/>
+          <a:off x="9377241" y="3928721"/>
+          <a:ext cx="2068406" cy="2225040"/>
         </p:xfrm>
         <a:graphic>
           <a:graphicData uri="http://schemas.openxmlformats.org/drawingml/2006/table">
@@ -23890,133 +23920,355 @@
                 <a:tableStyleId>{5C22544A-7EE6-4342-B048-85BDC9FD1C3A}</a:tableStyleId>
               </a:tblPr>
               <a:tblGrid>
-                <a:gridCol w="4340020">
+                <a:gridCol w="2068406">
                   <a:extLst>
                     <a:ext uri="{9D8B030D-6E8A-4147-A177-3AD203B41FA5}">
-                      <a16:colId xmlns:a16="http://schemas.microsoft.com/office/drawing/2014/main" val="2725794101"/>
+                      <a16:colId xmlns:a16="http://schemas.microsoft.com/office/drawing/2014/main" val="1261491639"/>
                     </a:ext>
                   </a:extLst>
                 </a:gridCol>
               </a:tblGrid>
-              <a:tr h="370840">
+              <a:tr h="1857904">
                 <a:tc>
                   <a:txBody>
                     <a:bodyPr/>
                     <a:lstStyle/>
                     <a:p>
                       <a:r>
-                        <a:rPr lang="en-US" sz="1000" dirty="0">
+                        <a:rPr lang="en-US" sz="1000" b="0" dirty="0">
+                          <a:solidFill>
+                            <a:schemeClr val="bg2"/>
+                          </a:solidFill>
                           <a:latin typeface="Courier New" panose="02070309020205020404" pitchFamily="49" charset="0"/>
                           <a:cs typeface="Courier New" panose="02070309020205020404" pitchFamily="49" charset="0"/>
                         </a:rPr>
-                        <a:t>{</a:t>
+                        <a:t>[default1]</a:t>
                       </a:r>
                     </a:p>
                     <a:p>
                       <a:r>
-                        <a:rPr lang="en-US" sz="1000" dirty="0">
+                        <a:rPr lang="en-US" sz="1000" b="0" dirty="0">
+                          <a:solidFill>
+                            <a:schemeClr val="bg2"/>
+                          </a:solidFill>
                           <a:latin typeface="Courier New" panose="02070309020205020404" pitchFamily="49" charset="0"/>
                           <a:cs typeface="Courier New" panose="02070309020205020404" pitchFamily="49" charset="0"/>
                         </a:rPr>
-                        <a:t>    "</a:t>
+                        <a:t>pod = </a:t>
                       </a:r>
                       <a:r>
-                        <a:rPr lang="en-US" sz="1000" dirty="0" err="1">
-                          <a:latin typeface="Courier New" panose="02070309020205020404" pitchFamily="49" charset="0"/>
-                          <a:cs typeface="Courier New" panose="02070309020205020404" pitchFamily="49" charset="0"/>
-                        </a:rPr>
-                        <a:t>default_pod</a:t>
-                      </a:r>
-                      <a:r>
-                        <a:rPr lang="en-US" sz="1000" dirty="0">
-                          <a:latin typeface="Courier New" panose="02070309020205020404" pitchFamily="49" charset="0"/>
-                          <a:cs typeface="Courier New" panose="02070309020205020404" pitchFamily="49" charset="0"/>
-                        </a:rPr>
-                        <a:t>": "</a:t>
-                      </a:r>
-                      <a:r>
-                        <a:rPr lang="en-US" sz="1000" dirty="0" err="1">
+                        <a:rPr lang="en-US" sz="1000" b="0" dirty="0" err="1">
+                          <a:solidFill>
+                            <a:schemeClr val="bg2"/>
+                          </a:solidFill>
                           <a:latin typeface="Courier New" panose="02070309020205020404" pitchFamily="49" charset="0"/>
                           <a:cs typeface="Courier New" panose="02070309020205020404" pitchFamily="49" charset="0"/>
                         </a:rPr>
                         <a:t>dmp</a:t>
                       </a:r>
                       <a:r>
-                        <a:rPr lang="en-US" sz="1000" dirty="0">
+                        <a:rPr lang="en-US" sz="1000" b="0" dirty="0">
+                          <a:solidFill>
+                            <a:schemeClr val="bg2"/>
+                          </a:solidFill>
                           <a:latin typeface="Courier New" panose="02070309020205020404" pitchFamily="49" charset="0"/>
                           <a:cs typeface="Courier New" panose="02070309020205020404" pitchFamily="49" charset="0"/>
                         </a:rPr>
-                        <a:t>-us",</a:t>
+                        <a:t>-us</a:t>
                       </a:r>
                     </a:p>
                     <a:p>
                       <a:r>
-                        <a:rPr lang="en-US" sz="1000" dirty="0">
+                        <a:rPr lang="en-US" sz="1000" b="0" dirty="0">
+                          <a:solidFill>
+                            <a:schemeClr val="bg2"/>
+                          </a:solidFill>
                           <a:latin typeface="Courier New" panose="02070309020205020404" pitchFamily="49" charset="0"/>
                           <a:cs typeface="Courier New" panose="02070309020205020404" pitchFamily="49" charset="0"/>
                         </a:rPr>
-                        <a:t>    "</a:t>
+                        <a:t>user = </a:t>
                       </a:r>
                       <a:r>
-                        <a:rPr lang="en-US" sz="1000" dirty="0" err="1">
+                        <a:rPr lang="en-US" sz="1000" b="0" dirty="0" err="1">
+                          <a:solidFill>
+                            <a:schemeClr val="bg2"/>
+                          </a:solidFill>
                           <a:latin typeface="Courier New" panose="02070309020205020404" pitchFamily="49" charset="0"/>
                           <a:cs typeface="Courier New" panose="02070309020205020404" pitchFamily="49" charset="0"/>
                         </a:rPr>
-                        <a:t>default_user</a:t>
+                        <a:t>shayes_example</a:t>
                       </a:r>
+                      <a:endParaRPr lang="en-US" sz="1000" b="0" dirty="0">
+                        <a:solidFill>
+                          <a:schemeClr val="bg2"/>
+                        </a:solidFill>
+                        <a:latin typeface="Courier New" panose="02070309020205020404" pitchFamily="49" charset="0"/>
+                        <a:cs typeface="Courier New" panose="02070309020205020404" pitchFamily="49" charset="0"/>
+                      </a:endParaRPr>
+                    </a:p>
+                    <a:p>
                       <a:r>
-                        <a:rPr lang="en-US" sz="1000" dirty="0">
+                        <a:rPr lang="en-US" sz="1000" b="0" dirty="0" err="1">
+                          <a:solidFill>
+                            <a:schemeClr val="bg2"/>
+                          </a:solidFill>
                           <a:latin typeface="Courier New" panose="02070309020205020404" pitchFamily="49" charset="0"/>
                           <a:cs typeface="Courier New" panose="02070309020205020404" pitchFamily="49" charset="0"/>
                         </a:rPr>
-                        <a:t>": "</a:t>
+                        <a:t>pwd</a:t>
                       </a:r>
                       <a:r>
-                        <a:rPr lang="en-US" sz="1000" dirty="0" err="1">
+                        <a:rPr lang="en-US" sz="1000" b="0" dirty="0">
+                          <a:solidFill>
+                            <a:schemeClr val="bg2"/>
+                          </a:solidFill>
+                          <a:latin typeface="Courier New" panose="02070309020205020404" pitchFamily="49" charset="0"/>
+                          <a:cs typeface="Courier New" panose="02070309020205020404" pitchFamily="49" charset="0"/>
+                        </a:rPr>
+                        <a:t> = </a:t>
+                      </a:r>
+                      <a:r>
+                        <a:rPr lang="en-US" sz="1000" b="0" dirty="0" err="1">
+                          <a:solidFill>
+                            <a:schemeClr val="bg2"/>
+                          </a:solidFill>
+                          <a:latin typeface="Courier New" panose="02070309020205020404" pitchFamily="49" charset="0"/>
+                          <a:cs typeface="Courier New" panose="02070309020205020404" pitchFamily="49" charset="0"/>
+                        </a:rPr>
+                        <a:t>xyz</a:t>
+                      </a:r>
+                      <a:endParaRPr lang="en-US" sz="1000" b="0" dirty="0">
+                        <a:solidFill>
+                          <a:schemeClr val="bg2"/>
+                        </a:solidFill>
+                        <a:latin typeface="Courier New" panose="02070309020205020404" pitchFamily="49" charset="0"/>
+                        <a:cs typeface="Courier New" panose="02070309020205020404" pitchFamily="49" charset="0"/>
+                      </a:endParaRPr>
+                    </a:p>
+                    <a:p>
+                      <a:endParaRPr lang="en-US" sz="1000" b="0" dirty="0">
+                        <a:solidFill>
+                          <a:schemeClr val="bg2"/>
+                        </a:solidFill>
+                        <a:latin typeface="Courier New" panose="02070309020205020404" pitchFamily="49" charset="0"/>
+                        <a:cs typeface="Courier New" panose="02070309020205020404" pitchFamily="49" charset="0"/>
+                      </a:endParaRPr>
+                    </a:p>
+                    <a:p>
+                      <a:r>
+                        <a:rPr lang="en-US" sz="1000" b="0" dirty="0">
+                          <a:solidFill>
+                            <a:schemeClr val="bg2"/>
+                          </a:solidFill>
+                          <a:latin typeface="Courier New" panose="02070309020205020404" pitchFamily="49" charset="0"/>
+                          <a:cs typeface="Courier New" panose="02070309020205020404" pitchFamily="49" charset="0"/>
+                        </a:rPr>
+                        <a:t>[</a:t>
+                      </a:r>
+                      <a:r>
+                        <a:rPr lang="en-US" sz="1000" b="0" dirty="0" err="1">
+                          <a:solidFill>
+                            <a:schemeClr val="bg2"/>
+                          </a:solidFill>
                           <a:latin typeface="Courier New" panose="02070309020205020404" pitchFamily="49" charset="0"/>
                           <a:cs typeface="Courier New" panose="02070309020205020404" pitchFamily="49" charset="0"/>
                         </a:rPr>
                         <a:t>shayes_compass</a:t>
                       </a:r>
                       <a:r>
-                        <a:rPr lang="en-US" sz="1000" dirty="0">
+                        <a:rPr lang="en-US" sz="1000" b="0" dirty="0">
+                          <a:solidFill>
+                            <a:schemeClr val="bg2"/>
+                          </a:solidFill>
                           <a:latin typeface="Courier New" panose="02070309020205020404" pitchFamily="49" charset="0"/>
                           <a:cs typeface="Courier New" panose="02070309020205020404" pitchFamily="49" charset="0"/>
                         </a:rPr>
-                        <a:t>",</a:t>
+                        <a:t>]</a:t>
                       </a:r>
                     </a:p>
                     <a:p>
                       <a:r>
-                        <a:rPr lang="en-US" sz="1000" dirty="0">
+                        <a:rPr lang="en-US" sz="1000" b="0" dirty="0">
+                          <a:solidFill>
+                            <a:schemeClr val="bg2"/>
+                          </a:solidFill>
                           <a:latin typeface="Courier New" panose="02070309020205020404" pitchFamily="49" charset="0"/>
                           <a:cs typeface="Courier New" panose="02070309020205020404" pitchFamily="49" charset="0"/>
                         </a:rPr>
-                        <a:t>    "</a:t>
+                        <a:t>pod = </a:t>
                       </a:r>
                       <a:r>
-                        <a:rPr lang="en-US" sz="1000" dirty="0" err="1">
+                        <a:rPr lang="en-US" sz="1000" b="0" dirty="0" err="1">
+                          <a:solidFill>
+                            <a:schemeClr val="bg2"/>
+                          </a:solidFill>
                           <a:latin typeface="Courier New" panose="02070309020205020404" pitchFamily="49" charset="0"/>
                           <a:cs typeface="Courier New" panose="02070309020205020404" pitchFamily="49" charset="0"/>
                         </a:rPr>
-                        <a:t>default_pwd</a:t>
+                        <a:t>dmp</a:t>
                       </a:r>
                       <a:r>
-                        <a:rPr lang="en-US" sz="1000" dirty="0">
+                        <a:rPr lang="en-US" sz="1000" b="0" dirty="0">
+                          <a:solidFill>
+                            <a:schemeClr val="bg2"/>
+                          </a:solidFill>
                           <a:latin typeface="Courier New" panose="02070309020205020404" pitchFamily="49" charset="0"/>
                           <a:cs typeface="Courier New" panose="02070309020205020404" pitchFamily="49" charset="0"/>
                         </a:rPr>
-                        <a:t>": “xxx"        </a:t>
+                        <a:t>-us</a:t>
                       </a:r>
                     </a:p>
                     <a:p>
                       <a:r>
-                        <a:rPr lang="en-US" sz="1000" dirty="0">
+                        <a:rPr lang="en-US" sz="1000" b="0" dirty="0">
+                          <a:solidFill>
+                            <a:schemeClr val="bg2"/>
+                          </a:solidFill>
                           <a:latin typeface="Courier New" panose="02070309020205020404" pitchFamily="49" charset="0"/>
                           <a:cs typeface="Courier New" panose="02070309020205020404" pitchFamily="49" charset="0"/>
                         </a:rPr>
-                        <a:t>}</a:t>
+                        <a:t>user = </a:t>
                       </a:r>
+                      <a:r>
+                        <a:rPr lang="en-US" sz="1000" b="0" dirty="0" err="1">
+                          <a:solidFill>
+                            <a:schemeClr val="bg2"/>
+                          </a:solidFill>
+                          <a:latin typeface="Courier New" panose="02070309020205020404" pitchFamily="49" charset="0"/>
+                          <a:cs typeface="Courier New" panose="02070309020205020404" pitchFamily="49" charset="0"/>
+                        </a:rPr>
+                        <a:t>shayes_compass</a:t>
+                      </a:r>
+                      <a:endParaRPr lang="en-US" sz="1000" b="0" dirty="0">
+                        <a:solidFill>
+                          <a:schemeClr val="bg2"/>
+                        </a:solidFill>
+                        <a:latin typeface="Courier New" panose="02070309020205020404" pitchFamily="49" charset="0"/>
+                        <a:cs typeface="Courier New" panose="02070309020205020404" pitchFamily="49" charset="0"/>
+                      </a:endParaRPr>
+                    </a:p>
+                    <a:p>
+                      <a:r>
+                        <a:rPr lang="en-US" sz="1000" b="0" dirty="0" err="1">
+                          <a:solidFill>
+                            <a:schemeClr val="bg2"/>
+                          </a:solidFill>
+                          <a:latin typeface="Courier New" panose="02070309020205020404" pitchFamily="49" charset="0"/>
+                          <a:cs typeface="Courier New" panose="02070309020205020404" pitchFamily="49" charset="0"/>
+                        </a:rPr>
+                        <a:t>pwd</a:t>
+                      </a:r>
+                      <a:r>
+                        <a:rPr lang="en-US" sz="1000" b="0" dirty="0">
+                          <a:solidFill>
+                            <a:schemeClr val="bg2"/>
+                          </a:solidFill>
+                          <a:latin typeface="Courier New" panose="02070309020205020404" pitchFamily="49" charset="0"/>
+                          <a:cs typeface="Courier New" panose="02070309020205020404" pitchFamily="49" charset="0"/>
+                        </a:rPr>
+                        <a:t> = </a:t>
+                      </a:r>
+                      <a:r>
+                        <a:rPr lang="en-US" sz="1000" b="0" dirty="0" err="1">
+                          <a:solidFill>
+                            <a:schemeClr val="bg2"/>
+                          </a:solidFill>
+                          <a:latin typeface="Courier New" panose="02070309020205020404" pitchFamily="49" charset="0"/>
+                          <a:cs typeface="Courier New" panose="02070309020205020404" pitchFamily="49" charset="0"/>
+                        </a:rPr>
+                        <a:t>abc</a:t>
+                      </a:r>
+                      <a:endParaRPr lang="en-US" sz="1000" b="0" dirty="0">
+                        <a:solidFill>
+                          <a:schemeClr val="bg2"/>
+                        </a:solidFill>
+                        <a:latin typeface="Courier New" panose="02070309020205020404" pitchFamily="49" charset="0"/>
+                        <a:cs typeface="Courier New" panose="02070309020205020404" pitchFamily="49" charset="0"/>
+                      </a:endParaRPr>
+                    </a:p>
+                    <a:p>
+                      <a:endParaRPr lang="en-US" sz="1000" b="0" dirty="0">
+                        <a:solidFill>
+                          <a:schemeClr val="bg2"/>
+                        </a:solidFill>
+                        <a:latin typeface="Courier New" panose="02070309020205020404" pitchFamily="49" charset="0"/>
+                        <a:cs typeface="Courier New" panose="02070309020205020404" pitchFamily="49" charset="0"/>
+                      </a:endParaRPr>
+                    </a:p>
+                    <a:p>
+                      <a:r>
+                        <a:rPr lang="en-US" sz="1000" b="0" dirty="0">
+                          <a:solidFill>
+                            <a:schemeClr val="bg2"/>
+                          </a:solidFill>
+                          <a:latin typeface="Courier New" panose="02070309020205020404" pitchFamily="49" charset="0"/>
+                          <a:cs typeface="Courier New" panose="02070309020205020404" pitchFamily="49" charset="0"/>
+                        </a:rPr>
+                        <a:t>[reinvent]</a:t>
+                      </a:r>
+                    </a:p>
+                    <a:p>
+                      <a:r>
+                        <a:rPr lang="en-US" sz="1000" b="0" dirty="0">
+                          <a:solidFill>
+                            <a:schemeClr val="bg2"/>
+                          </a:solidFill>
+                          <a:latin typeface="Courier New" panose="02070309020205020404" pitchFamily="49" charset="0"/>
+                          <a:cs typeface="Courier New" panose="02070309020205020404" pitchFamily="49" charset="0"/>
+                        </a:rPr>
+                        <a:t>pod = dm-us</a:t>
+                      </a:r>
+                    </a:p>
+                    <a:p>
+                      <a:r>
+                        <a:rPr lang="en-US" sz="1000" b="0" dirty="0">
+                          <a:solidFill>
+                            <a:schemeClr val="bg2"/>
+                          </a:solidFill>
+                          <a:latin typeface="Courier New" panose="02070309020205020404" pitchFamily="49" charset="0"/>
+                          <a:cs typeface="Courier New" panose="02070309020205020404" pitchFamily="49" charset="0"/>
+                        </a:rPr>
+                        <a:t>user = reinvent01</a:t>
+                      </a:r>
+                    </a:p>
+                    <a:p>
+                      <a:r>
+                        <a:rPr lang="en-US" sz="1000" b="0" dirty="0" err="1">
+                          <a:solidFill>
+                            <a:schemeClr val="bg2"/>
+                          </a:solidFill>
+                          <a:latin typeface="Courier New" panose="02070309020205020404" pitchFamily="49" charset="0"/>
+                          <a:cs typeface="Courier New" panose="02070309020205020404" pitchFamily="49" charset="0"/>
+                        </a:rPr>
+                        <a:t>pwd</a:t>
+                      </a:r>
+                      <a:r>
+                        <a:rPr lang="en-US" sz="1000" b="0" dirty="0">
+                          <a:solidFill>
+                            <a:schemeClr val="bg2"/>
+                          </a:solidFill>
+                          <a:latin typeface="Courier New" panose="02070309020205020404" pitchFamily="49" charset="0"/>
+                          <a:cs typeface="Courier New" panose="02070309020205020404" pitchFamily="49" charset="0"/>
+                        </a:rPr>
+                        <a:t> = </a:t>
+                      </a:r>
+                      <a:r>
+                        <a:rPr lang="en-US" sz="1000" b="0" dirty="0" err="1">
+                          <a:solidFill>
+                            <a:schemeClr val="bg2"/>
+                          </a:solidFill>
+                          <a:latin typeface="Courier New" panose="02070309020205020404" pitchFamily="49" charset="0"/>
+                          <a:cs typeface="Courier New" panose="02070309020205020404" pitchFamily="49" charset="0"/>
+                        </a:rPr>
+                        <a:t>zyx</a:t>
+                      </a:r>
+                      <a:endParaRPr lang="en-US" sz="1000" b="0" dirty="0">
+                        <a:solidFill>
+                          <a:schemeClr val="bg2"/>
+                        </a:solidFill>
+                        <a:latin typeface="Courier New" panose="02070309020205020404" pitchFamily="49" charset="0"/>
+                        <a:cs typeface="Courier New" panose="02070309020205020404" pitchFamily="49" charset="0"/>
+                      </a:endParaRPr>
                     </a:p>
                   </a:txBody>
                   <a:tcPr>
@@ -24027,7 +24279,7 @@
                 </a:tc>
                 <a:extLst>
                   <a:ext uri="{0D108BD9-81ED-4DB2-BD59-A6C34878D82A}">
-                    <a16:rowId xmlns:a16="http://schemas.microsoft.com/office/drawing/2014/main" val="3942343172"/>
+                    <a16:rowId xmlns:a16="http://schemas.microsoft.com/office/drawing/2014/main" val="3598110298"/>
                   </a:ext>
                 </a:extLst>
               </a:tr>

</xml_diff>

<commit_message>
Version 20241209 Updated script to allow for command line parameters Updated some templates
</commit_message>
<xml_diff>
--- a/Simple Classification Creator.pptx
+++ b/Simple Classification Creator.pptx
@@ -335,7 +335,7 @@
           <a:p>
             <a:fld id="{A8AF0ABA-1503-4581-BC5A-AF3D56D7DD45}" type="datetimeFigureOut">
               <a:rPr lang="en-US" smtClean="0"/>
-              <a:t>11/26/2024</a:t>
+              <a:t>12/9/2024</a:t>
             </a:fld>
             <a:endParaRPr lang="en-US"/>
           </a:p>
@@ -500,7 +500,7 @@
           <a:p>
             <a:fld id="{78186FDC-CD1E-4E7E-B1CD-1CBCCD519E8C}" type="datetimeFigureOut">
               <a:rPr lang="en-US" smtClean="0"/>
-              <a:t>11/26/2024</a:t>
+              <a:t>12/9/2024</a:t>
             </a:fld>
             <a:endParaRPr lang="en-US"/>
           </a:p>
@@ -23497,7 +23497,7 @@
                 <a:ea typeface="Roboto" charset="0"/>
                 <a:cs typeface="Roboto" charset="0"/>
               </a:rPr>
-              <a:t>Additional flags can be set on the script:</a:t>
+              <a:t>Additional flags can be set on the script (or via command line using --&lt;parameter&gt;=&lt;value&gt; run with --help for all parameters):</a:t>
             </a:r>
           </a:p>
           <a:p>
@@ -35399,15 +35399,6 @@
 </file>
 
 <file path=customXml/item1.xml><?xml version="1.0" encoding="utf-8"?>
-<?mso-contentType ?>
-<FormTemplates xmlns="http://schemas.microsoft.com/sharepoint/v3/contenttype/forms">
-  <Display>DocumentLibraryForm</Display>
-  <Edit>DocumentLibraryForm</Edit>
-  <New>DocumentLibraryForm</New>
-</FormTemplates>
-</file>
-
-<file path=customXml/item2.xml><?xml version="1.0" encoding="utf-8"?>
 <ct:contentTypeSchema xmlns:ct="http://schemas.microsoft.com/office/2006/metadata/contentType" xmlns:ma="http://schemas.microsoft.com/office/2006/metadata/properties/metaAttributes" ct:_="" ma:_="" ma:contentTypeName="Document" ma:contentTypeID="0x0101008F469B9DDCB7884E95DD88D1FAB455BB" ma:contentTypeVersion="4" ma:contentTypeDescription="Create a new document." ma:contentTypeScope="" ma:versionID="2af74787b6fa7b67583c56dc5776735d">
   <xsd:schema xmlns:xsd="http://www.w3.org/2001/XMLSchema" xmlns:xs="http://www.w3.org/2001/XMLSchema" xmlns:p="http://schemas.microsoft.com/office/2006/metadata/properties" xmlns:ns2="d7abb67f-8ba3-4629-af4a-9ad47f056db5" targetNamespace="http://schemas.microsoft.com/office/2006/metadata/properties" ma:root="true" ma:fieldsID="03e5ccd49f08cdc976c4df5b8baab980" ns2:_="">
     <xsd:import namespace="d7abb67f-8ba3-4629-af4a-9ad47f056db5"/>
@@ -35553,15 +35544,16 @@
 </ct:contentTypeSchema>
 </file>
 
-<file path=customXml/itemProps1.xml><?xml version="1.0" encoding="utf-8"?>
-<ds:datastoreItem xmlns:ds="http://schemas.openxmlformats.org/officeDocument/2006/customXml" ds:itemID="{0FFC13DC-9E91-480E-AA50-E69DFCF153D3}">
-  <ds:schemaRefs>
-    <ds:schemaRef ds:uri="http://schemas.microsoft.com/sharepoint/v3/contenttype/forms"/>
-  </ds:schemaRefs>
-</ds:datastoreItem>
+<file path=customXml/item2.xml><?xml version="1.0" encoding="utf-8"?>
+<?mso-contentType ?>
+<FormTemplates xmlns="http://schemas.microsoft.com/sharepoint/v3/contenttype/forms">
+  <Display>DocumentLibraryForm</Display>
+  <Edit>DocumentLibraryForm</Edit>
+  <New>DocumentLibraryForm</New>
+</FormTemplates>
 </file>
 
-<file path=customXml/itemProps2.xml><?xml version="1.0" encoding="utf-8"?>
+<file path=customXml/itemProps1.xml><?xml version="1.0" encoding="utf-8"?>
 <ds:datastoreItem xmlns:ds="http://schemas.openxmlformats.org/officeDocument/2006/customXml" ds:itemID="{5CA5433E-CDB9-440C-BB77-1799205ED86D}">
   <ds:schemaRefs>
     <ds:schemaRef ds:uri="d7abb67f-8ba3-4629-af4a-9ad47f056db5"/>
@@ -35579,6 +35571,14 @@
 </ds:datastoreItem>
 </file>
 
+<file path=customXml/itemProps2.xml><?xml version="1.0" encoding="utf-8"?>
+<ds:datastoreItem xmlns:ds="http://schemas.openxmlformats.org/officeDocument/2006/customXml" ds:itemID="{0FFC13DC-9E91-480E-AA50-E69DFCF153D3}">
+  <ds:schemaRefs>
+    <ds:schemaRef ds:uri="http://schemas.microsoft.com/sharepoint/v3/contenttype/forms"/>
+  </ds:schemaRefs>
+</ds:datastoreItem>
+</file>
+
 <file path=docMetadata/LabelInfo.xml><?xml version="1.0" encoding="utf-8"?>
 <clbl:labelList xmlns:clbl="http://schemas.microsoft.com/office/2020/mipLabelMetadata">
   <clbl:label id="{14c8150c-bc7e-4d77-82d5-2d0905f0cd74}" enabled="1" method="Standard" siteId="{2638f43e-f77d-4fc7-ab92-7b753b7876fd}" contentBits="0" removed="0"/>

</xml_diff>

<commit_message>
Version 20250105 Added functionality for Lookup Tables
</commit_message>
<xml_diff>
--- a/Simple Classification Creator.pptx
+++ b/Simple Classification Creator.pptx
@@ -7,10 +7,10 @@
     <p:sldMasterId id="2147483794" r:id="rId5"/>
   </p:sldMasterIdLst>
   <p:notesMasterIdLst>
-    <p:notesMasterId r:id="rId19"/>
+    <p:notesMasterId r:id="rId20"/>
   </p:notesMasterIdLst>
   <p:handoutMasterIdLst>
-    <p:handoutMasterId r:id="rId20"/>
+    <p:handoutMasterId r:id="rId21"/>
   </p:handoutMasterIdLst>
   <p:sldIdLst>
     <p:sldId id="288" r:id="rId6"/>
@@ -22,10 +22,11 @@
     <p:sldId id="2134807794" r:id="rId12"/>
     <p:sldId id="2134807795" r:id="rId13"/>
     <p:sldId id="2134807797" r:id="rId14"/>
-    <p:sldId id="2134807800" r:id="rId15"/>
-    <p:sldId id="2134807798" r:id="rId16"/>
-    <p:sldId id="2134807799" r:id="rId17"/>
-    <p:sldId id="267" r:id="rId18"/>
+    <p:sldId id="2134807801" r:id="rId15"/>
+    <p:sldId id="2134807800" r:id="rId16"/>
+    <p:sldId id="2134807798" r:id="rId17"/>
+    <p:sldId id="2134807799" r:id="rId18"/>
+    <p:sldId id="267" r:id="rId19"/>
   </p:sldIdLst>
   <p:sldSz cx="12188825" cy="6858000"/>
   <p:notesSz cx="7104063" cy="10234613"/>
@@ -138,6 +139,7 @@
             <p14:sldId id="2134807794"/>
             <p14:sldId id="2134807795"/>
             <p14:sldId id="2134807797"/>
+            <p14:sldId id="2134807801"/>
             <p14:sldId id="2134807800"/>
             <p14:sldId id="2134807798"/>
             <p14:sldId id="2134807799"/>
@@ -335,7 +337,7 @@
           <a:p>
             <a:fld id="{A8AF0ABA-1503-4581-BC5A-AF3D56D7DD45}" type="datetimeFigureOut">
               <a:rPr lang="en-US" smtClean="0"/>
-              <a:t>12/9/2024</a:t>
+              <a:t>1/5/2025</a:t>
             </a:fld>
             <a:endParaRPr lang="en-US"/>
           </a:p>
@@ -500,7 +502,7 @@
           <a:p>
             <a:fld id="{78186FDC-CD1E-4E7E-B1CD-1CBCCD519E8C}" type="datetimeFigureOut">
               <a:rPr lang="en-US" smtClean="0"/>
-              <a:t>12/9/2024</a:t>
+              <a:t>1/5/2025</a:t>
             </a:fld>
             <a:endParaRPr lang="en-US"/>
           </a:p>
@@ -915,6 +917,90 @@
           <a:bodyPr/>
           <a:lstStyle/>
           <a:p>
+            <a:endParaRPr lang="en-US" dirty="0"/>
+          </a:p>
+        </p:txBody>
+      </p:sp>
+      <p:sp>
+        <p:nvSpPr>
+          <p:cNvPr id="4" name="Slide Number Placeholder 3"/>
+          <p:cNvSpPr>
+            <a:spLocks noGrp="1"/>
+          </p:cNvSpPr>
+          <p:nvPr>
+            <p:ph type="sldNum" sz="quarter" idx="5"/>
+          </p:nvPr>
+        </p:nvSpPr>
+        <p:spPr/>
+        <p:txBody>
+          <a:bodyPr/>
+          <a:lstStyle/>
+          <a:p>
+            <a:fld id="{4B9A8B04-59C6-4476-9B83-8806D24CC38B}" type="slidenum">
+              <a:rPr lang="en-US" smtClean="0"/>
+              <a:t>10</a:t>
+            </a:fld>
+            <a:endParaRPr lang="en-US"/>
+          </a:p>
+        </p:txBody>
+      </p:sp>
+    </p:spTree>
+    <p:extLst>
+      <p:ext uri="{BB962C8B-B14F-4D97-AF65-F5344CB8AC3E}">
+        <p14:creationId xmlns:p14="http://schemas.microsoft.com/office/powerpoint/2010/main" val="620240284"/>
+      </p:ext>
+    </p:extLst>
+  </p:cSld>
+  <p:clrMapOvr>
+    <a:masterClrMapping/>
+  </p:clrMapOvr>
+</p:notes>
+</file>
+
+<file path=ppt/notesSlides/notesSlide3.xml><?xml version="1.0" encoding="utf-8"?>
+<p:notes xmlns:a="http://schemas.openxmlformats.org/drawingml/2006/main" xmlns:r="http://schemas.openxmlformats.org/officeDocument/2006/relationships" xmlns:p="http://schemas.openxmlformats.org/presentationml/2006/main">
+  <p:cSld>
+    <p:spTree>
+      <p:nvGrpSpPr>
+        <p:cNvPr id="1" name=""/>
+        <p:cNvGrpSpPr/>
+        <p:nvPr/>
+      </p:nvGrpSpPr>
+      <p:grpSpPr>
+        <a:xfrm>
+          <a:off x="0" y="0"/>
+          <a:ext cx="0" cy="0"/>
+          <a:chOff x="0" y="0"/>
+          <a:chExt cx="0" cy="0"/>
+        </a:xfrm>
+      </p:grpSpPr>
+      <p:sp>
+        <p:nvSpPr>
+          <p:cNvPr id="2" name="Slide Image Placeholder 1"/>
+          <p:cNvSpPr>
+            <a:spLocks noGrp="1" noRot="1" noChangeAspect="1"/>
+          </p:cNvSpPr>
+          <p:nvPr>
+            <p:ph type="sldImg"/>
+          </p:nvPr>
+        </p:nvSpPr>
+        <p:spPr/>
+      </p:sp>
+      <p:sp>
+        <p:nvSpPr>
+          <p:cNvPr id="3" name="Notes Placeholder 2"/>
+          <p:cNvSpPr>
+            <a:spLocks noGrp="1"/>
+          </p:cNvSpPr>
+          <p:nvPr>
+            <p:ph type="body" idx="1"/>
+          </p:nvPr>
+        </p:nvSpPr>
+        <p:spPr/>
+        <p:txBody>
+          <a:bodyPr/>
+          <a:lstStyle/>
+          <a:p>
             <a:endParaRPr lang="en-US"/>
           </a:p>
         </p:txBody>
@@ -936,7 +1022,7 @@
           <a:p>
             <a:fld id="{4B9A8B04-59C6-4476-9B83-8806D24CC38B}" type="slidenum">
               <a:rPr lang="en-US" smtClean="0"/>
-              <a:t>13</a:t>
+              <a:t>14</a:t>
             </a:fld>
             <a:endParaRPr lang="en-US"/>
           </a:p>
@@ -22311,6 +22397,525 @@
           <a:chExt cx="0" cy="0"/>
         </a:xfrm>
       </p:grpSpPr>
+      <p:pic>
+        <p:nvPicPr>
+          <p:cNvPr id="3" name="Picture 2">
+            <a:extLst>
+              <a:ext uri="{FF2B5EF4-FFF2-40B4-BE49-F238E27FC236}">
+                <a16:creationId xmlns:a16="http://schemas.microsoft.com/office/drawing/2014/main" id="{20D584F4-3727-8C0B-5E61-62752D1487D5}"/>
+              </a:ext>
+            </a:extLst>
+          </p:cNvPr>
+          <p:cNvPicPr>
+            <a:picLocks noChangeAspect="1"/>
+          </p:cNvPicPr>
+          <p:nvPr/>
+        </p:nvPicPr>
+        <p:blipFill>
+          <a:blip r:embed="rId3"/>
+          <a:stretch>
+            <a:fillRect/>
+          </a:stretch>
+        </p:blipFill>
+        <p:spPr>
+          <a:xfrm>
+            <a:off x="1278311" y="2311454"/>
+            <a:ext cx="4572000" cy="600075"/>
+          </a:xfrm>
+          <a:prstGeom prst="rect">
+            <a:avLst/>
+          </a:prstGeom>
+        </p:spPr>
+      </p:pic>
+      <p:sp>
+        <p:nvSpPr>
+          <p:cNvPr id="11" name="TextBox 10">
+            <a:extLst>
+              <a:ext uri="{FF2B5EF4-FFF2-40B4-BE49-F238E27FC236}">
+                <a16:creationId xmlns:a16="http://schemas.microsoft.com/office/drawing/2014/main" id="{CEDE4AF3-28A5-7917-E40A-D2FF58E652FD}"/>
+              </a:ext>
+            </a:extLst>
+          </p:cNvPr>
+          <p:cNvSpPr txBox="1"/>
+          <p:nvPr/>
+        </p:nvSpPr>
+        <p:spPr>
+          <a:xfrm>
+            <a:off x="1126791" y="3331209"/>
+            <a:ext cx="1465231" cy="668696"/>
+          </a:xfrm>
+          <a:prstGeom prst="rect">
+            <a:avLst/>
+          </a:prstGeom>
+          <a:noFill/>
+          <a:ln>
+            <a:solidFill>
+              <a:schemeClr val="tx2"/>
+            </a:solidFill>
+          </a:ln>
+        </p:spPr>
+        <p:txBody>
+          <a:bodyPr wrap="square" lIns="91440" tIns="91440" rIns="91440" bIns="91440" rtlCol="0">
+            <a:noAutofit/>
+          </a:bodyPr>
+          <a:lstStyle/>
+          <a:p>
+            <a:pPr>
+              <a:lnSpc>
+                <a:spcPct val="90000"/>
+              </a:lnSpc>
+              <a:spcAft>
+                <a:spcPts val="1000"/>
+              </a:spcAft>
+            </a:pPr>
+            <a:r>
+              <a:rPr lang="en-US" sz="1200" dirty="0">
+                <a:latin typeface="Roboto" charset="0"/>
+                <a:ea typeface="Roboto" charset="0"/>
+                <a:cs typeface="Roboto" charset="0"/>
+              </a:rPr>
+              <a:t>Provide the Lookup Table Name</a:t>
+            </a:r>
+          </a:p>
+        </p:txBody>
+      </p:sp>
+      <p:cxnSp>
+        <p:nvCxnSpPr>
+          <p:cNvPr id="13" name="Straight Arrow Connector 12">
+            <a:extLst>
+              <a:ext uri="{FF2B5EF4-FFF2-40B4-BE49-F238E27FC236}">
+                <a16:creationId xmlns:a16="http://schemas.microsoft.com/office/drawing/2014/main" id="{39252C03-C691-51F7-FA1E-AE06F4057DA7}"/>
+              </a:ext>
+            </a:extLst>
+          </p:cNvPr>
+          <p:cNvCxnSpPr>
+            <a:cxnSpLocks/>
+          </p:cNvCxnSpPr>
+          <p:nvPr/>
+        </p:nvCxnSpPr>
+        <p:spPr>
+          <a:xfrm flipV="1">
+            <a:off x="1741794" y="2769224"/>
+            <a:ext cx="0" cy="552065"/>
+          </a:xfrm>
+          <a:prstGeom prst="straightConnector1">
+            <a:avLst/>
+          </a:prstGeom>
+          <a:ln w="19050">
+            <a:solidFill>
+              <a:schemeClr val="tx1"/>
+            </a:solidFill>
+            <a:tailEnd type="triangle"/>
+          </a:ln>
+        </p:spPr>
+        <p:style>
+          <a:lnRef idx="1">
+            <a:schemeClr val="accent1"/>
+          </a:lnRef>
+          <a:fillRef idx="0">
+            <a:schemeClr val="accent1"/>
+          </a:fillRef>
+          <a:effectRef idx="0">
+            <a:schemeClr val="accent1"/>
+          </a:effectRef>
+          <a:fontRef idx="minor">
+            <a:schemeClr val="tx1"/>
+          </a:fontRef>
+        </p:style>
+      </p:cxnSp>
+      <p:sp>
+        <p:nvSpPr>
+          <p:cNvPr id="12" name="TextBox 11">
+            <a:extLst>
+              <a:ext uri="{FF2B5EF4-FFF2-40B4-BE49-F238E27FC236}">
+                <a16:creationId xmlns:a16="http://schemas.microsoft.com/office/drawing/2014/main" id="{35FC033A-0280-BB77-49A2-830C03FFC047}"/>
+              </a:ext>
+            </a:extLst>
+          </p:cNvPr>
+          <p:cNvSpPr txBox="1"/>
+          <p:nvPr/>
+        </p:nvSpPr>
+        <p:spPr>
+          <a:xfrm>
+            <a:off x="2204640" y="4661783"/>
+            <a:ext cx="1761066" cy="668696"/>
+          </a:xfrm>
+          <a:prstGeom prst="rect">
+            <a:avLst/>
+          </a:prstGeom>
+          <a:noFill/>
+          <a:ln>
+            <a:solidFill>
+              <a:schemeClr val="tx2"/>
+            </a:solidFill>
+          </a:ln>
+        </p:spPr>
+        <p:txBody>
+          <a:bodyPr wrap="square" lIns="91440" tIns="91440" rIns="91440" bIns="91440" rtlCol="0">
+            <a:noAutofit/>
+          </a:bodyPr>
+          <a:lstStyle/>
+          <a:p>
+            <a:pPr>
+              <a:lnSpc>
+                <a:spcPct val="90000"/>
+              </a:lnSpc>
+              <a:spcAft>
+                <a:spcPts val="1000"/>
+              </a:spcAft>
+            </a:pPr>
+            <a:r>
+              <a:rPr lang="en-US" sz="1200" dirty="0">
+                <a:latin typeface="Roboto" charset="0"/>
+                <a:ea typeface="Roboto" charset="0"/>
+                <a:cs typeface="Roboto" charset="0"/>
+              </a:rPr>
+              <a:t>Provide the Lookup Table Description</a:t>
+            </a:r>
+          </a:p>
+          <a:p>
+            <a:pPr>
+              <a:lnSpc>
+                <a:spcPct val="90000"/>
+              </a:lnSpc>
+              <a:spcAft>
+                <a:spcPts val="1000"/>
+              </a:spcAft>
+            </a:pPr>
+            <a:endParaRPr lang="en-US" sz="1200" dirty="0">
+              <a:latin typeface="Roboto" charset="0"/>
+              <a:ea typeface="Roboto" charset="0"/>
+              <a:cs typeface="Roboto" charset="0"/>
+            </a:endParaRPr>
+          </a:p>
+        </p:txBody>
+      </p:sp>
+      <p:cxnSp>
+        <p:nvCxnSpPr>
+          <p:cNvPr id="15" name="Straight Arrow Connector 14">
+            <a:extLst>
+              <a:ext uri="{FF2B5EF4-FFF2-40B4-BE49-F238E27FC236}">
+                <a16:creationId xmlns:a16="http://schemas.microsoft.com/office/drawing/2014/main" id="{34BE38CC-5673-D889-3279-7BF24C1DBF1A}"/>
+              </a:ext>
+            </a:extLst>
+          </p:cNvPr>
+          <p:cNvCxnSpPr>
+            <a:cxnSpLocks/>
+            <a:stCxn id="12" idx="0"/>
+          </p:cNvCxnSpPr>
+          <p:nvPr/>
+        </p:nvCxnSpPr>
+        <p:spPr>
+          <a:xfrm flipV="1">
+            <a:off x="3085173" y="2752503"/>
+            <a:ext cx="151001" cy="1909280"/>
+          </a:xfrm>
+          <a:prstGeom prst="straightConnector1">
+            <a:avLst/>
+          </a:prstGeom>
+          <a:ln w="19050">
+            <a:solidFill>
+              <a:schemeClr val="tx1"/>
+            </a:solidFill>
+            <a:tailEnd type="triangle"/>
+          </a:ln>
+        </p:spPr>
+        <p:style>
+          <a:lnRef idx="1">
+            <a:schemeClr val="accent1"/>
+          </a:lnRef>
+          <a:fillRef idx="0">
+            <a:schemeClr val="accent1"/>
+          </a:fillRef>
+          <a:effectRef idx="0">
+            <a:schemeClr val="accent1"/>
+          </a:effectRef>
+          <a:fontRef idx="minor">
+            <a:schemeClr val="tx1"/>
+          </a:fontRef>
+        </p:style>
+      </p:cxnSp>
+      <p:sp>
+        <p:nvSpPr>
+          <p:cNvPr id="29" name="Title 4">
+            <a:extLst>
+              <a:ext uri="{FF2B5EF4-FFF2-40B4-BE49-F238E27FC236}">
+                <a16:creationId xmlns:a16="http://schemas.microsoft.com/office/drawing/2014/main" id="{CDAFCEB1-84B4-1FF8-6C77-B719D71B0E80}"/>
+              </a:ext>
+            </a:extLst>
+          </p:cNvPr>
+          <p:cNvSpPr>
+            <a:spLocks noGrp="1"/>
+          </p:cNvSpPr>
+          <p:nvPr>
+            <p:ph type="title"/>
+          </p:nvPr>
+        </p:nvSpPr>
+        <p:spPr>
+          <a:xfrm>
+            <a:off x="284546" y="159431"/>
+            <a:ext cx="11195177" cy="562427"/>
+          </a:xfrm>
+        </p:spPr>
+        <p:txBody>
+          <a:bodyPr/>
+          <a:lstStyle/>
+          <a:p>
+            <a:r>
+              <a:rPr lang="en-US" dirty="0"/>
+              <a:t>Configure Lookup Tables with </a:t>
+            </a:r>
+            <a:r>
+              <a:rPr lang="en-US" i="1" dirty="0"/>
+              <a:t>csv file</a:t>
+            </a:r>
+            <a:endParaRPr lang="en-IN" i="1" dirty="0"/>
+          </a:p>
+        </p:txBody>
+      </p:sp>
+      <p:sp>
+        <p:nvSpPr>
+          <p:cNvPr id="4" name="TextBox 3">
+            <a:extLst>
+              <a:ext uri="{FF2B5EF4-FFF2-40B4-BE49-F238E27FC236}">
+                <a16:creationId xmlns:a16="http://schemas.microsoft.com/office/drawing/2014/main" id="{901460BE-5261-EB46-E241-44E4CA4861EC}"/>
+              </a:ext>
+            </a:extLst>
+          </p:cNvPr>
+          <p:cNvSpPr txBox="1"/>
+          <p:nvPr/>
+        </p:nvSpPr>
+        <p:spPr>
+          <a:xfrm>
+            <a:off x="399012" y="810187"/>
+            <a:ext cx="5451299" cy="839389"/>
+          </a:xfrm>
+          <a:prstGeom prst="rect">
+            <a:avLst/>
+          </a:prstGeom>
+          <a:noFill/>
+        </p:spPr>
+        <p:txBody>
+          <a:bodyPr wrap="square" lIns="0" tIns="0" rIns="0" bIns="0" rtlCol="0">
+            <a:noAutofit/>
+          </a:bodyPr>
+          <a:lstStyle/>
+          <a:p>
+            <a:pPr marL="171450" indent="-171450">
+              <a:lnSpc>
+                <a:spcPct val="90000"/>
+              </a:lnSpc>
+              <a:spcAft>
+                <a:spcPts val="1000"/>
+              </a:spcAft>
+              <a:buFont typeface="Arial" panose="020B0604020202020204" pitchFamily="34" charset="0"/>
+              <a:buChar char="•"/>
+            </a:pPr>
+            <a:r>
+              <a:rPr lang="en-US" sz="1200" i="1" dirty="0">
+                <a:latin typeface="Roboto" charset="0"/>
+                <a:ea typeface="Roboto" charset="0"/>
+                <a:cs typeface="Roboto" charset="0"/>
+              </a:rPr>
+              <a:t>Create a csv file that contains your lookup table</a:t>
+            </a:r>
+          </a:p>
+          <a:p>
+            <a:pPr marL="171450" indent="-171450">
+              <a:lnSpc>
+                <a:spcPct val="90000"/>
+              </a:lnSpc>
+              <a:spcAft>
+                <a:spcPts val="1000"/>
+              </a:spcAft>
+              <a:buFont typeface="Arial" panose="020B0604020202020204" pitchFamily="34" charset="0"/>
+              <a:buChar char="•"/>
+            </a:pPr>
+            <a:r>
+              <a:rPr lang="en-US" sz="1200" i="1" dirty="0">
+                <a:latin typeface="Roboto" charset="0"/>
+                <a:ea typeface="Roboto" charset="0"/>
+                <a:cs typeface="Roboto" charset="0"/>
+              </a:rPr>
+              <a:t>Then use the configuration to create or update lookup tables</a:t>
+            </a:r>
+          </a:p>
+          <a:p>
+            <a:pPr marL="171450" indent="-171450">
+              <a:lnSpc>
+                <a:spcPct val="90000"/>
+              </a:lnSpc>
+              <a:spcAft>
+                <a:spcPts val="1000"/>
+              </a:spcAft>
+              <a:buFont typeface="Arial" panose="020B0604020202020204" pitchFamily="34" charset="0"/>
+              <a:buChar char="•"/>
+            </a:pPr>
+            <a:r>
+              <a:rPr lang="en-US" sz="1200" i="1" dirty="0">
+                <a:latin typeface="Roboto" charset="0"/>
+                <a:ea typeface="Roboto" charset="0"/>
+                <a:cs typeface="Roboto" charset="0"/>
+              </a:rPr>
+              <a:t>Optionally, you can add the Action of “DELETE” to remove the lookup table</a:t>
+            </a:r>
+          </a:p>
+        </p:txBody>
+      </p:sp>
+      <p:sp>
+        <p:nvSpPr>
+          <p:cNvPr id="14" name="TextBox 13">
+            <a:extLst>
+              <a:ext uri="{FF2B5EF4-FFF2-40B4-BE49-F238E27FC236}">
+                <a16:creationId xmlns:a16="http://schemas.microsoft.com/office/drawing/2014/main" id="{C527E4CB-8124-AD7C-2E86-827377A58D7B}"/>
+              </a:ext>
+            </a:extLst>
+          </p:cNvPr>
+          <p:cNvSpPr txBox="1"/>
+          <p:nvPr/>
+        </p:nvSpPr>
+        <p:spPr>
+          <a:xfrm>
+            <a:off x="3790566" y="3471166"/>
+            <a:ext cx="1761066" cy="1128890"/>
+          </a:xfrm>
+          <a:prstGeom prst="rect">
+            <a:avLst/>
+          </a:prstGeom>
+          <a:noFill/>
+          <a:ln>
+            <a:solidFill>
+              <a:schemeClr val="tx2"/>
+            </a:solidFill>
+          </a:ln>
+        </p:spPr>
+        <p:txBody>
+          <a:bodyPr wrap="square" lIns="91440" tIns="91440" rIns="91440" bIns="91440" rtlCol="0">
+            <a:noAutofit/>
+          </a:bodyPr>
+          <a:lstStyle/>
+          <a:p>
+            <a:pPr>
+              <a:lnSpc>
+                <a:spcPct val="90000"/>
+              </a:lnSpc>
+              <a:spcAft>
+                <a:spcPts val="1000"/>
+              </a:spcAft>
+            </a:pPr>
+            <a:r>
+              <a:rPr lang="en-US" sz="1200" dirty="0">
+                <a:latin typeface="Roboto" charset="0"/>
+                <a:ea typeface="Roboto" charset="0"/>
+                <a:cs typeface="Roboto" charset="0"/>
+              </a:rPr>
+              <a:t>Provide the name of the csv file that contains the lookup table data (in the same location as the script</a:t>
+            </a:r>
+          </a:p>
+          <a:p>
+            <a:pPr>
+              <a:lnSpc>
+                <a:spcPct val="90000"/>
+              </a:lnSpc>
+              <a:spcAft>
+                <a:spcPts val="1000"/>
+              </a:spcAft>
+            </a:pPr>
+            <a:endParaRPr lang="en-US" sz="1200" dirty="0">
+              <a:latin typeface="Roboto" charset="0"/>
+              <a:ea typeface="Roboto" charset="0"/>
+              <a:cs typeface="Roboto" charset="0"/>
+            </a:endParaRPr>
+          </a:p>
+        </p:txBody>
+      </p:sp>
+      <p:cxnSp>
+        <p:nvCxnSpPr>
+          <p:cNvPr id="16" name="Straight Arrow Connector 15">
+            <a:extLst>
+              <a:ext uri="{FF2B5EF4-FFF2-40B4-BE49-F238E27FC236}">
+                <a16:creationId xmlns:a16="http://schemas.microsoft.com/office/drawing/2014/main" id="{E700035E-0C07-A6F6-FCB0-24242DCCA578}"/>
+              </a:ext>
+            </a:extLst>
+          </p:cNvPr>
+          <p:cNvCxnSpPr>
+            <a:cxnSpLocks/>
+            <a:stCxn id="14" idx="0"/>
+          </p:cNvCxnSpPr>
+          <p:nvPr/>
+        </p:nvCxnSpPr>
+        <p:spPr>
+          <a:xfrm flipH="1" flipV="1">
+            <a:off x="4556559" y="2769224"/>
+            <a:ext cx="114540" cy="701942"/>
+          </a:xfrm>
+          <a:prstGeom prst="straightConnector1">
+            <a:avLst/>
+          </a:prstGeom>
+          <a:ln w="19050">
+            <a:solidFill>
+              <a:schemeClr val="tx1"/>
+            </a:solidFill>
+            <a:tailEnd type="triangle"/>
+          </a:ln>
+        </p:spPr>
+        <p:style>
+          <a:lnRef idx="1">
+            <a:schemeClr val="accent1"/>
+          </a:lnRef>
+          <a:fillRef idx="0">
+            <a:schemeClr val="accent1"/>
+          </a:fillRef>
+          <a:effectRef idx="0">
+            <a:schemeClr val="accent1"/>
+          </a:effectRef>
+          <a:fontRef idx="minor">
+            <a:schemeClr val="tx1"/>
+          </a:fontRef>
+        </p:style>
+      </p:cxnSp>
+    </p:spTree>
+    <p:extLst>
+      <p:ext uri="{BB962C8B-B14F-4D97-AF65-F5344CB8AC3E}">
+        <p14:creationId xmlns:p14="http://schemas.microsoft.com/office/powerpoint/2010/main" val="804032726"/>
+      </p:ext>
+    </p:extLst>
+  </p:cSld>
+  <p:clrMapOvr>
+    <a:masterClrMapping/>
+  </p:clrMapOvr>
+  <mc:AlternateContent xmlns:mc="http://schemas.openxmlformats.org/markup-compatibility/2006" xmlns:p14="http://schemas.microsoft.com/office/powerpoint/2010/main">
+    <mc:Choice Requires="p14">
+      <p:transition spd="med" p14:dur="700" advClick="0">
+        <p:fade/>
+      </p:transition>
+    </mc:Choice>
+    <mc:Fallback xmlns="">
+      <p:transition spd="med" advClick="0">
+        <p:fade/>
+      </p:transition>
+    </mc:Fallback>
+  </mc:AlternateContent>
+</p:sld>
+</file>
+
+<file path=ppt/slides/slide11.xml><?xml version="1.0" encoding="utf-8"?>
+<p:sld xmlns:a="http://schemas.openxmlformats.org/drawingml/2006/main" xmlns:r="http://schemas.openxmlformats.org/officeDocument/2006/relationships" xmlns:p="http://schemas.openxmlformats.org/presentationml/2006/main">
+  <p:cSld>
+    <p:spTree>
+      <p:nvGrpSpPr>
+        <p:cNvPr id="1" name=""/>
+        <p:cNvGrpSpPr/>
+        <p:nvPr/>
+      </p:nvGrpSpPr>
+      <p:grpSpPr>
+        <a:xfrm>
+          <a:off x="0" y="0"/>
+          <a:ext cx="0" cy="0"/>
+          <a:chOff x="0" y="0"/>
+          <a:chExt cx="0" cy="0"/>
+        </a:xfrm>
+      </p:grpSpPr>
       <p:sp>
         <p:nvSpPr>
           <p:cNvPr id="5" name="Title 4">
@@ -22708,7 +23313,7 @@
                 <a:ea typeface="Roboto" charset="0"/>
                 <a:cs typeface="Roboto" charset="0"/>
               </a:rPr>
-              <a:t>Deleting Classifications are done by executing a job. You can execute them in bulk by formatting a simple csv file (classifications_delete.csv by default) with the Classification Name, and Action (set to DELETE). You can run the script with a delete command line parameter, and optionally the csv file that contain the classifications to be deleted.</a:t>
+              <a:t>Deleting Classifications are done by executing a job. You can execute them in bulk by formatting a simple csv file with the Classification Name and/or Lookup Table Name, and Action (set to DELETE). You can run the script with the delete command line parameter, and optionally the csv file that contain the classifications to be deleted.</a:t>
             </a:r>
           </a:p>
           <a:p>
@@ -23066,7 +23671,7 @@
 </p:sld>
 </file>
 
-<file path=ppt/slides/slide11.xml><?xml version="1.0" encoding="utf-8"?>
+<file path=ppt/slides/slide12.xml><?xml version="1.0" encoding="utf-8"?>
 <p:sld xmlns:a="http://schemas.openxmlformats.org/drawingml/2006/main" xmlns:r="http://schemas.openxmlformats.org/officeDocument/2006/relationships" xmlns:p="http://schemas.openxmlformats.org/presentationml/2006/main">
   <p:cSld>
     <p:spTree>
@@ -24312,7 +24917,7 @@
 </p:sld>
 </file>
 
-<file path=ppt/slides/slide12.xml><?xml version="1.0" encoding="utf-8"?>
+<file path=ppt/slides/slide13.xml><?xml version="1.0" encoding="utf-8"?>
 <p:sld xmlns:a="http://schemas.openxmlformats.org/drawingml/2006/main" xmlns:r="http://schemas.openxmlformats.org/officeDocument/2006/relationships" xmlns:p="http://schemas.openxmlformats.org/presentationml/2006/main">
   <p:cSld>
     <p:spTree>
@@ -24814,7 +25419,7 @@
 </p:sld>
 </file>
 
-<file path=ppt/slides/slide13.xml><?xml version="1.0" encoding="utf-8"?>
+<file path=ppt/slides/slide14.xml><?xml version="1.0" encoding="utf-8"?>
 <p:sld xmlns:a="http://schemas.openxmlformats.org/drawingml/2006/main" xmlns:r="http://schemas.openxmlformats.org/officeDocument/2006/relationships" xmlns:p="http://schemas.openxmlformats.org/presentationml/2006/main">
   <p:cSld>
     <p:spTree>
@@ -26125,7 +26730,7 @@
             </a:r>
             <a:r>
               <a:rPr lang="en-US" i="1" dirty="0"/>
-              <a:t>classifications.csv</a:t>
+              <a:t>csv file</a:t>
             </a:r>
             <a:endParaRPr lang="en-IN" i="1" dirty="0"/>
           </a:p>
@@ -35399,6 +36004,15 @@
 </file>
 
 <file path=customXml/item1.xml><?xml version="1.0" encoding="utf-8"?>
+<?mso-contentType ?>
+<FormTemplates xmlns="http://schemas.microsoft.com/sharepoint/v3/contenttype/forms">
+  <Display>DocumentLibraryForm</Display>
+  <Edit>DocumentLibraryForm</Edit>
+  <New>DocumentLibraryForm</New>
+</FormTemplates>
+</file>
+
+<file path=customXml/item2.xml><?xml version="1.0" encoding="utf-8"?>
 <ct:contentTypeSchema xmlns:ct="http://schemas.microsoft.com/office/2006/metadata/contentType" xmlns:ma="http://schemas.microsoft.com/office/2006/metadata/properties/metaAttributes" ct:_="" ma:_="" ma:contentTypeName="Document" ma:contentTypeID="0x0101008F469B9DDCB7884E95DD88D1FAB455BB" ma:contentTypeVersion="4" ma:contentTypeDescription="Create a new document." ma:contentTypeScope="" ma:versionID="2af74787b6fa7b67583c56dc5776735d">
   <xsd:schema xmlns:xsd="http://www.w3.org/2001/XMLSchema" xmlns:xs="http://www.w3.org/2001/XMLSchema" xmlns:p="http://schemas.microsoft.com/office/2006/metadata/properties" xmlns:ns2="d7abb67f-8ba3-4629-af4a-9ad47f056db5" targetNamespace="http://schemas.microsoft.com/office/2006/metadata/properties" ma:root="true" ma:fieldsID="03e5ccd49f08cdc976c4df5b8baab980" ns2:_="">
     <xsd:import namespace="d7abb67f-8ba3-4629-af4a-9ad47f056db5"/>
@@ -35544,16 +36158,15 @@
 </ct:contentTypeSchema>
 </file>
 
-<file path=customXml/item2.xml><?xml version="1.0" encoding="utf-8"?>
-<?mso-contentType ?>
-<FormTemplates xmlns="http://schemas.microsoft.com/sharepoint/v3/contenttype/forms">
-  <Display>DocumentLibraryForm</Display>
-  <Edit>DocumentLibraryForm</Edit>
-  <New>DocumentLibraryForm</New>
-</FormTemplates>
+<file path=customXml/itemProps1.xml><?xml version="1.0" encoding="utf-8"?>
+<ds:datastoreItem xmlns:ds="http://schemas.openxmlformats.org/officeDocument/2006/customXml" ds:itemID="{0FFC13DC-9E91-480E-AA50-E69DFCF153D3}">
+  <ds:schemaRefs>
+    <ds:schemaRef ds:uri="http://schemas.microsoft.com/sharepoint/v3/contenttype/forms"/>
+  </ds:schemaRefs>
+</ds:datastoreItem>
 </file>
 
-<file path=customXml/itemProps1.xml><?xml version="1.0" encoding="utf-8"?>
+<file path=customXml/itemProps2.xml><?xml version="1.0" encoding="utf-8"?>
 <ds:datastoreItem xmlns:ds="http://schemas.openxmlformats.org/officeDocument/2006/customXml" ds:itemID="{5CA5433E-CDB9-440C-BB77-1799205ED86D}">
   <ds:schemaRefs>
     <ds:schemaRef ds:uri="d7abb67f-8ba3-4629-af4a-9ad47f056db5"/>
@@ -35571,14 +36184,6 @@
 </ds:datastoreItem>
 </file>
 
-<file path=customXml/itemProps2.xml><?xml version="1.0" encoding="utf-8"?>
-<ds:datastoreItem xmlns:ds="http://schemas.openxmlformats.org/officeDocument/2006/customXml" ds:itemID="{0FFC13DC-9E91-480E-AA50-E69DFCF153D3}">
-  <ds:schemaRefs>
-    <ds:schemaRef ds:uri="http://schemas.microsoft.com/sharepoint/v3/contenttype/forms"/>
-  </ds:schemaRefs>
-</ds:datastoreItem>
-</file>
-
 <file path=docMetadata/LabelInfo.xml><?xml version="1.0" encoding="utf-8"?>
 <clbl:labelList xmlns:clbl="http://schemas.microsoft.com/office/2020/mipLabelMetadata">
   <clbl:label id="{14c8150c-bc7e-4d77-82d5-2d0905f0cd74}" enabled="1" method="Standard" siteId="{2638f43e-f77d-4fc7-ab92-7b753b7876fd}" contentBits="0" removed="0"/>

</xml_diff>

<commit_message>
Version 20250127 Adjusted Lookup tables. Now when Lookup tables are created, the script will monitor and wait for the job to complete. This is because the lookup table jobs can only be one at a time. Also added an option to skip any lookup tables that are specified that already exist. (otherwise, it will update it)
</commit_message>
<xml_diff>
--- a/Simple Classification Creator.pptx
+++ b/Simple Classification Creator.pptx
@@ -7,10 +7,10 @@
     <p:sldMasterId id="2147483794" r:id="rId5"/>
   </p:sldMasterIdLst>
   <p:notesMasterIdLst>
-    <p:notesMasterId r:id="rId20"/>
+    <p:notesMasterId r:id="rId21"/>
   </p:notesMasterIdLst>
   <p:handoutMasterIdLst>
-    <p:handoutMasterId r:id="rId21"/>
+    <p:handoutMasterId r:id="rId22"/>
   </p:handoutMasterIdLst>
   <p:sldIdLst>
     <p:sldId id="288" r:id="rId6"/>
@@ -25,8 +25,9 @@
     <p:sldId id="2134807801" r:id="rId15"/>
     <p:sldId id="2134807800" r:id="rId16"/>
     <p:sldId id="2134807798" r:id="rId17"/>
-    <p:sldId id="2134807799" r:id="rId18"/>
-    <p:sldId id="267" r:id="rId19"/>
+    <p:sldId id="2134807802" r:id="rId18"/>
+    <p:sldId id="2134807799" r:id="rId19"/>
+    <p:sldId id="267" r:id="rId20"/>
   </p:sldIdLst>
   <p:sldSz cx="12188825" cy="6858000"/>
   <p:notesSz cx="7104063" cy="10234613"/>
@@ -142,6 +143,7 @@
             <p14:sldId id="2134807801"/>
             <p14:sldId id="2134807800"/>
             <p14:sldId id="2134807798"/>
+            <p14:sldId id="2134807802"/>
             <p14:sldId id="2134807799"/>
           </p14:sldIdLst>
         </p14:section>
@@ -337,7 +339,7 @@
           <a:p>
             <a:fld id="{A8AF0ABA-1503-4581-BC5A-AF3D56D7DD45}" type="datetimeFigureOut">
               <a:rPr lang="en-US" smtClean="0"/>
-              <a:t>1/5/2025</a:t>
+              <a:t>1/27/2025</a:t>
             </a:fld>
             <a:endParaRPr lang="en-US"/>
           </a:p>
@@ -502,7 +504,7 @@
           <a:p>
             <a:fld id="{78186FDC-CD1E-4E7E-B1CD-1CBCCD519E8C}" type="datetimeFigureOut">
               <a:rPr lang="en-US" smtClean="0"/>
-              <a:t>1/5/2025</a:t>
+              <a:t>1/27/2025</a:t>
             </a:fld>
             <a:endParaRPr lang="en-US"/>
           </a:p>
@@ -1001,6 +1003,90 @@
           <a:bodyPr/>
           <a:lstStyle/>
           <a:p>
+            <a:endParaRPr lang="en-US" dirty="0"/>
+          </a:p>
+        </p:txBody>
+      </p:sp>
+      <p:sp>
+        <p:nvSpPr>
+          <p:cNvPr id="4" name="Slide Number Placeholder 3"/>
+          <p:cNvSpPr>
+            <a:spLocks noGrp="1"/>
+          </p:cNvSpPr>
+          <p:nvPr>
+            <p:ph type="sldNum" sz="quarter" idx="5"/>
+          </p:nvPr>
+        </p:nvSpPr>
+        <p:spPr/>
+        <p:txBody>
+          <a:bodyPr/>
+          <a:lstStyle/>
+          <a:p>
+            <a:fld id="{4B9A8B04-59C6-4476-9B83-8806D24CC38B}" type="slidenum">
+              <a:rPr lang="en-US" smtClean="0"/>
+              <a:t>13</a:t>
+            </a:fld>
+            <a:endParaRPr lang="en-US"/>
+          </a:p>
+        </p:txBody>
+      </p:sp>
+    </p:spTree>
+    <p:extLst>
+      <p:ext uri="{BB962C8B-B14F-4D97-AF65-F5344CB8AC3E}">
+        <p14:creationId xmlns:p14="http://schemas.microsoft.com/office/powerpoint/2010/main" val="2322029010"/>
+      </p:ext>
+    </p:extLst>
+  </p:cSld>
+  <p:clrMapOvr>
+    <a:masterClrMapping/>
+  </p:clrMapOvr>
+</p:notes>
+</file>
+
+<file path=ppt/notesSlides/notesSlide4.xml><?xml version="1.0" encoding="utf-8"?>
+<p:notes xmlns:a="http://schemas.openxmlformats.org/drawingml/2006/main" xmlns:r="http://schemas.openxmlformats.org/officeDocument/2006/relationships" xmlns:p="http://schemas.openxmlformats.org/presentationml/2006/main">
+  <p:cSld>
+    <p:spTree>
+      <p:nvGrpSpPr>
+        <p:cNvPr id="1" name=""/>
+        <p:cNvGrpSpPr/>
+        <p:nvPr/>
+      </p:nvGrpSpPr>
+      <p:grpSpPr>
+        <a:xfrm>
+          <a:off x="0" y="0"/>
+          <a:ext cx="0" cy="0"/>
+          <a:chOff x="0" y="0"/>
+          <a:chExt cx="0" cy="0"/>
+        </a:xfrm>
+      </p:grpSpPr>
+      <p:sp>
+        <p:nvSpPr>
+          <p:cNvPr id="2" name="Slide Image Placeholder 1"/>
+          <p:cNvSpPr>
+            <a:spLocks noGrp="1" noRot="1" noChangeAspect="1"/>
+          </p:cNvSpPr>
+          <p:nvPr>
+            <p:ph type="sldImg"/>
+          </p:nvPr>
+        </p:nvSpPr>
+        <p:spPr/>
+      </p:sp>
+      <p:sp>
+        <p:nvSpPr>
+          <p:cNvPr id="3" name="Notes Placeholder 2"/>
+          <p:cNvSpPr>
+            <a:spLocks noGrp="1"/>
+          </p:cNvSpPr>
+          <p:nvPr>
+            <p:ph type="body" idx="1"/>
+          </p:nvPr>
+        </p:nvSpPr>
+        <p:spPr/>
+        <p:txBody>
+          <a:bodyPr/>
+          <a:lstStyle/>
+          <a:p>
             <a:endParaRPr lang="en-US"/>
           </a:p>
         </p:txBody>
@@ -1022,7 +1108,7 @@
           <a:p>
             <a:fld id="{4B9A8B04-59C6-4476-9B83-8806D24CC38B}" type="slidenum">
               <a:rPr lang="en-US" smtClean="0"/>
-              <a:t>14</a:t>
+              <a:t>15</a:t>
             </a:fld>
             <a:endParaRPr lang="en-US"/>
           </a:p>
@@ -22688,7 +22774,7 @@
         <p:spPr>
           <a:xfrm>
             <a:off x="399012" y="810187"/>
-            <a:ext cx="5451299" cy="839389"/>
+            <a:ext cx="5451299" cy="941630"/>
           </a:xfrm>
           <a:prstGeom prst="rect">
             <a:avLst/>
@@ -22738,6 +22824,26 @@
                 <a:cs typeface="Roboto" charset="0"/>
               </a:rPr>
               <a:t>Then use the configuration to create or update lookup tables</a:t>
+            </a:r>
+          </a:p>
+          <a:p>
+            <a:pPr marL="171450" indent="-171450">
+              <a:lnSpc>
+                <a:spcPct val="90000"/>
+              </a:lnSpc>
+              <a:spcAft>
+                <a:spcPts val="1000"/>
+              </a:spcAft>
+              <a:buFont typeface="Arial" panose="020B0604020202020204" pitchFamily="34" charset="0"/>
+              <a:buChar char="•"/>
+            </a:pPr>
+            <a:r>
+              <a:rPr lang="en-US" sz="1200" i="1" dirty="0">
+                <a:latin typeface="Roboto" charset="0"/>
+                <a:ea typeface="Roboto" charset="0"/>
+                <a:cs typeface="Roboto" charset="0"/>
+              </a:rPr>
+              <a:t>When lookup tables are created / updated, a job will start, and the script will monitor and wait for that job to complete (as jobs can only run one at a time)</a:t>
             </a:r>
           </a:p>
           <a:p>
@@ -24389,6 +24495,34 @@
                 <a:cs typeface="Roboto" charset="0"/>
               </a:rPr>
               <a:t>. True/False. If set to True, it will always show raw errors if they occur. Otherwise, it will attempt to find the message from the error, and display that.</a:t>
+            </a:r>
+          </a:p>
+          <a:p>
+            <a:pPr marL="742950" lvl="1" indent="-285750">
+              <a:lnSpc>
+                <a:spcPct val="90000"/>
+              </a:lnSpc>
+              <a:spcAft>
+                <a:spcPts val="1000"/>
+              </a:spcAft>
+              <a:buFont typeface="Arial" panose="020B0604020202020204" pitchFamily="34" charset="0"/>
+              <a:buChar char="•"/>
+            </a:pPr>
+            <a:r>
+              <a:rPr lang="en-US" sz="1100" dirty="0" err="1">
+                <a:latin typeface="Roboto" charset="0"/>
+                <a:ea typeface="Roboto" charset="0"/>
+                <a:cs typeface="Roboto" charset="0"/>
+              </a:rPr>
+              <a:t>skip_existing_lookup_tables</a:t>
+            </a:r>
+            <a:r>
+              <a:rPr lang="en-US" sz="1100" dirty="0">
+                <a:latin typeface="Roboto" charset="0"/>
+                <a:ea typeface="Roboto" charset="0"/>
+                <a:cs typeface="Roboto" charset="0"/>
+              </a:rPr>
+              <a:t>. True/False. If set to True, and a lookup table is defined that already exist, it will skip it.</a:t>
             </a:r>
           </a:p>
           <a:p>
@@ -24922,6 +25056,1635 @@
   <p:cSld>
     <p:spTree>
       <p:nvGrpSpPr>
+        <p:cNvPr id="1" name="">
+          <a:extLst>
+            <a:ext uri="{FF2B5EF4-FFF2-40B4-BE49-F238E27FC236}">
+              <a16:creationId xmlns:a16="http://schemas.microsoft.com/office/drawing/2014/main" id="{CE7DC6AD-6232-45E1-EDE5-2860E364DA1C}"/>
+            </a:ext>
+          </a:extLst>
+        </p:cNvPr>
+        <p:cNvGrpSpPr/>
+        <p:nvPr/>
+      </p:nvGrpSpPr>
+      <p:grpSpPr>
+        <a:xfrm>
+          <a:off x="0" y="0"/>
+          <a:ext cx="0" cy="0"/>
+          <a:chOff x="0" y="0"/>
+          <a:chExt cx="0" cy="0"/>
+        </a:xfrm>
+      </p:grpSpPr>
+      <p:sp>
+        <p:nvSpPr>
+          <p:cNvPr id="5" name="Title 4">
+            <a:extLst>
+              <a:ext uri="{FF2B5EF4-FFF2-40B4-BE49-F238E27FC236}">
+                <a16:creationId xmlns:a16="http://schemas.microsoft.com/office/drawing/2014/main" id="{4AADC19E-47FC-EE8A-0F80-54047AE37874}"/>
+              </a:ext>
+            </a:extLst>
+          </p:cNvPr>
+          <p:cNvSpPr>
+            <a:spLocks noGrp="1"/>
+          </p:cNvSpPr>
+          <p:nvPr>
+            <p:ph type="title"/>
+          </p:nvPr>
+        </p:nvSpPr>
+        <p:spPr/>
+        <p:txBody>
+          <a:bodyPr/>
+          <a:lstStyle/>
+          <a:p>
+            <a:r>
+              <a:rPr lang="en-US" dirty="0"/>
+              <a:t>Command Line Options</a:t>
+            </a:r>
+            <a:endParaRPr lang="en-IN" dirty="0"/>
+          </a:p>
+        </p:txBody>
+      </p:sp>
+      <p:sp>
+        <p:nvSpPr>
+          <p:cNvPr id="16" name="Content Placeholder 13">
+            <a:extLst>
+              <a:ext uri="{FF2B5EF4-FFF2-40B4-BE49-F238E27FC236}">
+                <a16:creationId xmlns:a16="http://schemas.microsoft.com/office/drawing/2014/main" id="{15BC1B74-7313-4857-0619-8A292A6AFF5A}"/>
+              </a:ext>
+            </a:extLst>
+          </p:cNvPr>
+          <p:cNvSpPr txBox="1">
+            <a:spLocks/>
+          </p:cNvSpPr>
+          <p:nvPr/>
+        </p:nvSpPr>
+        <p:spPr>
+          <a:xfrm>
+            <a:off x="1180247" y="1610532"/>
+            <a:ext cx="3180631" cy="2562457"/>
+          </a:xfrm>
+          <a:prstGeom prst="rect">
+            <a:avLst/>
+          </a:prstGeom>
+        </p:spPr>
+        <p:txBody>
+          <a:bodyPr vert="horz" lIns="0" tIns="0" rIns="0" bIns="0" rtlCol="0">
+            <a:noAutofit/>
+          </a:bodyPr>
+          <a:lstStyle>
+            <a:lvl1pPr marL="173038" indent="-173038" algn="l" defTabSz="914217" rtl="0" eaLnBrk="1" latinLnBrk="0" hangingPunct="1">
+              <a:lnSpc>
+                <a:spcPct val="90000"/>
+              </a:lnSpc>
+              <a:spcBef>
+                <a:spcPts val="400"/>
+              </a:spcBef>
+              <a:spcAft>
+                <a:spcPts val="1200"/>
+              </a:spcAft>
+              <a:buClr>
+                <a:schemeClr val="accent2"/>
+              </a:buClr>
+              <a:buFont typeface="Arial" panose="020B0604020202020204" pitchFamily="34" charset="0"/>
+              <a:buChar char="•"/>
+              <a:defRPr sz="2100" b="0" i="0" kern="1200" baseline="0">
+                <a:solidFill>
+                  <a:schemeClr val="tx1"/>
+                </a:solidFill>
+                <a:latin typeface="Roboto" charset="0"/>
+                <a:ea typeface="Roboto" charset="0"/>
+                <a:cs typeface="Roboto" charset="0"/>
+              </a:defRPr>
+            </a:lvl1pPr>
+            <a:lvl2pPr marL="344488" indent="-174625" algn="l" defTabSz="914217" rtl="0" eaLnBrk="1" latinLnBrk="0" hangingPunct="1">
+              <a:lnSpc>
+                <a:spcPct val="90000"/>
+              </a:lnSpc>
+              <a:spcBef>
+                <a:spcPts val="0"/>
+              </a:spcBef>
+              <a:spcAft>
+                <a:spcPts val="1200"/>
+              </a:spcAft>
+              <a:buClr>
+                <a:schemeClr val="accent2"/>
+              </a:buClr>
+              <a:buFont typeface="Arial" panose="020B0604020202020204" pitchFamily="34" charset="0"/>
+              <a:buChar char="•"/>
+              <a:defRPr sz="1800" b="0" i="0" kern="1200" baseline="0">
+                <a:solidFill>
+                  <a:schemeClr val="tx1"/>
+                </a:solidFill>
+                <a:latin typeface="Roboto" charset="0"/>
+                <a:ea typeface="Roboto" charset="0"/>
+                <a:cs typeface="Roboto" charset="0"/>
+              </a:defRPr>
+            </a:lvl2pPr>
+            <a:lvl3pPr marL="514350" indent="-169863" algn="l" defTabSz="914217" rtl="0" eaLnBrk="1" latinLnBrk="0" hangingPunct="1">
+              <a:lnSpc>
+                <a:spcPct val="90000"/>
+              </a:lnSpc>
+              <a:spcBef>
+                <a:spcPts val="0"/>
+              </a:spcBef>
+              <a:spcAft>
+                <a:spcPts val="1200"/>
+              </a:spcAft>
+              <a:buClr>
+                <a:schemeClr val="accent2"/>
+              </a:buClr>
+              <a:buFont typeface="Arial" panose="020B0604020202020204" pitchFamily="34" charset="0"/>
+              <a:buChar char="•"/>
+              <a:defRPr sz="1600" b="0" i="0" kern="1200">
+                <a:solidFill>
+                  <a:schemeClr val="tx1"/>
+                </a:solidFill>
+                <a:latin typeface="Roboto" charset="0"/>
+                <a:ea typeface="Roboto" charset="0"/>
+                <a:cs typeface="Roboto" charset="0"/>
+              </a:defRPr>
+            </a:lvl3pPr>
+            <a:lvl4pPr marL="630238" indent="-171450" algn="l" defTabSz="914217" rtl="0" eaLnBrk="1" latinLnBrk="0" hangingPunct="1">
+              <a:lnSpc>
+                <a:spcPct val="90000"/>
+              </a:lnSpc>
+              <a:spcBef>
+                <a:spcPts val="0"/>
+              </a:spcBef>
+              <a:spcAft>
+                <a:spcPts val="1200"/>
+              </a:spcAft>
+              <a:buClr>
+                <a:schemeClr val="accent2"/>
+              </a:buClr>
+              <a:buFont typeface="Arial" panose="020B0604020202020204" pitchFamily="34" charset="0"/>
+              <a:buChar char="•"/>
+              <a:defRPr sz="1400" b="0" i="0" kern="1200">
+                <a:solidFill>
+                  <a:schemeClr val="tx1"/>
+                </a:solidFill>
+                <a:latin typeface="Roboto" charset="0"/>
+                <a:ea typeface="Roboto" charset="0"/>
+                <a:cs typeface="Roboto" charset="0"/>
+              </a:defRPr>
+            </a:lvl4pPr>
+            <a:lvl5pPr marL="800100" indent="-169863" algn="l" defTabSz="914217" rtl="0" eaLnBrk="1" latinLnBrk="0" hangingPunct="1">
+              <a:lnSpc>
+                <a:spcPct val="90000"/>
+              </a:lnSpc>
+              <a:spcBef>
+                <a:spcPts val="0"/>
+              </a:spcBef>
+              <a:spcAft>
+                <a:spcPts val="1200"/>
+              </a:spcAft>
+              <a:buClr>
+                <a:schemeClr val="accent2"/>
+              </a:buClr>
+              <a:buFont typeface="Arial" panose="020B0604020202020204" pitchFamily="34" charset="0"/>
+              <a:buChar char="•"/>
+              <a:defRPr sz="1400" b="0" i="0" kern="1200">
+                <a:solidFill>
+                  <a:schemeClr val="tx1"/>
+                </a:solidFill>
+                <a:latin typeface="Roboto" charset="0"/>
+                <a:ea typeface="Roboto" charset="0"/>
+                <a:cs typeface="Roboto" charset="0"/>
+              </a:defRPr>
+            </a:lvl5pPr>
+            <a:lvl6pPr marL="914400" indent="-169863" algn="l" defTabSz="914217" rtl="0" eaLnBrk="1" latinLnBrk="0" hangingPunct="1">
+              <a:lnSpc>
+                <a:spcPct val="90000"/>
+              </a:lnSpc>
+              <a:spcBef>
+                <a:spcPts val="500"/>
+              </a:spcBef>
+              <a:spcAft>
+                <a:spcPts val="1200"/>
+              </a:spcAft>
+              <a:buClr>
+                <a:schemeClr val="accent2"/>
+              </a:buClr>
+              <a:buFont typeface="Arial" panose="020B0604020202020204" pitchFamily="34" charset="0"/>
+              <a:buChar char="•"/>
+              <a:defRPr sz="1200" b="0" i="0" kern="1200">
+                <a:solidFill>
+                  <a:schemeClr val="tx1"/>
+                </a:solidFill>
+                <a:latin typeface="Roboto" charset="0"/>
+                <a:ea typeface="Roboto" charset="0"/>
+                <a:cs typeface="Roboto" charset="0"/>
+              </a:defRPr>
+            </a:lvl6pPr>
+            <a:lvl7pPr marL="1084263" indent="-169863" algn="l" defTabSz="914217" rtl="0" eaLnBrk="1" latinLnBrk="0" hangingPunct="1">
+              <a:lnSpc>
+                <a:spcPct val="90000"/>
+              </a:lnSpc>
+              <a:spcBef>
+                <a:spcPts val="500"/>
+              </a:spcBef>
+              <a:spcAft>
+                <a:spcPts val="1200"/>
+              </a:spcAft>
+              <a:buClr>
+                <a:schemeClr val="accent2"/>
+              </a:buClr>
+              <a:buFont typeface="Arial" panose="020B0604020202020204" pitchFamily="34" charset="0"/>
+              <a:buChar char="•"/>
+              <a:defRPr sz="1200" b="0" i="0" kern="1200">
+                <a:solidFill>
+                  <a:schemeClr val="tx1"/>
+                </a:solidFill>
+                <a:latin typeface="Roboto" charset="0"/>
+                <a:ea typeface="Roboto" charset="0"/>
+                <a:cs typeface="Roboto" charset="0"/>
+              </a:defRPr>
+            </a:lvl7pPr>
+            <a:lvl8pPr marL="1258888" indent="-174625" algn="l" defTabSz="914217" rtl="0" eaLnBrk="1" latinLnBrk="0" hangingPunct="1">
+              <a:lnSpc>
+                <a:spcPct val="90000"/>
+              </a:lnSpc>
+              <a:spcBef>
+                <a:spcPts val="500"/>
+              </a:spcBef>
+              <a:spcAft>
+                <a:spcPts val="1200"/>
+              </a:spcAft>
+              <a:buClr>
+                <a:schemeClr val="accent2"/>
+              </a:buClr>
+              <a:buFont typeface="Arial" panose="020B0604020202020204" pitchFamily="34" charset="0"/>
+              <a:buChar char="•"/>
+              <a:defRPr sz="1200" b="0" i="0" kern="1200">
+                <a:solidFill>
+                  <a:schemeClr val="tx1"/>
+                </a:solidFill>
+                <a:latin typeface="Roboto" charset="0"/>
+                <a:ea typeface="Roboto" charset="0"/>
+                <a:cs typeface="Roboto" charset="0"/>
+              </a:defRPr>
+            </a:lvl8pPr>
+            <a:lvl9pPr marL="1428750" indent="-169863" algn="l" defTabSz="914217" rtl="0" eaLnBrk="1" latinLnBrk="0" hangingPunct="1">
+              <a:lnSpc>
+                <a:spcPct val="90000"/>
+              </a:lnSpc>
+              <a:spcBef>
+                <a:spcPts val="500"/>
+              </a:spcBef>
+              <a:spcAft>
+                <a:spcPts val="1200"/>
+              </a:spcAft>
+              <a:buClr>
+                <a:schemeClr val="accent2"/>
+              </a:buClr>
+              <a:buFont typeface="Arial" panose="020B0604020202020204" pitchFamily="34" charset="0"/>
+              <a:buChar char="•"/>
+              <a:defRPr sz="1200" b="0" i="0" kern="1200">
+                <a:solidFill>
+                  <a:schemeClr val="tx1"/>
+                </a:solidFill>
+                <a:latin typeface="Roboto" charset="0"/>
+                <a:ea typeface="Roboto" charset="0"/>
+                <a:cs typeface="Roboto" charset="0"/>
+              </a:defRPr>
+            </a:lvl9pPr>
+          </a:lstStyle>
+          <a:p>
+            <a:pPr marL="0" indent="0">
+              <a:buNone/>
+            </a:pPr>
+            <a:endParaRPr lang="en-IN" sz="1600" dirty="0"/>
+          </a:p>
+        </p:txBody>
+      </p:sp>
+      <p:sp>
+        <p:nvSpPr>
+          <p:cNvPr id="6" name="TextBox 5">
+            <a:extLst>
+              <a:ext uri="{FF2B5EF4-FFF2-40B4-BE49-F238E27FC236}">
+                <a16:creationId xmlns:a16="http://schemas.microsoft.com/office/drawing/2014/main" id="{F300C14C-351E-447C-E98F-3FF5B3C25B1B}"/>
+              </a:ext>
+            </a:extLst>
+          </p:cNvPr>
+          <p:cNvSpPr txBox="1"/>
+          <p:nvPr/>
+        </p:nvSpPr>
+        <p:spPr>
+          <a:xfrm>
+            <a:off x="4832" y="1045029"/>
+            <a:ext cx="4502927" cy="5412215"/>
+          </a:xfrm>
+          <a:prstGeom prst="rect">
+            <a:avLst/>
+          </a:prstGeom>
+          <a:noFill/>
+        </p:spPr>
+        <p:txBody>
+          <a:bodyPr wrap="square" lIns="0" tIns="0" rIns="0" bIns="0" rtlCol="0">
+            <a:noAutofit/>
+          </a:bodyPr>
+          <a:lstStyle/>
+          <a:p>
+            <a:pPr lvl="1">
+              <a:lnSpc>
+                <a:spcPct val="90000"/>
+              </a:lnSpc>
+              <a:spcAft>
+                <a:spcPts val="1000"/>
+              </a:spcAft>
+            </a:pPr>
+            <a:r>
+              <a:rPr lang="en-US" sz="800" dirty="0">
+                <a:latin typeface="Roboto" charset="0"/>
+                <a:ea typeface="Roboto" charset="0"/>
+                <a:cs typeface="Roboto" charset="0"/>
+              </a:rPr>
+              <a:t>Optionally, you can set parameters:</a:t>
+            </a:r>
+          </a:p>
+          <a:p>
+            <a:pPr lvl="1">
+              <a:lnSpc>
+                <a:spcPct val="90000"/>
+              </a:lnSpc>
+              <a:spcAft>
+                <a:spcPts val="1000"/>
+              </a:spcAft>
+            </a:pPr>
+            <a:r>
+              <a:rPr lang="en-US" sz="800" dirty="0">
+                <a:latin typeface="Roboto" charset="0"/>
+                <a:ea typeface="Roboto" charset="0"/>
+                <a:cs typeface="Roboto" charset="0"/>
+              </a:rPr>
+              <a:t>  --help</a:t>
+            </a:r>
+          </a:p>
+          <a:p>
+            <a:pPr lvl="1">
+              <a:lnSpc>
+                <a:spcPct val="90000"/>
+              </a:lnSpc>
+              <a:spcAft>
+                <a:spcPts val="1000"/>
+              </a:spcAft>
+            </a:pPr>
+            <a:r>
+              <a:rPr lang="en-US" sz="800" dirty="0">
+                <a:latin typeface="Roboto" charset="0"/>
+                <a:ea typeface="Roboto" charset="0"/>
+                <a:cs typeface="Roboto" charset="0"/>
+              </a:rPr>
+              <a:t>     This will display all command line options</a:t>
+            </a:r>
+          </a:p>
+          <a:p>
+            <a:pPr lvl="1">
+              <a:lnSpc>
+                <a:spcPct val="90000"/>
+              </a:lnSpc>
+              <a:spcAft>
+                <a:spcPts val="1000"/>
+              </a:spcAft>
+            </a:pPr>
+            <a:r>
+              <a:rPr lang="en-US" sz="800" dirty="0">
+                <a:latin typeface="Roboto" charset="0"/>
+                <a:ea typeface="Roboto" charset="0"/>
+                <a:cs typeface="Roboto" charset="0"/>
+              </a:rPr>
+              <a:t>   --</a:t>
+            </a:r>
+            <a:r>
+              <a:rPr lang="en-US" sz="800" dirty="0" err="1">
+                <a:latin typeface="Roboto" charset="0"/>
+                <a:ea typeface="Roboto" charset="0"/>
+                <a:cs typeface="Roboto" charset="0"/>
+              </a:rPr>
+              <a:t>default_user</a:t>
+            </a:r>
+            <a:endParaRPr lang="en-US" sz="800" dirty="0">
+              <a:latin typeface="Roboto" charset="0"/>
+              <a:ea typeface="Roboto" charset="0"/>
+              <a:cs typeface="Roboto" charset="0"/>
+            </a:endParaRPr>
+          </a:p>
+          <a:p>
+            <a:pPr lvl="1">
+              <a:lnSpc>
+                <a:spcPct val="90000"/>
+              </a:lnSpc>
+              <a:spcAft>
+                <a:spcPts val="1000"/>
+              </a:spcAft>
+            </a:pPr>
+            <a:r>
+              <a:rPr lang="en-US" sz="800" dirty="0">
+                <a:latin typeface="Roboto" charset="0"/>
+                <a:ea typeface="Roboto" charset="0"/>
+                <a:cs typeface="Roboto" charset="0"/>
+              </a:rPr>
+              <a:t>        You can specify the username to use. if you do now specify one, it will look in the</a:t>
+            </a:r>
+          </a:p>
+          <a:p>
+            <a:pPr lvl="1">
+              <a:lnSpc>
+                <a:spcPct val="90000"/>
+              </a:lnSpc>
+              <a:spcAft>
+                <a:spcPts val="1000"/>
+              </a:spcAft>
+            </a:pPr>
+            <a:r>
+              <a:rPr lang="en-US" sz="800" dirty="0">
+                <a:latin typeface="Roboto" charset="0"/>
+                <a:ea typeface="Roboto" charset="0"/>
+                <a:cs typeface="Roboto" charset="0"/>
+              </a:rPr>
+              <a:t>        ~/.</a:t>
+            </a:r>
+            <a:r>
+              <a:rPr lang="en-US" sz="800" dirty="0" err="1">
+                <a:latin typeface="Roboto" charset="0"/>
+                <a:ea typeface="Roboto" charset="0"/>
+                <a:cs typeface="Roboto" charset="0"/>
+              </a:rPr>
+              <a:t>informatica_cdgc</a:t>
+            </a:r>
+            <a:r>
+              <a:rPr lang="en-US" sz="800" dirty="0">
+                <a:latin typeface="Roboto" charset="0"/>
+                <a:ea typeface="Roboto" charset="0"/>
+                <a:cs typeface="Roboto" charset="0"/>
+              </a:rPr>
+              <a:t>/credentials file (as shown below)</a:t>
+            </a:r>
+          </a:p>
+          <a:p>
+            <a:pPr lvl="1">
+              <a:lnSpc>
+                <a:spcPct val="90000"/>
+              </a:lnSpc>
+              <a:spcAft>
+                <a:spcPts val="1000"/>
+              </a:spcAft>
+            </a:pPr>
+            <a:r>
+              <a:rPr lang="en-US" sz="800" dirty="0">
+                <a:latin typeface="Roboto" charset="0"/>
+                <a:ea typeface="Roboto" charset="0"/>
+                <a:cs typeface="Roboto" charset="0"/>
+              </a:rPr>
+              <a:t>        Example:</a:t>
+            </a:r>
+          </a:p>
+          <a:p>
+            <a:pPr lvl="1">
+              <a:lnSpc>
+                <a:spcPct val="90000"/>
+              </a:lnSpc>
+              <a:spcAft>
+                <a:spcPts val="1000"/>
+              </a:spcAft>
+            </a:pPr>
+            <a:r>
+              <a:rPr lang="en-US" sz="800" dirty="0">
+                <a:latin typeface="Roboto" charset="0"/>
+                <a:ea typeface="Roboto" charset="0"/>
+                <a:cs typeface="Roboto" charset="0"/>
+              </a:rPr>
+              <a:t>            --</a:t>
+            </a:r>
+            <a:r>
+              <a:rPr lang="en-US" sz="800" dirty="0" err="1">
+                <a:latin typeface="Roboto" charset="0"/>
+                <a:ea typeface="Roboto" charset="0"/>
+                <a:cs typeface="Roboto" charset="0"/>
+              </a:rPr>
+              <a:t>default_user</a:t>
+            </a:r>
+            <a:r>
+              <a:rPr lang="en-US" sz="800" dirty="0">
+                <a:latin typeface="Roboto" charset="0"/>
+                <a:ea typeface="Roboto" charset="0"/>
+                <a:cs typeface="Roboto" charset="0"/>
+              </a:rPr>
+              <a:t>=</a:t>
+            </a:r>
+            <a:r>
+              <a:rPr lang="en-US" sz="800" dirty="0" err="1">
+                <a:latin typeface="Roboto" charset="0"/>
+                <a:ea typeface="Roboto" charset="0"/>
+                <a:cs typeface="Roboto" charset="0"/>
+              </a:rPr>
+              <a:t>shayes_compass</a:t>
+            </a:r>
+            <a:endParaRPr lang="en-US" sz="800" dirty="0">
+              <a:latin typeface="Roboto" charset="0"/>
+              <a:ea typeface="Roboto" charset="0"/>
+              <a:cs typeface="Roboto" charset="0"/>
+            </a:endParaRPr>
+          </a:p>
+          <a:p>
+            <a:pPr lvl="1">
+              <a:lnSpc>
+                <a:spcPct val="90000"/>
+              </a:lnSpc>
+              <a:spcAft>
+                <a:spcPts val="1000"/>
+              </a:spcAft>
+            </a:pPr>
+            <a:endParaRPr lang="en-US" sz="800" dirty="0">
+              <a:latin typeface="Roboto" charset="0"/>
+              <a:ea typeface="Roboto" charset="0"/>
+              <a:cs typeface="Roboto" charset="0"/>
+            </a:endParaRPr>
+          </a:p>
+          <a:p>
+            <a:pPr lvl="1">
+              <a:lnSpc>
+                <a:spcPct val="90000"/>
+              </a:lnSpc>
+              <a:spcAft>
+                <a:spcPts val="1000"/>
+              </a:spcAft>
+            </a:pPr>
+            <a:r>
+              <a:rPr lang="en-US" sz="800" dirty="0">
+                <a:latin typeface="Roboto" charset="0"/>
+                <a:ea typeface="Roboto" charset="0"/>
+                <a:cs typeface="Roboto" charset="0"/>
+              </a:rPr>
+              <a:t>   --</a:t>
+            </a:r>
+            <a:r>
+              <a:rPr lang="en-US" sz="800" dirty="0" err="1">
+                <a:latin typeface="Roboto" charset="0"/>
+                <a:ea typeface="Roboto" charset="0"/>
+                <a:cs typeface="Roboto" charset="0"/>
+              </a:rPr>
+              <a:t>default_pwd</a:t>
+            </a:r>
+            <a:endParaRPr lang="en-US" sz="800" dirty="0">
+              <a:latin typeface="Roboto" charset="0"/>
+              <a:ea typeface="Roboto" charset="0"/>
+              <a:cs typeface="Roboto" charset="0"/>
+            </a:endParaRPr>
+          </a:p>
+          <a:p>
+            <a:pPr lvl="1">
+              <a:lnSpc>
+                <a:spcPct val="90000"/>
+              </a:lnSpc>
+              <a:spcAft>
+                <a:spcPts val="1000"/>
+              </a:spcAft>
+            </a:pPr>
+            <a:r>
+              <a:rPr lang="en-US" sz="800" dirty="0">
+                <a:latin typeface="Roboto" charset="0"/>
+                <a:ea typeface="Roboto" charset="0"/>
+                <a:cs typeface="Roboto" charset="0"/>
+              </a:rPr>
+              <a:t>        You can specify the password to use. if you do now specify one, it will look in the</a:t>
+            </a:r>
+          </a:p>
+          <a:p>
+            <a:pPr lvl="1">
+              <a:lnSpc>
+                <a:spcPct val="90000"/>
+              </a:lnSpc>
+              <a:spcAft>
+                <a:spcPts val="1000"/>
+              </a:spcAft>
+            </a:pPr>
+            <a:r>
+              <a:rPr lang="en-US" sz="800" dirty="0">
+                <a:latin typeface="Roboto" charset="0"/>
+                <a:ea typeface="Roboto" charset="0"/>
+                <a:cs typeface="Roboto" charset="0"/>
+              </a:rPr>
+              <a:t>        ~/.</a:t>
+            </a:r>
+            <a:r>
+              <a:rPr lang="en-US" sz="800" dirty="0" err="1">
+                <a:latin typeface="Roboto" charset="0"/>
+                <a:ea typeface="Roboto" charset="0"/>
+                <a:cs typeface="Roboto" charset="0"/>
+              </a:rPr>
+              <a:t>informatica_cdgc</a:t>
+            </a:r>
+            <a:r>
+              <a:rPr lang="en-US" sz="800" dirty="0">
+                <a:latin typeface="Roboto" charset="0"/>
+                <a:ea typeface="Roboto" charset="0"/>
+                <a:cs typeface="Roboto" charset="0"/>
+              </a:rPr>
+              <a:t>/credentials file (as shown below)</a:t>
+            </a:r>
+          </a:p>
+          <a:p>
+            <a:pPr lvl="1">
+              <a:lnSpc>
+                <a:spcPct val="90000"/>
+              </a:lnSpc>
+              <a:spcAft>
+                <a:spcPts val="1000"/>
+              </a:spcAft>
+            </a:pPr>
+            <a:r>
+              <a:rPr lang="en-US" sz="800" dirty="0">
+                <a:latin typeface="Roboto" charset="0"/>
+                <a:ea typeface="Roboto" charset="0"/>
+                <a:cs typeface="Roboto" charset="0"/>
+              </a:rPr>
+              <a:t>        Example:</a:t>
+            </a:r>
+          </a:p>
+          <a:p>
+            <a:pPr lvl="1">
+              <a:lnSpc>
+                <a:spcPct val="90000"/>
+              </a:lnSpc>
+              <a:spcAft>
+                <a:spcPts val="1000"/>
+              </a:spcAft>
+            </a:pPr>
+            <a:r>
+              <a:rPr lang="en-US" sz="800" dirty="0">
+                <a:latin typeface="Roboto" charset="0"/>
+                <a:ea typeface="Roboto" charset="0"/>
+                <a:cs typeface="Roboto" charset="0"/>
+              </a:rPr>
+              <a:t>            --</a:t>
+            </a:r>
+            <a:r>
+              <a:rPr lang="en-US" sz="800" dirty="0" err="1">
+                <a:latin typeface="Roboto" charset="0"/>
+                <a:ea typeface="Roboto" charset="0"/>
+                <a:cs typeface="Roboto" charset="0"/>
+              </a:rPr>
+              <a:t>default_pwd</a:t>
+            </a:r>
+            <a:r>
+              <a:rPr lang="en-US" sz="800" dirty="0">
+                <a:latin typeface="Roboto" charset="0"/>
+                <a:ea typeface="Roboto" charset="0"/>
+                <a:cs typeface="Roboto" charset="0"/>
+              </a:rPr>
+              <a:t>=12345</a:t>
+            </a:r>
+          </a:p>
+          <a:p>
+            <a:pPr lvl="1">
+              <a:lnSpc>
+                <a:spcPct val="90000"/>
+              </a:lnSpc>
+              <a:spcAft>
+                <a:spcPts val="1000"/>
+              </a:spcAft>
+            </a:pPr>
+            <a:endParaRPr lang="en-US" sz="800" dirty="0">
+              <a:latin typeface="Roboto" charset="0"/>
+              <a:ea typeface="Roboto" charset="0"/>
+              <a:cs typeface="Roboto" charset="0"/>
+            </a:endParaRPr>
+          </a:p>
+          <a:p>
+            <a:pPr lvl="1">
+              <a:lnSpc>
+                <a:spcPct val="90000"/>
+              </a:lnSpc>
+              <a:spcAft>
+                <a:spcPts val="1000"/>
+              </a:spcAft>
+            </a:pPr>
+            <a:r>
+              <a:rPr lang="en-US" sz="800" dirty="0">
+                <a:latin typeface="Roboto" charset="0"/>
+                <a:ea typeface="Roboto" charset="0"/>
+                <a:cs typeface="Roboto" charset="0"/>
+              </a:rPr>
+              <a:t>   --</a:t>
+            </a:r>
+            <a:r>
+              <a:rPr lang="en-US" sz="800" dirty="0" err="1">
+                <a:latin typeface="Roboto" charset="0"/>
+                <a:ea typeface="Roboto" charset="0"/>
+                <a:cs typeface="Roboto" charset="0"/>
+              </a:rPr>
+              <a:t>default_pod</a:t>
+            </a:r>
+            <a:endParaRPr lang="en-US" sz="800" dirty="0">
+              <a:latin typeface="Roboto" charset="0"/>
+              <a:ea typeface="Roboto" charset="0"/>
+              <a:cs typeface="Roboto" charset="0"/>
+            </a:endParaRPr>
+          </a:p>
+          <a:p>
+            <a:pPr lvl="1">
+              <a:lnSpc>
+                <a:spcPct val="90000"/>
+              </a:lnSpc>
+              <a:spcAft>
+                <a:spcPts val="1000"/>
+              </a:spcAft>
+            </a:pPr>
+            <a:r>
+              <a:rPr lang="en-US" sz="800" dirty="0">
+                <a:latin typeface="Roboto" charset="0"/>
+                <a:ea typeface="Roboto" charset="0"/>
+                <a:cs typeface="Roboto" charset="0"/>
+              </a:rPr>
+              <a:t>        You can specify the pod to use. if you do now specify one, it will look in the</a:t>
+            </a:r>
+          </a:p>
+          <a:p>
+            <a:pPr lvl="1">
+              <a:lnSpc>
+                <a:spcPct val="90000"/>
+              </a:lnSpc>
+              <a:spcAft>
+                <a:spcPts val="1000"/>
+              </a:spcAft>
+            </a:pPr>
+            <a:r>
+              <a:rPr lang="en-US" sz="800" dirty="0">
+                <a:latin typeface="Roboto" charset="0"/>
+                <a:ea typeface="Roboto" charset="0"/>
+                <a:cs typeface="Roboto" charset="0"/>
+              </a:rPr>
+              <a:t>        ~/.</a:t>
+            </a:r>
+            <a:r>
+              <a:rPr lang="en-US" sz="800" dirty="0" err="1">
+                <a:latin typeface="Roboto" charset="0"/>
+                <a:ea typeface="Roboto" charset="0"/>
+                <a:cs typeface="Roboto" charset="0"/>
+              </a:rPr>
+              <a:t>informatica_cdgc</a:t>
+            </a:r>
+            <a:r>
+              <a:rPr lang="en-US" sz="800" dirty="0">
+                <a:latin typeface="Roboto" charset="0"/>
+                <a:ea typeface="Roboto" charset="0"/>
+                <a:cs typeface="Roboto" charset="0"/>
+              </a:rPr>
+              <a:t>/credentials file (as shown below)</a:t>
+            </a:r>
+          </a:p>
+          <a:p>
+            <a:pPr lvl="1">
+              <a:lnSpc>
+                <a:spcPct val="90000"/>
+              </a:lnSpc>
+              <a:spcAft>
+                <a:spcPts val="1000"/>
+              </a:spcAft>
+            </a:pPr>
+            <a:r>
+              <a:rPr lang="en-US" sz="800" dirty="0">
+                <a:latin typeface="Roboto" charset="0"/>
+                <a:ea typeface="Roboto" charset="0"/>
+                <a:cs typeface="Roboto" charset="0"/>
+              </a:rPr>
+              <a:t>        Typically this "pod" can be shown in the url: for example: "dm-us"</a:t>
+            </a:r>
+          </a:p>
+          <a:p>
+            <a:pPr lvl="1">
+              <a:lnSpc>
+                <a:spcPct val="90000"/>
+              </a:lnSpc>
+              <a:spcAft>
+                <a:spcPts val="1000"/>
+              </a:spcAft>
+            </a:pPr>
+            <a:r>
+              <a:rPr lang="en-US" sz="800" dirty="0">
+                <a:latin typeface="Roboto" charset="0"/>
+                <a:ea typeface="Roboto" charset="0"/>
+                <a:cs typeface="Roboto" charset="0"/>
+              </a:rPr>
+              <a:t>        Example:</a:t>
+            </a:r>
+          </a:p>
+          <a:p>
+            <a:pPr lvl="1">
+              <a:lnSpc>
+                <a:spcPct val="90000"/>
+              </a:lnSpc>
+              <a:spcAft>
+                <a:spcPts val="1000"/>
+              </a:spcAft>
+            </a:pPr>
+            <a:r>
+              <a:rPr lang="en-US" sz="800" dirty="0">
+                <a:latin typeface="Roboto" charset="0"/>
+                <a:ea typeface="Roboto" charset="0"/>
+                <a:cs typeface="Roboto" charset="0"/>
+              </a:rPr>
+              <a:t>            --</a:t>
+            </a:r>
+            <a:r>
+              <a:rPr lang="en-US" sz="800" dirty="0" err="1">
+                <a:latin typeface="Roboto" charset="0"/>
+                <a:ea typeface="Roboto" charset="0"/>
+                <a:cs typeface="Roboto" charset="0"/>
+              </a:rPr>
+              <a:t>default_pwd</a:t>
+            </a:r>
+            <a:r>
+              <a:rPr lang="en-US" sz="800" dirty="0">
+                <a:latin typeface="Roboto" charset="0"/>
+                <a:ea typeface="Roboto" charset="0"/>
+                <a:cs typeface="Roboto" charset="0"/>
+              </a:rPr>
+              <a:t>=dm-us  </a:t>
+            </a:r>
+          </a:p>
+          <a:p>
+            <a:pPr lvl="1">
+              <a:lnSpc>
+                <a:spcPct val="90000"/>
+              </a:lnSpc>
+              <a:spcAft>
+                <a:spcPts val="1000"/>
+              </a:spcAft>
+            </a:pPr>
+            <a:endParaRPr lang="en-US" sz="800" dirty="0">
+              <a:latin typeface="Roboto" charset="0"/>
+              <a:ea typeface="Roboto" charset="0"/>
+              <a:cs typeface="Roboto" charset="0"/>
+            </a:endParaRPr>
+          </a:p>
+          <a:p>
+            <a:pPr marL="742950" lvl="1" indent="-285750">
+              <a:lnSpc>
+                <a:spcPct val="90000"/>
+              </a:lnSpc>
+              <a:spcAft>
+                <a:spcPts val="1000"/>
+              </a:spcAft>
+              <a:buFont typeface="Arial" panose="020B0604020202020204" pitchFamily="34" charset="0"/>
+              <a:buChar char="•"/>
+            </a:pPr>
+            <a:endParaRPr lang="en-US" sz="800" dirty="0">
+              <a:latin typeface="Roboto" charset="0"/>
+              <a:ea typeface="Roboto" charset="0"/>
+              <a:cs typeface="Roboto" charset="0"/>
+            </a:endParaRPr>
+          </a:p>
+          <a:p>
+            <a:pPr>
+              <a:lnSpc>
+                <a:spcPct val="90000"/>
+              </a:lnSpc>
+              <a:spcAft>
+                <a:spcPts val="1000"/>
+              </a:spcAft>
+            </a:pPr>
+            <a:endParaRPr lang="en-US" sz="800" dirty="0">
+              <a:latin typeface="Roboto" charset="0"/>
+              <a:ea typeface="Roboto" charset="0"/>
+              <a:cs typeface="Roboto" charset="0"/>
+            </a:endParaRPr>
+          </a:p>
+        </p:txBody>
+      </p:sp>
+      <p:sp>
+        <p:nvSpPr>
+          <p:cNvPr id="2" name="TextBox 1">
+            <a:extLst>
+              <a:ext uri="{FF2B5EF4-FFF2-40B4-BE49-F238E27FC236}">
+                <a16:creationId xmlns:a16="http://schemas.microsoft.com/office/drawing/2014/main" id="{3D99F5A5-A0E1-EC6F-E718-9274ADF9116A}"/>
+              </a:ext>
+            </a:extLst>
+          </p:cNvPr>
+          <p:cNvSpPr txBox="1"/>
+          <p:nvPr/>
+        </p:nvSpPr>
+        <p:spPr>
+          <a:xfrm>
+            <a:off x="4360878" y="1045029"/>
+            <a:ext cx="4416050" cy="5412215"/>
+          </a:xfrm>
+          <a:prstGeom prst="rect">
+            <a:avLst/>
+          </a:prstGeom>
+          <a:noFill/>
+        </p:spPr>
+        <p:txBody>
+          <a:bodyPr wrap="square" lIns="0" tIns="0" rIns="0" bIns="0" rtlCol="0">
+            <a:noAutofit/>
+          </a:bodyPr>
+          <a:lstStyle/>
+          <a:p>
+            <a:pPr lvl="1">
+              <a:lnSpc>
+                <a:spcPct val="90000"/>
+              </a:lnSpc>
+              <a:spcAft>
+                <a:spcPts val="1000"/>
+              </a:spcAft>
+            </a:pPr>
+            <a:r>
+              <a:rPr lang="en-US" sz="800" dirty="0">
+                <a:latin typeface="Roboto" charset="0"/>
+                <a:ea typeface="Roboto" charset="0"/>
+                <a:cs typeface="Roboto" charset="0"/>
+              </a:rPr>
+              <a:t>   --</a:t>
+            </a:r>
+            <a:r>
+              <a:rPr lang="en-US" sz="800" dirty="0" err="1">
+                <a:latin typeface="Roboto" charset="0"/>
+                <a:ea typeface="Roboto" charset="0"/>
+                <a:cs typeface="Roboto" charset="0"/>
+              </a:rPr>
+              <a:t>csv_file</a:t>
+            </a:r>
+            <a:endParaRPr lang="en-US" sz="800" dirty="0">
+              <a:latin typeface="Roboto" charset="0"/>
+              <a:ea typeface="Roboto" charset="0"/>
+              <a:cs typeface="Roboto" charset="0"/>
+            </a:endParaRPr>
+          </a:p>
+          <a:p>
+            <a:pPr lvl="1">
+              <a:lnSpc>
+                <a:spcPct val="90000"/>
+              </a:lnSpc>
+              <a:spcAft>
+                <a:spcPts val="1000"/>
+              </a:spcAft>
+            </a:pPr>
+            <a:r>
+              <a:rPr lang="en-US" sz="800" dirty="0">
+                <a:latin typeface="Roboto" charset="0"/>
+                <a:ea typeface="Roboto" charset="0"/>
+                <a:cs typeface="Roboto" charset="0"/>
+              </a:rPr>
+              <a:t>        You can specify the config csv file to use directly, by setting it here. </a:t>
+            </a:r>
+          </a:p>
+          <a:p>
+            <a:pPr lvl="1">
+              <a:lnSpc>
+                <a:spcPct val="90000"/>
+              </a:lnSpc>
+              <a:spcAft>
+                <a:spcPts val="1000"/>
+              </a:spcAft>
+            </a:pPr>
+            <a:r>
+              <a:rPr lang="en-US" sz="800" dirty="0">
+                <a:latin typeface="Roboto" charset="0"/>
+                <a:ea typeface="Roboto" charset="0"/>
+                <a:cs typeface="Roboto" charset="0"/>
+              </a:rPr>
+              <a:t>        It will default to the directory where the script/exe file resides.</a:t>
+            </a:r>
+          </a:p>
+          <a:p>
+            <a:pPr lvl="1">
+              <a:lnSpc>
+                <a:spcPct val="90000"/>
+              </a:lnSpc>
+              <a:spcAft>
+                <a:spcPts val="1000"/>
+              </a:spcAft>
+            </a:pPr>
+            <a:r>
+              <a:rPr lang="en-US" sz="800" dirty="0">
+                <a:latin typeface="Roboto" charset="0"/>
+                <a:ea typeface="Roboto" charset="0"/>
+                <a:cs typeface="Roboto" charset="0"/>
+              </a:rPr>
+              <a:t>        Example:</a:t>
+            </a:r>
+          </a:p>
+          <a:p>
+            <a:pPr lvl="1">
+              <a:lnSpc>
+                <a:spcPct val="90000"/>
+              </a:lnSpc>
+              <a:spcAft>
+                <a:spcPts val="1000"/>
+              </a:spcAft>
+            </a:pPr>
+            <a:r>
+              <a:rPr lang="en-US" sz="800" dirty="0">
+                <a:latin typeface="Roboto" charset="0"/>
+                <a:ea typeface="Roboto" charset="0"/>
+                <a:cs typeface="Roboto" charset="0"/>
+              </a:rPr>
+              <a:t>            --csv_file=my_classifications.csv</a:t>
+            </a:r>
+          </a:p>
+          <a:p>
+            <a:pPr lvl="1">
+              <a:lnSpc>
+                <a:spcPct val="90000"/>
+              </a:lnSpc>
+              <a:spcAft>
+                <a:spcPts val="1000"/>
+              </a:spcAft>
+            </a:pPr>
+            <a:endParaRPr lang="en-US" sz="800" dirty="0">
+              <a:latin typeface="Roboto" charset="0"/>
+              <a:ea typeface="Roboto" charset="0"/>
+              <a:cs typeface="Roboto" charset="0"/>
+            </a:endParaRPr>
+          </a:p>
+          <a:p>
+            <a:pPr lvl="1">
+              <a:lnSpc>
+                <a:spcPct val="90000"/>
+              </a:lnSpc>
+              <a:spcAft>
+                <a:spcPts val="1000"/>
+              </a:spcAft>
+            </a:pPr>
+            <a:r>
+              <a:rPr lang="en-US" sz="800" dirty="0">
+                <a:latin typeface="Roboto" charset="0"/>
+                <a:ea typeface="Roboto" charset="0"/>
+                <a:cs typeface="Roboto" charset="0"/>
+              </a:rPr>
+              <a:t>   --</a:t>
+            </a:r>
+            <a:r>
+              <a:rPr lang="en-US" sz="800" dirty="0" err="1">
+                <a:latin typeface="Roboto" charset="0"/>
+                <a:ea typeface="Roboto" charset="0"/>
+                <a:cs typeface="Roboto" charset="0"/>
+              </a:rPr>
+              <a:t>csv_file_path</a:t>
+            </a:r>
+            <a:endParaRPr lang="en-US" sz="800" dirty="0">
+              <a:latin typeface="Roboto" charset="0"/>
+              <a:ea typeface="Roboto" charset="0"/>
+              <a:cs typeface="Roboto" charset="0"/>
+            </a:endParaRPr>
+          </a:p>
+          <a:p>
+            <a:pPr lvl="1">
+              <a:lnSpc>
+                <a:spcPct val="90000"/>
+              </a:lnSpc>
+              <a:spcAft>
+                <a:spcPts val="1000"/>
+              </a:spcAft>
+            </a:pPr>
+            <a:r>
+              <a:rPr lang="en-US" sz="800" dirty="0">
+                <a:latin typeface="Roboto" charset="0"/>
+                <a:ea typeface="Roboto" charset="0"/>
+                <a:cs typeface="Roboto" charset="0"/>
+              </a:rPr>
+              <a:t>        You can specify the config csv file to use directly, by setting it here. </a:t>
+            </a:r>
+          </a:p>
+          <a:p>
+            <a:pPr lvl="1">
+              <a:lnSpc>
+                <a:spcPct val="90000"/>
+              </a:lnSpc>
+              <a:spcAft>
+                <a:spcPts val="1000"/>
+              </a:spcAft>
+            </a:pPr>
+            <a:r>
+              <a:rPr lang="en-US" sz="800" dirty="0">
+                <a:latin typeface="Roboto" charset="0"/>
+                <a:ea typeface="Roboto" charset="0"/>
+                <a:cs typeface="Roboto" charset="0"/>
+              </a:rPr>
+              <a:t>        Setting it with this option, will allow you to specify the full path (use </a:t>
+            </a:r>
+            <a:r>
+              <a:rPr lang="en-US" sz="800" dirty="0" err="1">
+                <a:latin typeface="Roboto" charset="0"/>
+                <a:ea typeface="Roboto" charset="0"/>
+                <a:cs typeface="Roboto" charset="0"/>
+              </a:rPr>
+              <a:t>linux</a:t>
+            </a:r>
+            <a:r>
+              <a:rPr lang="en-US" sz="800" dirty="0">
+                <a:latin typeface="Roboto" charset="0"/>
+                <a:ea typeface="Roboto" charset="0"/>
+                <a:cs typeface="Roboto" charset="0"/>
+              </a:rPr>
+              <a:t> forward slashes)</a:t>
+            </a:r>
+          </a:p>
+          <a:p>
+            <a:pPr lvl="1">
+              <a:lnSpc>
+                <a:spcPct val="90000"/>
+              </a:lnSpc>
+              <a:spcAft>
+                <a:spcPts val="1000"/>
+              </a:spcAft>
+            </a:pPr>
+            <a:r>
+              <a:rPr lang="en-US" sz="800" dirty="0">
+                <a:latin typeface="Roboto" charset="0"/>
+                <a:ea typeface="Roboto" charset="0"/>
+                <a:cs typeface="Roboto" charset="0"/>
+              </a:rPr>
+              <a:t>        Example:</a:t>
+            </a:r>
+          </a:p>
+          <a:p>
+            <a:pPr lvl="1">
+              <a:lnSpc>
+                <a:spcPct val="90000"/>
+              </a:lnSpc>
+              <a:spcAft>
+                <a:spcPts val="1000"/>
+              </a:spcAft>
+            </a:pPr>
+            <a:r>
+              <a:rPr lang="en-US" sz="800" dirty="0">
+                <a:latin typeface="Roboto" charset="0"/>
+                <a:ea typeface="Roboto" charset="0"/>
+                <a:cs typeface="Roboto" charset="0"/>
+              </a:rPr>
+              <a:t>            --</a:t>
+            </a:r>
+            <a:r>
+              <a:rPr lang="en-US" sz="800" dirty="0" err="1">
+                <a:latin typeface="Roboto" charset="0"/>
+                <a:ea typeface="Roboto" charset="0"/>
+                <a:cs typeface="Roboto" charset="0"/>
+              </a:rPr>
+              <a:t>csv_file_path</a:t>
+            </a:r>
+            <a:r>
+              <a:rPr lang="en-US" sz="800" dirty="0">
+                <a:latin typeface="Roboto" charset="0"/>
+                <a:ea typeface="Roboto" charset="0"/>
+                <a:cs typeface="Roboto" charset="0"/>
+              </a:rPr>
+              <a:t>=c:/junk/my_classifications.csv </a:t>
+            </a:r>
+          </a:p>
+          <a:p>
+            <a:pPr lvl="1">
+              <a:lnSpc>
+                <a:spcPct val="90000"/>
+              </a:lnSpc>
+              <a:spcAft>
+                <a:spcPts val="1000"/>
+              </a:spcAft>
+            </a:pPr>
+            <a:r>
+              <a:rPr lang="en-US" sz="800" dirty="0">
+                <a:latin typeface="Roboto" charset="0"/>
+                <a:ea typeface="Roboto" charset="0"/>
+                <a:cs typeface="Roboto" charset="0"/>
+              </a:rPr>
+              <a:t>   </a:t>
+            </a:r>
+          </a:p>
+          <a:p>
+            <a:pPr lvl="1">
+              <a:lnSpc>
+                <a:spcPct val="90000"/>
+              </a:lnSpc>
+              <a:spcAft>
+                <a:spcPts val="1000"/>
+              </a:spcAft>
+            </a:pPr>
+            <a:r>
+              <a:rPr lang="en-US" sz="800" dirty="0">
+                <a:latin typeface="Roboto" charset="0"/>
+                <a:ea typeface="Roboto" charset="0"/>
+                <a:cs typeface="Roboto" charset="0"/>
+              </a:rPr>
+              <a:t>   --</a:t>
+            </a:r>
+            <a:r>
+              <a:rPr lang="en-US" sz="800" dirty="0" err="1">
+                <a:latin typeface="Roboto" charset="0"/>
+                <a:ea typeface="Roboto" charset="0"/>
+                <a:cs typeface="Roboto" charset="0"/>
+              </a:rPr>
+              <a:t>skip_existing_lookup_tables</a:t>
+            </a:r>
+            <a:r>
+              <a:rPr lang="en-US" sz="800" dirty="0">
+                <a:latin typeface="Roboto" charset="0"/>
+                <a:ea typeface="Roboto" charset="0"/>
+                <a:cs typeface="Roboto" charset="0"/>
+              </a:rPr>
+              <a:t>      </a:t>
+            </a:r>
+          </a:p>
+          <a:p>
+            <a:pPr lvl="1">
+              <a:lnSpc>
+                <a:spcPct val="90000"/>
+              </a:lnSpc>
+              <a:spcAft>
+                <a:spcPts val="1000"/>
+              </a:spcAft>
+            </a:pPr>
+            <a:r>
+              <a:rPr lang="en-US" sz="800" dirty="0">
+                <a:latin typeface="Roboto" charset="0"/>
+                <a:ea typeface="Roboto" charset="0"/>
+                <a:cs typeface="Roboto" charset="0"/>
+              </a:rPr>
+              <a:t>        If a Lookup table is defined, and it already exists, you can specify whether to </a:t>
+            </a:r>
+            <a:r>
+              <a:rPr lang="en-US" sz="800" dirty="0" err="1">
+                <a:latin typeface="Roboto" charset="0"/>
+                <a:ea typeface="Roboto" charset="0"/>
+                <a:cs typeface="Roboto" charset="0"/>
+              </a:rPr>
+              <a:t>upddate</a:t>
+            </a:r>
+            <a:endParaRPr lang="en-US" sz="800" dirty="0">
+              <a:latin typeface="Roboto" charset="0"/>
+              <a:ea typeface="Roboto" charset="0"/>
+              <a:cs typeface="Roboto" charset="0"/>
+            </a:endParaRPr>
+          </a:p>
+          <a:p>
+            <a:pPr lvl="1">
+              <a:lnSpc>
+                <a:spcPct val="90000"/>
+              </a:lnSpc>
+              <a:spcAft>
+                <a:spcPts val="1000"/>
+              </a:spcAft>
+            </a:pPr>
+            <a:r>
+              <a:rPr lang="en-US" sz="800" dirty="0">
+                <a:latin typeface="Roboto" charset="0"/>
+                <a:ea typeface="Roboto" charset="0"/>
+                <a:cs typeface="Roboto" charset="0"/>
+              </a:rPr>
+              <a:t>        the lookup table, or skip it. If set to True, it will skip existing lookup tables. </a:t>
+            </a:r>
+          </a:p>
+          <a:p>
+            <a:pPr lvl="1">
+              <a:lnSpc>
+                <a:spcPct val="90000"/>
+              </a:lnSpc>
+              <a:spcAft>
+                <a:spcPts val="1000"/>
+              </a:spcAft>
+            </a:pPr>
+            <a:r>
+              <a:rPr lang="en-US" sz="800" dirty="0">
+                <a:latin typeface="Roboto" charset="0"/>
+                <a:ea typeface="Roboto" charset="0"/>
+                <a:cs typeface="Roboto" charset="0"/>
+              </a:rPr>
+              <a:t>        If set to False (default), it will update the lookup table.</a:t>
+            </a:r>
+          </a:p>
+          <a:p>
+            <a:pPr lvl="1">
+              <a:lnSpc>
+                <a:spcPct val="90000"/>
+              </a:lnSpc>
+              <a:spcAft>
+                <a:spcPts val="1000"/>
+              </a:spcAft>
+            </a:pPr>
+            <a:r>
+              <a:rPr lang="en-US" sz="800" dirty="0">
+                <a:latin typeface="Roboto" charset="0"/>
+                <a:ea typeface="Roboto" charset="0"/>
+                <a:cs typeface="Roboto" charset="0"/>
+              </a:rPr>
+              <a:t>        Example:</a:t>
+            </a:r>
+          </a:p>
+          <a:p>
+            <a:pPr lvl="1">
+              <a:lnSpc>
+                <a:spcPct val="90000"/>
+              </a:lnSpc>
+              <a:spcAft>
+                <a:spcPts val="1000"/>
+              </a:spcAft>
+            </a:pPr>
+            <a:r>
+              <a:rPr lang="en-US" sz="800" dirty="0">
+                <a:latin typeface="Roboto" charset="0"/>
+                <a:ea typeface="Roboto" charset="0"/>
+                <a:cs typeface="Roboto" charset="0"/>
+              </a:rPr>
+              <a:t>            --</a:t>
+            </a:r>
+            <a:r>
+              <a:rPr lang="en-US" sz="800" dirty="0" err="1">
+                <a:latin typeface="Roboto" charset="0"/>
+                <a:ea typeface="Roboto" charset="0"/>
+                <a:cs typeface="Roboto" charset="0"/>
+              </a:rPr>
+              <a:t>skip_existing_lookup_tables</a:t>
+            </a:r>
+            <a:r>
+              <a:rPr lang="en-US" sz="800" dirty="0">
+                <a:latin typeface="Roboto" charset="0"/>
+                <a:ea typeface="Roboto" charset="0"/>
+                <a:cs typeface="Roboto" charset="0"/>
+              </a:rPr>
+              <a:t>=True</a:t>
+            </a:r>
+          </a:p>
+          <a:p>
+            <a:pPr lvl="1">
+              <a:lnSpc>
+                <a:spcPct val="90000"/>
+              </a:lnSpc>
+              <a:spcAft>
+                <a:spcPts val="1000"/>
+              </a:spcAft>
+            </a:pPr>
+            <a:endParaRPr lang="en-US" sz="800" dirty="0">
+              <a:latin typeface="Roboto" charset="0"/>
+              <a:ea typeface="Roboto" charset="0"/>
+              <a:cs typeface="Roboto" charset="0"/>
+            </a:endParaRPr>
+          </a:p>
+          <a:p>
+            <a:pPr>
+              <a:lnSpc>
+                <a:spcPct val="90000"/>
+              </a:lnSpc>
+              <a:spcAft>
+                <a:spcPts val="1000"/>
+              </a:spcAft>
+            </a:pPr>
+            <a:endParaRPr lang="en-US" sz="800" dirty="0">
+              <a:latin typeface="Roboto" charset="0"/>
+              <a:ea typeface="Roboto" charset="0"/>
+              <a:cs typeface="Roboto" charset="0"/>
+            </a:endParaRPr>
+          </a:p>
+        </p:txBody>
+      </p:sp>
+      <p:sp>
+        <p:nvSpPr>
+          <p:cNvPr id="4" name="TextBox 3">
+            <a:extLst>
+              <a:ext uri="{FF2B5EF4-FFF2-40B4-BE49-F238E27FC236}">
+                <a16:creationId xmlns:a16="http://schemas.microsoft.com/office/drawing/2014/main" id="{DFF4C150-9603-28FE-527C-0B1C6C34BF7A}"/>
+              </a:ext>
+            </a:extLst>
+          </p:cNvPr>
+          <p:cNvSpPr txBox="1"/>
+          <p:nvPr/>
+        </p:nvSpPr>
+        <p:spPr>
+          <a:xfrm>
+            <a:off x="8636955" y="1045028"/>
+            <a:ext cx="3518338" cy="5412215"/>
+          </a:xfrm>
+          <a:prstGeom prst="rect">
+            <a:avLst/>
+          </a:prstGeom>
+          <a:noFill/>
+        </p:spPr>
+        <p:txBody>
+          <a:bodyPr wrap="square" lIns="0" tIns="0" rIns="0" bIns="0" rtlCol="0">
+            <a:noAutofit/>
+          </a:bodyPr>
+          <a:lstStyle/>
+          <a:p>
+            <a:pPr lvl="1">
+              <a:lnSpc>
+                <a:spcPct val="90000"/>
+              </a:lnSpc>
+              <a:spcAft>
+                <a:spcPts val="1000"/>
+              </a:spcAft>
+            </a:pPr>
+            <a:r>
+              <a:rPr lang="en-US" sz="800" dirty="0">
+                <a:latin typeface="Roboto" charset="0"/>
+                <a:ea typeface="Roboto" charset="0"/>
+                <a:cs typeface="Roboto" charset="0"/>
+              </a:rPr>
+              <a:t>   </a:t>
+            </a:r>
+          </a:p>
+          <a:p>
+            <a:pPr lvl="1">
+              <a:lnSpc>
+                <a:spcPct val="90000"/>
+              </a:lnSpc>
+              <a:spcAft>
+                <a:spcPts val="1000"/>
+              </a:spcAft>
+            </a:pPr>
+            <a:r>
+              <a:rPr lang="en-US" sz="800" dirty="0">
+                <a:latin typeface="Roboto" charset="0"/>
+                <a:ea typeface="Roboto" charset="0"/>
+                <a:cs typeface="Roboto" charset="0"/>
+              </a:rPr>
+              <a:t>Direct Command line options:</a:t>
+            </a:r>
+          </a:p>
+          <a:p>
+            <a:pPr lvl="1">
+              <a:lnSpc>
+                <a:spcPct val="90000"/>
+              </a:lnSpc>
+              <a:spcAft>
+                <a:spcPts val="1000"/>
+              </a:spcAft>
+            </a:pPr>
+            <a:r>
+              <a:rPr lang="en-US" sz="800" dirty="0">
+                <a:latin typeface="Roboto" charset="0"/>
+                <a:ea typeface="Roboto" charset="0"/>
+                <a:cs typeface="Roboto" charset="0"/>
+              </a:rPr>
+              <a:t>   delete</a:t>
+            </a:r>
+          </a:p>
+          <a:p>
+            <a:pPr lvl="1">
+              <a:lnSpc>
+                <a:spcPct val="90000"/>
+              </a:lnSpc>
+              <a:spcAft>
+                <a:spcPts val="1000"/>
+              </a:spcAft>
+            </a:pPr>
+            <a:r>
+              <a:rPr lang="en-US" sz="800" dirty="0">
+                <a:latin typeface="Roboto" charset="0"/>
+                <a:ea typeface="Roboto" charset="0"/>
+                <a:cs typeface="Roboto" charset="0"/>
+              </a:rPr>
+              <a:t>        Use this command line argument to specify delete classifications action.</a:t>
+            </a:r>
+          </a:p>
+          <a:p>
+            <a:pPr lvl="1">
+              <a:lnSpc>
+                <a:spcPct val="90000"/>
+              </a:lnSpc>
+              <a:spcAft>
+                <a:spcPts val="1000"/>
+              </a:spcAft>
+            </a:pPr>
+            <a:endParaRPr lang="en-US" sz="800" dirty="0">
+              <a:latin typeface="Roboto" charset="0"/>
+              <a:ea typeface="Roboto" charset="0"/>
+              <a:cs typeface="Roboto" charset="0"/>
+            </a:endParaRPr>
+          </a:p>
+          <a:p>
+            <a:pPr lvl="1">
+              <a:lnSpc>
+                <a:spcPct val="90000"/>
+              </a:lnSpc>
+              <a:spcAft>
+                <a:spcPts val="1000"/>
+              </a:spcAft>
+            </a:pPr>
+            <a:r>
+              <a:rPr lang="en-US" sz="800" dirty="0">
+                <a:latin typeface="Roboto" charset="0"/>
+                <a:ea typeface="Roboto" charset="0"/>
+                <a:cs typeface="Roboto" charset="0"/>
+              </a:rPr>
+              <a:t>   extract</a:t>
+            </a:r>
+          </a:p>
+          <a:p>
+            <a:pPr lvl="1">
+              <a:lnSpc>
+                <a:spcPct val="90000"/>
+              </a:lnSpc>
+              <a:spcAft>
+                <a:spcPts val="1000"/>
+              </a:spcAft>
+            </a:pPr>
+            <a:r>
+              <a:rPr lang="en-US" sz="800" dirty="0">
+                <a:latin typeface="Roboto" charset="0"/>
+                <a:ea typeface="Roboto" charset="0"/>
+                <a:cs typeface="Roboto" charset="0"/>
+              </a:rPr>
+              <a:t>        Use this command to simply extract user created classifications. Use this to create </a:t>
+            </a:r>
+          </a:p>
+          <a:p>
+            <a:pPr lvl="1">
+              <a:lnSpc>
+                <a:spcPct val="90000"/>
+              </a:lnSpc>
+              <a:spcAft>
+                <a:spcPts val="1000"/>
+              </a:spcAft>
+            </a:pPr>
+            <a:r>
+              <a:rPr lang="en-US" sz="800" dirty="0">
+                <a:latin typeface="Roboto" charset="0"/>
+                <a:ea typeface="Roboto" charset="0"/>
+                <a:cs typeface="Roboto" charset="0"/>
+              </a:rPr>
+              <a:t>        additional templates. The "details" that it downloads will provide the correct syntax for</a:t>
+            </a:r>
+          </a:p>
+          <a:p>
+            <a:pPr lvl="1">
+              <a:lnSpc>
+                <a:spcPct val="90000"/>
+              </a:lnSpc>
+              <a:spcAft>
+                <a:spcPts val="1000"/>
+              </a:spcAft>
+            </a:pPr>
+            <a:r>
+              <a:rPr lang="en-US" sz="800" dirty="0">
+                <a:latin typeface="Roboto" charset="0"/>
+                <a:ea typeface="Roboto" charset="0"/>
+                <a:cs typeface="Roboto" charset="0"/>
+              </a:rPr>
+              <a:t>        templates.</a:t>
+            </a:r>
+          </a:p>
+          <a:p>
+            <a:pPr marL="742950" lvl="1" indent="-285750">
+              <a:lnSpc>
+                <a:spcPct val="90000"/>
+              </a:lnSpc>
+              <a:spcAft>
+                <a:spcPts val="1000"/>
+              </a:spcAft>
+              <a:buFont typeface="Arial" panose="020B0604020202020204" pitchFamily="34" charset="0"/>
+              <a:buChar char="•"/>
+            </a:pPr>
+            <a:endParaRPr lang="en-US" sz="800" dirty="0">
+              <a:latin typeface="Roboto" charset="0"/>
+              <a:ea typeface="Roboto" charset="0"/>
+              <a:cs typeface="Roboto" charset="0"/>
+            </a:endParaRPr>
+          </a:p>
+          <a:p>
+            <a:pPr>
+              <a:lnSpc>
+                <a:spcPct val="90000"/>
+              </a:lnSpc>
+              <a:spcAft>
+                <a:spcPts val="1000"/>
+              </a:spcAft>
+            </a:pPr>
+            <a:endParaRPr lang="en-US" sz="800" dirty="0">
+              <a:latin typeface="Roboto" charset="0"/>
+              <a:ea typeface="Roboto" charset="0"/>
+              <a:cs typeface="Roboto" charset="0"/>
+            </a:endParaRPr>
+          </a:p>
+        </p:txBody>
+      </p:sp>
+    </p:spTree>
+    <p:extLst>
+      <p:ext uri="{BB962C8B-B14F-4D97-AF65-F5344CB8AC3E}">
+        <p14:creationId xmlns:p14="http://schemas.microsoft.com/office/powerpoint/2010/main" val="553172376"/>
+      </p:ext>
+    </p:extLst>
+  </p:cSld>
+  <p:clrMapOvr>
+    <a:masterClrMapping/>
+  </p:clrMapOvr>
+  <mc:AlternateContent xmlns:mc="http://schemas.openxmlformats.org/markup-compatibility/2006" xmlns:p14="http://schemas.microsoft.com/office/powerpoint/2010/main">
+    <mc:Choice Requires="p14">
+      <p:transition spd="med" p14:dur="700" advClick="0">
+        <p:fade/>
+      </p:transition>
+    </mc:Choice>
+    <mc:Fallback xmlns="">
+      <p:transition spd="med" advClick="0">
+        <p:fade/>
+      </p:transition>
+    </mc:Fallback>
+  </mc:AlternateContent>
+</p:sld>
+</file>
+
+<file path=ppt/slides/slide14.xml><?xml version="1.0" encoding="utf-8"?>
+<p:sld xmlns:a="http://schemas.openxmlformats.org/drawingml/2006/main" xmlns:r="http://schemas.openxmlformats.org/officeDocument/2006/relationships" xmlns:p="http://schemas.openxmlformats.org/presentationml/2006/main">
+  <p:cSld>
+    <p:spTree>
+      <p:nvGrpSpPr>
         <p:cNvPr id="1" name=""/>
         <p:cNvGrpSpPr/>
         <p:nvPr/>
@@ -25419,7 +27182,7 @@
 </p:sld>
 </file>
 
-<file path=ppt/slides/slide14.xml><?xml version="1.0" encoding="utf-8"?>
+<file path=ppt/slides/slide15.xml><?xml version="1.0" encoding="utf-8"?>
 <p:sld xmlns:a="http://schemas.openxmlformats.org/drawingml/2006/main" xmlns:r="http://schemas.openxmlformats.org/officeDocument/2006/relationships" xmlns:p="http://schemas.openxmlformats.org/presentationml/2006/main">
   <p:cSld>
     <p:spTree>

</xml_diff>